<commit_message>
added files for clarification
</commit_message>
<xml_diff>
--- a/presentation/CSAW_2023_second_stage v2 .pptx
+++ b/presentation/CSAW_2023_second_stage v2 .pptx
@@ -16,14 +16,16 @@
     <p:sldId id="280" r:id="rId10"/>
     <p:sldId id="258" r:id="rId11"/>
     <p:sldId id="261" r:id="rId12"/>
-    <p:sldId id="281" r:id="rId13"/>
-    <p:sldId id="269" r:id="rId14"/>
-    <p:sldId id="267" r:id="rId15"/>
-    <p:sldId id="273" r:id="rId16"/>
-    <p:sldId id="263" r:id="rId17"/>
-    <p:sldId id="275" r:id="rId18"/>
-    <p:sldId id="277" r:id="rId19"/>
-    <p:sldId id="278" r:id="rId20"/>
+    <p:sldId id="283" r:id="rId13"/>
+    <p:sldId id="281" r:id="rId14"/>
+    <p:sldId id="284" r:id="rId15"/>
+    <p:sldId id="267" r:id="rId16"/>
+    <p:sldId id="273" r:id="rId17"/>
+    <p:sldId id="263" r:id="rId18"/>
+    <p:sldId id="275" r:id="rId19"/>
+    <p:sldId id="277" r:id="rId20"/>
+    <p:sldId id="278" r:id="rId21"/>
+    <p:sldId id="285" r:id="rId22"/>
   </p:sldIdLst>
   <p:sldSz cx="12192000" cy="6858000"/>
   <p:notesSz cx="6858000" cy="9144000"/>
@@ -298,7 +300,7 @@
           <a:p>
             <a:fld id="{5BF7584E-B7F9-42B6-AFB7-0AA885C436D7}" type="datetimeFigureOut">
               <a:rPr lang="el-GR" smtClean="0"/>
-              <a:t>2/11/2023</a:t>
+              <a:t>4/11/2023</a:t>
             </a:fld>
             <a:endParaRPr lang="el-GR"/>
           </a:p>
@@ -498,7 +500,7 @@
           <a:p>
             <a:fld id="{5BF7584E-B7F9-42B6-AFB7-0AA885C436D7}" type="datetimeFigureOut">
               <a:rPr lang="el-GR" smtClean="0"/>
-              <a:t>2/11/2023</a:t>
+              <a:t>4/11/2023</a:t>
             </a:fld>
             <a:endParaRPr lang="el-GR"/>
           </a:p>
@@ -708,7 +710,7 @@
           <a:p>
             <a:fld id="{5BF7584E-B7F9-42B6-AFB7-0AA885C436D7}" type="datetimeFigureOut">
               <a:rPr lang="el-GR" smtClean="0"/>
-              <a:t>2/11/2023</a:t>
+              <a:t>4/11/2023</a:t>
             </a:fld>
             <a:endParaRPr lang="el-GR"/>
           </a:p>
@@ -908,7 +910,7 @@
           <a:p>
             <a:fld id="{5BF7584E-B7F9-42B6-AFB7-0AA885C436D7}" type="datetimeFigureOut">
               <a:rPr lang="el-GR" smtClean="0"/>
-              <a:t>2/11/2023</a:t>
+              <a:t>4/11/2023</a:t>
             </a:fld>
             <a:endParaRPr lang="el-GR"/>
           </a:p>
@@ -1184,7 +1186,7 @@
           <a:p>
             <a:fld id="{5BF7584E-B7F9-42B6-AFB7-0AA885C436D7}" type="datetimeFigureOut">
               <a:rPr lang="el-GR" smtClean="0"/>
-              <a:t>2/11/2023</a:t>
+              <a:t>4/11/2023</a:t>
             </a:fld>
             <a:endParaRPr lang="el-GR"/>
           </a:p>
@@ -1452,7 +1454,7 @@
           <a:p>
             <a:fld id="{5BF7584E-B7F9-42B6-AFB7-0AA885C436D7}" type="datetimeFigureOut">
               <a:rPr lang="el-GR" smtClean="0"/>
-              <a:t>2/11/2023</a:t>
+              <a:t>4/11/2023</a:t>
             </a:fld>
             <a:endParaRPr lang="el-GR"/>
           </a:p>
@@ -1867,7 +1869,7 @@
           <a:p>
             <a:fld id="{5BF7584E-B7F9-42B6-AFB7-0AA885C436D7}" type="datetimeFigureOut">
               <a:rPr lang="el-GR" smtClean="0"/>
-              <a:t>2/11/2023</a:t>
+              <a:t>4/11/2023</a:t>
             </a:fld>
             <a:endParaRPr lang="el-GR"/>
           </a:p>
@@ -2009,7 +2011,7 @@
           <a:p>
             <a:fld id="{5BF7584E-B7F9-42B6-AFB7-0AA885C436D7}" type="datetimeFigureOut">
               <a:rPr lang="el-GR" smtClean="0"/>
-              <a:t>2/11/2023</a:t>
+              <a:t>4/11/2023</a:t>
             </a:fld>
             <a:endParaRPr lang="el-GR"/>
           </a:p>
@@ -2122,7 +2124,7 @@
           <a:p>
             <a:fld id="{5BF7584E-B7F9-42B6-AFB7-0AA885C436D7}" type="datetimeFigureOut">
               <a:rPr lang="el-GR" smtClean="0"/>
-              <a:t>2/11/2023</a:t>
+              <a:t>4/11/2023</a:t>
             </a:fld>
             <a:endParaRPr lang="el-GR"/>
           </a:p>
@@ -2435,7 +2437,7 @@
           <a:p>
             <a:fld id="{5BF7584E-B7F9-42B6-AFB7-0AA885C436D7}" type="datetimeFigureOut">
               <a:rPr lang="el-GR" smtClean="0"/>
-              <a:t>2/11/2023</a:t>
+              <a:t>4/11/2023</a:t>
             </a:fld>
             <a:endParaRPr lang="el-GR"/>
           </a:p>
@@ -2724,7 +2726,7 @@
           <a:p>
             <a:fld id="{5BF7584E-B7F9-42B6-AFB7-0AA885C436D7}" type="datetimeFigureOut">
               <a:rPr lang="el-GR" smtClean="0"/>
-              <a:t>2/11/2023</a:t>
+              <a:t>4/11/2023</a:t>
             </a:fld>
             <a:endParaRPr lang="el-GR"/>
           </a:p>
@@ -2967,7 +2969,7 @@
           <a:p>
             <a:fld id="{5BF7584E-B7F9-42B6-AFB7-0AA885C436D7}" type="datetimeFigureOut">
               <a:rPr lang="el-GR" smtClean="0"/>
-              <a:t>2/11/2023</a:t>
+              <a:t>4/11/2023</a:t>
             </a:fld>
             <a:endParaRPr lang="el-GR"/>
           </a:p>
@@ -4291,404 +4293,426 @@
           <a:chExt cx="0" cy="0"/>
         </a:xfrm>
       </p:grpSpPr>
-      <p:grpSp>
-        <p:nvGrpSpPr>
-          <p:cNvPr id="6" name="Group 5">
-            <a:extLst>
-              <a:ext uri="{FF2B5EF4-FFF2-40B4-BE49-F238E27FC236}">
-                <a16:creationId xmlns:a16="http://schemas.microsoft.com/office/drawing/2014/main" id="{680DA278-4FAE-C1FF-2AF6-3F538A4B84D1}"/>
-              </a:ext>
-            </a:extLst>
-          </p:cNvPr>
-          <p:cNvGrpSpPr/>
+      <p:sp>
+        <p:nvSpPr>
+          <p:cNvPr id="3" name="Subtitle 2">
+            <a:extLst>
+              <a:ext uri="{FF2B5EF4-FFF2-40B4-BE49-F238E27FC236}">
+                <a16:creationId xmlns:a16="http://schemas.microsoft.com/office/drawing/2014/main" id="{6EFF0982-1B83-0E51-A871-7E83BD13D27F}"/>
+              </a:ext>
+            </a:extLst>
+          </p:cNvPr>
+          <p:cNvSpPr txBox="1">
+            <a:spLocks/>
+          </p:cNvSpPr>
           <p:nvPr/>
-        </p:nvGrpSpPr>
-        <p:grpSpPr>
-          <a:xfrm>
-            <a:off x="1466850" y="580148"/>
-            <a:ext cx="8909118" cy="5836086"/>
-            <a:chOff x="2175322" y="594145"/>
-            <a:chExt cx="8559936" cy="5836086"/>
-          </a:xfrm>
-        </p:grpSpPr>
-        <p:sp>
-          <p:nvSpPr>
-            <p:cNvPr id="3" name="Subtitle 2">
-              <a:extLst>
-                <a:ext uri="{FF2B5EF4-FFF2-40B4-BE49-F238E27FC236}">
-                  <a16:creationId xmlns:a16="http://schemas.microsoft.com/office/drawing/2014/main" id="{6EFF0982-1B83-0E51-A871-7E83BD13D27F}"/>
-                </a:ext>
-              </a:extLst>
-            </p:cNvPr>
-            <p:cNvSpPr txBox="1">
-              <a:spLocks/>
-            </p:cNvSpPr>
-            <p:nvPr/>
-          </p:nvSpPr>
-          <p:spPr>
-            <a:xfrm>
-              <a:off x="2175322" y="4843096"/>
-              <a:ext cx="8559936" cy="1587135"/>
-            </a:xfrm>
-            <a:prstGeom prst="rect">
-              <a:avLst/>
-            </a:prstGeom>
-          </p:spPr>
-          <p:txBody>
-            <a:bodyPr vert="horz" wrap="square" lIns="108745" tIns="54373" rIns="108745" bIns="54373" rtlCol="0">
-              <a:spAutoFit/>
-            </a:bodyPr>
-            <a:lstStyle>
-              <a:lvl1pPr marL="0" indent="0" algn="ctr" defTabSz="1087636" rtl="0" eaLnBrk="1" latinLnBrk="0" hangingPunct="1">
-                <a:lnSpc>
-                  <a:spcPct val="120000"/>
-                </a:lnSpc>
-                <a:spcBef>
-                  <a:spcPct val="20000"/>
-                </a:spcBef>
-                <a:buFont typeface="Arial"/>
-                <a:buNone/>
-                <a:defRPr sz="2400" kern="1200">
-                  <a:solidFill>
-                    <a:schemeClr val="tx2"/>
-                  </a:solidFill>
-                  <a:latin typeface="Open Sans Light"/>
-                  <a:ea typeface="+mn-ea"/>
-                  <a:cs typeface="Open Sans Light"/>
-                </a:defRPr>
-              </a:lvl1pPr>
-              <a:lvl2pPr marL="1087636" indent="0" algn="ctr" defTabSz="1087636" rtl="0" eaLnBrk="1" latinLnBrk="0" hangingPunct="1">
-                <a:lnSpc>
-                  <a:spcPct val="130000"/>
-                </a:lnSpc>
-                <a:spcBef>
-                  <a:spcPct val="20000"/>
-                </a:spcBef>
-                <a:buFont typeface="Arial"/>
-                <a:buNone/>
-                <a:defRPr sz="3200" kern="1200">
-                  <a:solidFill>
-                    <a:schemeClr val="tx1">
-                      <a:tint val="75000"/>
-                    </a:schemeClr>
-                  </a:solidFill>
-                  <a:latin typeface="Open Sans"/>
-                  <a:ea typeface="+mn-ea"/>
-                  <a:cs typeface="Open Sans"/>
-                </a:defRPr>
-              </a:lvl2pPr>
-              <a:lvl3pPr marL="2175271" indent="0" algn="ctr" defTabSz="1087636" rtl="0" eaLnBrk="1" latinLnBrk="0" hangingPunct="1">
-                <a:lnSpc>
-                  <a:spcPct val="130000"/>
-                </a:lnSpc>
-                <a:spcBef>
-                  <a:spcPct val="20000"/>
-                </a:spcBef>
-                <a:buFont typeface="Arial"/>
-                <a:buNone/>
-                <a:defRPr sz="3200" kern="1200">
-                  <a:solidFill>
-                    <a:schemeClr val="tx1">
-                      <a:tint val="75000"/>
-                    </a:schemeClr>
-                  </a:solidFill>
-                  <a:latin typeface="Open Sans"/>
-                  <a:ea typeface="+mn-ea"/>
-                  <a:cs typeface="Open Sans"/>
-                </a:defRPr>
-              </a:lvl3pPr>
-              <a:lvl4pPr marL="3262912" indent="0" algn="ctr" defTabSz="1087636" rtl="0" eaLnBrk="1" latinLnBrk="0" hangingPunct="1">
-                <a:lnSpc>
-                  <a:spcPct val="130000"/>
-                </a:lnSpc>
-                <a:spcBef>
-                  <a:spcPct val="20000"/>
-                </a:spcBef>
-                <a:buFont typeface="Arial"/>
-                <a:buNone/>
-                <a:defRPr sz="3200" kern="1200">
-                  <a:solidFill>
-                    <a:schemeClr val="tx1">
-                      <a:tint val="75000"/>
-                    </a:schemeClr>
-                  </a:solidFill>
-                  <a:latin typeface="Open Sans"/>
-                  <a:ea typeface="+mn-ea"/>
-                  <a:cs typeface="Open Sans"/>
-                </a:defRPr>
-              </a:lvl4pPr>
-              <a:lvl5pPr marL="4350546" indent="0" algn="ctr" defTabSz="1087636" rtl="0" eaLnBrk="1" latinLnBrk="0" hangingPunct="1">
-                <a:lnSpc>
-                  <a:spcPct val="130000"/>
-                </a:lnSpc>
-                <a:spcBef>
-                  <a:spcPct val="20000"/>
-                </a:spcBef>
-                <a:buFont typeface="Arial"/>
-                <a:buNone/>
-                <a:defRPr sz="3200" kern="1200">
-                  <a:solidFill>
-                    <a:schemeClr val="tx1">
-                      <a:tint val="75000"/>
-                    </a:schemeClr>
-                  </a:solidFill>
-                  <a:latin typeface="Open Sans"/>
-                  <a:ea typeface="+mn-ea"/>
-                  <a:cs typeface="Open Sans"/>
-                </a:defRPr>
-              </a:lvl5pPr>
-              <a:lvl6pPr marL="5438184" indent="0" algn="ctr" defTabSz="1087636" rtl="0" eaLnBrk="1" latinLnBrk="0" hangingPunct="1">
-                <a:spcBef>
-                  <a:spcPct val="20000"/>
-                </a:spcBef>
-                <a:buFont typeface="Arial"/>
-                <a:buNone/>
-                <a:defRPr sz="4800" kern="1200">
-                  <a:solidFill>
-                    <a:schemeClr val="tx1">
-                      <a:tint val="75000"/>
-                    </a:schemeClr>
-                  </a:solidFill>
-                  <a:latin typeface="+mn-lt"/>
-                  <a:ea typeface="+mn-ea"/>
-                  <a:cs typeface="+mn-cs"/>
-                </a:defRPr>
-              </a:lvl6pPr>
-              <a:lvl7pPr marL="6525820" indent="0" algn="ctr" defTabSz="1087636" rtl="0" eaLnBrk="1" latinLnBrk="0" hangingPunct="1">
-                <a:spcBef>
-                  <a:spcPct val="20000"/>
-                </a:spcBef>
-                <a:buFont typeface="Arial"/>
-                <a:buNone/>
-                <a:defRPr sz="4800" kern="1200">
-                  <a:solidFill>
-                    <a:schemeClr val="tx1">
-                      <a:tint val="75000"/>
-                    </a:schemeClr>
-                  </a:solidFill>
-                  <a:latin typeface="+mn-lt"/>
-                  <a:ea typeface="+mn-ea"/>
-                  <a:cs typeface="+mn-cs"/>
-                </a:defRPr>
-              </a:lvl7pPr>
-              <a:lvl8pPr marL="7613455" indent="0" algn="ctr" defTabSz="1087636" rtl="0" eaLnBrk="1" latinLnBrk="0" hangingPunct="1">
-                <a:spcBef>
-                  <a:spcPct val="20000"/>
-                </a:spcBef>
-                <a:buFont typeface="Arial"/>
-                <a:buNone/>
-                <a:defRPr sz="4800" kern="1200">
-                  <a:solidFill>
-                    <a:schemeClr val="tx1">
-                      <a:tint val="75000"/>
-                    </a:schemeClr>
-                  </a:solidFill>
-                  <a:latin typeface="+mn-lt"/>
-                  <a:ea typeface="+mn-ea"/>
-                  <a:cs typeface="+mn-cs"/>
-                </a:defRPr>
-              </a:lvl8pPr>
-              <a:lvl9pPr marL="8701091" indent="0" algn="ctr" defTabSz="1087636" rtl="0" eaLnBrk="1" latinLnBrk="0" hangingPunct="1">
-                <a:spcBef>
-                  <a:spcPct val="20000"/>
-                </a:spcBef>
-                <a:buFont typeface="Arial"/>
-                <a:buNone/>
-                <a:defRPr sz="4800" kern="1200">
-                  <a:solidFill>
-                    <a:schemeClr val="tx1">
-                      <a:tint val="75000"/>
-                    </a:schemeClr>
-                  </a:solidFill>
-                  <a:latin typeface="+mn-lt"/>
-                  <a:ea typeface="+mn-ea"/>
-                  <a:cs typeface="+mn-cs"/>
-                </a:defRPr>
-              </a:lvl9pPr>
-            </a:lstStyle>
-            <a:p>
-              <a:pPr algn="l">
-                <a:lnSpc>
-                  <a:spcPct val="100000"/>
-                </a:lnSpc>
-              </a:pPr>
-              <a:r>
-                <a:rPr lang="en-US" sz="4800" dirty="0">
-                  <a:solidFill>
-                    <a:schemeClr val="tx1"/>
-                  </a:solidFill>
-                  <a:latin typeface="Source Sans Pro" charset="0"/>
-                  <a:ea typeface="Source Sans Pro" charset="0"/>
-                  <a:cs typeface="Source Sans Pro" charset="0"/>
-                </a:rPr>
-                <a:t>A wishbone bus D.</a:t>
-              </a:r>
-              <a:r>
-                <a:rPr lang="el-GR" sz="4800" dirty="0">
-                  <a:solidFill>
-                    <a:schemeClr val="tx1"/>
-                  </a:solidFill>
-                  <a:latin typeface="Source Sans Pro" charset="0"/>
-                  <a:ea typeface="Source Sans Pro" charset="0"/>
-                  <a:cs typeface="Source Sans Pro" charset="0"/>
-                </a:rPr>
-                <a:t>ο</a:t>
-              </a:r>
-              <a:r>
-                <a:rPr lang="en-US" sz="4800" dirty="0">
-                  <a:solidFill>
-                    <a:schemeClr val="tx1"/>
-                  </a:solidFill>
-                  <a:latin typeface="Source Sans Pro" charset="0"/>
-                  <a:ea typeface="Source Sans Pro" charset="0"/>
-                  <a:cs typeface="Source Sans Pro" charset="0"/>
-                </a:rPr>
-                <a:t>.S. </a:t>
-              </a:r>
-              <a:r>
-                <a:rPr lang="en-US" sz="4800" dirty="0" err="1">
-                  <a:solidFill>
-                    <a:schemeClr val="tx1"/>
-                  </a:solidFill>
-                  <a:latin typeface="Source Sans Pro" charset="0"/>
-                  <a:ea typeface="Source Sans Pro" charset="0"/>
-                  <a:cs typeface="Source Sans Pro" charset="0"/>
-                </a:rPr>
-                <a:t>hw</a:t>
-              </a:r>
-              <a:r>
-                <a:rPr lang="en-US" sz="4800" dirty="0">
-                  <a:solidFill>
-                    <a:schemeClr val="tx1"/>
-                  </a:solidFill>
-                  <a:latin typeface="Source Sans Pro" charset="0"/>
-                  <a:ea typeface="Source Sans Pro" charset="0"/>
-                  <a:cs typeface="Source Sans Pro" charset="0"/>
-                </a:rPr>
-                <a:t> trojan targeting </a:t>
-              </a:r>
-              <a:r>
-                <a:rPr lang="en-US" sz="4800" dirty="0" err="1">
-                  <a:solidFill>
-                    <a:schemeClr val="tx1"/>
-                  </a:solidFill>
-                  <a:latin typeface="Source Sans Pro" charset="0"/>
-                  <a:ea typeface="Source Sans Pro" charset="0"/>
-                  <a:cs typeface="Source Sans Pro" charset="0"/>
-                </a:rPr>
-                <a:t>efabless</a:t>
-              </a:r>
-              <a:r>
-                <a:rPr lang="en-US" sz="4800" dirty="0">
-                  <a:solidFill>
-                    <a:schemeClr val="tx1"/>
-                  </a:solidFill>
-                  <a:latin typeface="Source Sans Pro" charset="0"/>
-                  <a:ea typeface="Source Sans Pro" charset="0"/>
-                  <a:cs typeface="Source Sans Pro" charset="0"/>
-                </a:rPr>
-                <a:t> </a:t>
-              </a:r>
-              <a:r>
-                <a:rPr lang="en-US" sz="4800" dirty="0">
-                  <a:solidFill>
-                    <a:schemeClr val="tx1"/>
-                  </a:solidFill>
-                  <a:latin typeface="Source Sans Pro" charset="0"/>
-                  <a:ea typeface="Source Sans Pro" charset="0"/>
-                  <a:cs typeface="Source Sans Pro" charset="0"/>
-                  <a:hlinkClick r:id="rId2"/>
-                </a:rPr>
-                <a:t>Caravel</a:t>
-              </a:r>
-              <a:r>
-                <a:rPr lang="en-US" sz="4800" dirty="0">
-                  <a:solidFill>
-                    <a:schemeClr val="tx1"/>
-                  </a:solidFill>
-                  <a:latin typeface="Source Sans Pro" charset="0"/>
-                  <a:ea typeface="Source Sans Pro" charset="0"/>
-                  <a:cs typeface="Source Sans Pro" charset="0"/>
-                </a:rPr>
-                <a:t> project</a:t>
-              </a:r>
-            </a:p>
-          </p:txBody>
-        </p:sp>
-        <p:sp>
-          <p:nvSpPr>
-            <p:cNvPr id="4" name="TextBox 3">
-              <a:extLst>
-                <a:ext uri="{FF2B5EF4-FFF2-40B4-BE49-F238E27FC236}">
-                  <a16:creationId xmlns:a16="http://schemas.microsoft.com/office/drawing/2014/main" id="{C8DC06CC-1F09-4301-23B7-FA1CC8459899}"/>
-                </a:ext>
-              </a:extLst>
-            </p:cNvPr>
-            <p:cNvSpPr txBox="1"/>
-            <p:nvPr/>
-          </p:nvSpPr>
-          <p:spPr>
-            <a:xfrm>
-              <a:off x="2660064" y="594145"/>
-              <a:ext cx="7590452" cy="4508927"/>
-            </a:xfrm>
-            <a:prstGeom prst="rect">
-              <a:avLst/>
-            </a:prstGeom>
-            <a:noFill/>
-          </p:spPr>
-          <p:txBody>
-            <a:bodyPr wrap="square" rtlCol="0">
-              <a:spAutoFit/>
-            </a:bodyPr>
-            <a:lstStyle/>
-            <a:p>
-              <a:pPr algn="ctr"/>
-              <a:r>
-                <a:rPr lang="en-US" sz="28700" dirty="0">
-                  <a:solidFill>
-                    <a:srgbClr val="00AAD4"/>
-                  </a:solidFill>
-                  <a:latin typeface="Source Sans Pro" charset="0"/>
-                  <a:ea typeface="Source Sans Pro" charset="0"/>
-                  <a:cs typeface="Source Sans Pro" charset="0"/>
-                </a:rPr>
-                <a:t>2</a:t>
-              </a:r>
-              <a:r>
-                <a:rPr lang="en-US" sz="11500" baseline="30000" dirty="0">
-                  <a:solidFill>
-                    <a:srgbClr val="00AAD4"/>
-                  </a:solidFill>
-                  <a:latin typeface="Source Sans Pro" charset="0"/>
-                  <a:ea typeface="Source Sans Pro" charset="0"/>
-                  <a:cs typeface="Source Sans Pro" charset="0"/>
-                </a:rPr>
-                <a:t>st</a:t>
-              </a:r>
-              <a:r>
-                <a:rPr lang="en-US" sz="11500" dirty="0">
-                  <a:solidFill>
-                    <a:srgbClr val="00AAD4"/>
-                  </a:solidFill>
-                  <a:latin typeface="Source Sans Pro" charset="0"/>
-                  <a:ea typeface="Source Sans Pro" charset="0"/>
-                  <a:cs typeface="Source Sans Pro" charset="0"/>
-                </a:rPr>
-                <a:t> design</a:t>
-              </a:r>
-              <a:endParaRPr lang="en-US" sz="3000" dirty="0">
+        </p:nvSpPr>
+        <p:spPr>
+          <a:xfrm>
+            <a:off x="326571" y="4374555"/>
+            <a:ext cx="12018327" cy="2325799"/>
+          </a:xfrm>
+          <a:prstGeom prst="rect">
+            <a:avLst/>
+          </a:prstGeom>
+        </p:spPr>
+        <p:txBody>
+          <a:bodyPr vert="horz" wrap="square" lIns="108745" tIns="54373" rIns="108745" bIns="54373" rtlCol="0">
+            <a:spAutoFit/>
+          </a:bodyPr>
+          <a:lstStyle>
+            <a:lvl1pPr marL="0" indent="0" algn="ctr" defTabSz="1087636" rtl="0" eaLnBrk="1" latinLnBrk="0" hangingPunct="1">
+              <a:lnSpc>
+                <a:spcPct val="120000"/>
+              </a:lnSpc>
+              <a:spcBef>
+                <a:spcPct val="20000"/>
+              </a:spcBef>
+              <a:buFont typeface="Arial"/>
+              <a:buNone/>
+              <a:defRPr sz="2400" kern="1200">
+                <a:solidFill>
+                  <a:schemeClr val="tx2"/>
+                </a:solidFill>
+                <a:latin typeface="Open Sans Light"/>
+                <a:ea typeface="+mn-ea"/>
+                <a:cs typeface="Open Sans Light"/>
+              </a:defRPr>
+            </a:lvl1pPr>
+            <a:lvl2pPr marL="1087636" indent="0" algn="ctr" defTabSz="1087636" rtl="0" eaLnBrk="1" latinLnBrk="0" hangingPunct="1">
+              <a:lnSpc>
+                <a:spcPct val="130000"/>
+              </a:lnSpc>
+              <a:spcBef>
+                <a:spcPct val="20000"/>
+              </a:spcBef>
+              <a:buFont typeface="Arial"/>
+              <a:buNone/>
+              <a:defRPr sz="3200" kern="1200">
+                <a:solidFill>
+                  <a:schemeClr val="tx1">
+                    <a:tint val="75000"/>
+                  </a:schemeClr>
+                </a:solidFill>
+                <a:latin typeface="Open Sans"/>
+                <a:ea typeface="+mn-ea"/>
+                <a:cs typeface="Open Sans"/>
+              </a:defRPr>
+            </a:lvl2pPr>
+            <a:lvl3pPr marL="2175271" indent="0" algn="ctr" defTabSz="1087636" rtl="0" eaLnBrk="1" latinLnBrk="0" hangingPunct="1">
+              <a:lnSpc>
+                <a:spcPct val="130000"/>
+              </a:lnSpc>
+              <a:spcBef>
+                <a:spcPct val="20000"/>
+              </a:spcBef>
+              <a:buFont typeface="Arial"/>
+              <a:buNone/>
+              <a:defRPr sz="3200" kern="1200">
+                <a:solidFill>
+                  <a:schemeClr val="tx1">
+                    <a:tint val="75000"/>
+                  </a:schemeClr>
+                </a:solidFill>
+                <a:latin typeface="Open Sans"/>
+                <a:ea typeface="+mn-ea"/>
+                <a:cs typeface="Open Sans"/>
+              </a:defRPr>
+            </a:lvl3pPr>
+            <a:lvl4pPr marL="3262912" indent="0" algn="ctr" defTabSz="1087636" rtl="0" eaLnBrk="1" latinLnBrk="0" hangingPunct="1">
+              <a:lnSpc>
+                <a:spcPct val="130000"/>
+              </a:lnSpc>
+              <a:spcBef>
+                <a:spcPct val="20000"/>
+              </a:spcBef>
+              <a:buFont typeface="Arial"/>
+              <a:buNone/>
+              <a:defRPr sz="3200" kern="1200">
+                <a:solidFill>
+                  <a:schemeClr val="tx1">
+                    <a:tint val="75000"/>
+                  </a:schemeClr>
+                </a:solidFill>
+                <a:latin typeface="Open Sans"/>
+                <a:ea typeface="+mn-ea"/>
+                <a:cs typeface="Open Sans"/>
+              </a:defRPr>
+            </a:lvl4pPr>
+            <a:lvl5pPr marL="4350546" indent="0" algn="ctr" defTabSz="1087636" rtl="0" eaLnBrk="1" latinLnBrk="0" hangingPunct="1">
+              <a:lnSpc>
+                <a:spcPct val="130000"/>
+              </a:lnSpc>
+              <a:spcBef>
+                <a:spcPct val="20000"/>
+              </a:spcBef>
+              <a:buFont typeface="Arial"/>
+              <a:buNone/>
+              <a:defRPr sz="3200" kern="1200">
+                <a:solidFill>
+                  <a:schemeClr val="tx1">
+                    <a:tint val="75000"/>
+                  </a:schemeClr>
+                </a:solidFill>
+                <a:latin typeface="Open Sans"/>
+                <a:ea typeface="+mn-ea"/>
+                <a:cs typeface="Open Sans"/>
+              </a:defRPr>
+            </a:lvl5pPr>
+            <a:lvl6pPr marL="5438184" indent="0" algn="ctr" defTabSz="1087636" rtl="0" eaLnBrk="1" latinLnBrk="0" hangingPunct="1">
+              <a:spcBef>
+                <a:spcPct val="20000"/>
+              </a:spcBef>
+              <a:buFont typeface="Arial"/>
+              <a:buNone/>
+              <a:defRPr sz="4800" kern="1200">
+                <a:solidFill>
+                  <a:schemeClr val="tx1">
+                    <a:tint val="75000"/>
+                  </a:schemeClr>
+                </a:solidFill>
+                <a:latin typeface="+mn-lt"/>
+                <a:ea typeface="+mn-ea"/>
+                <a:cs typeface="+mn-cs"/>
+              </a:defRPr>
+            </a:lvl6pPr>
+            <a:lvl7pPr marL="6525820" indent="0" algn="ctr" defTabSz="1087636" rtl="0" eaLnBrk="1" latinLnBrk="0" hangingPunct="1">
+              <a:spcBef>
+                <a:spcPct val="20000"/>
+              </a:spcBef>
+              <a:buFont typeface="Arial"/>
+              <a:buNone/>
+              <a:defRPr sz="4800" kern="1200">
+                <a:solidFill>
+                  <a:schemeClr val="tx1">
+                    <a:tint val="75000"/>
+                  </a:schemeClr>
+                </a:solidFill>
+                <a:latin typeface="+mn-lt"/>
+                <a:ea typeface="+mn-ea"/>
+                <a:cs typeface="+mn-cs"/>
+              </a:defRPr>
+            </a:lvl7pPr>
+            <a:lvl8pPr marL="7613455" indent="0" algn="ctr" defTabSz="1087636" rtl="0" eaLnBrk="1" latinLnBrk="0" hangingPunct="1">
+              <a:spcBef>
+                <a:spcPct val="20000"/>
+              </a:spcBef>
+              <a:buFont typeface="Arial"/>
+              <a:buNone/>
+              <a:defRPr sz="4800" kern="1200">
+                <a:solidFill>
+                  <a:schemeClr val="tx1">
+                    <a:tint val="75000"/>
+                  </a:schemeClr>
+                </a:solidFill>
+                <a:latin typeface="+mn-lt"/>
+                <a:ea typeface="+mn-ea"/>
+                <a:cs typeface="+mn-cs"/>
+              </a:defRPr>
+            </a:lvl8pPr>
+            <a:lvl9pPr marL="8701091" indent="0" algn="ctr" defTabSz="1087636" rtl="0" eaLnBrk="1" latinLnBrk="0" hangingPunct="1">
+              <a:spcBef>
+                <a:spcPct val="20000"/>
+              </a:spcBef>
+              <a:buFont typeface="Arial"/>
+              <a:buNone/>
+              <a:defRPr sz="4800" kern="1200">
+                <a:solidFill>
+                  <a:schemeClr val="tx1">
+                    <a:tint val="75000"/>
+                  </a:schemeClr>
+                </a:solidFill>
+                <a:latin typeface="+mn-lt"/>
+                <a:ea typeface="+mn-ea"/>
+                <a:cs typeface="+mn-cs"/>
+              </a:defRPr>
+            </a:lvl9pPr>
+          </a:lstStyle>
+          <a:p>
+            <a:pPr algn="l">
+              <a:lnSpc>
+                <a:spcPct val="100000"/>
+              </a:lnSpc>
+            </a:pPr>
+            <a:r>
+              <a:rPr lang="en-US" sz="4800" dirty="0">
+                <a:solidFill>
+                  <a:schemeClr val="tx1"/>
+                </a:solidFill>
+                <a:latin typeface="Source Sans Pro" charset="0"/>
+                <a:ea typeface="Source Sans Pro" charset="0"/>
+                <a:cs typeface="Source Sans Pro" charset="0"/>
+              </a:rPr>
+              <a:t>A wishbone bus D.</a:t>
+            </a:r>
+            <a:r>
+              <a:rPr lang="el-GR" sz="4800" dirty="0">
+                <a:solidFill>
+                  <a:schemeClr val="tx1"/>
+                </a:solidFill>
+                <a:latin typeface="Source Sans Pro" charset="0"/>
+                <a:ea typeface="Source Sans Pro" charset="0"/>
+                <a:cs typeface="Source Sans Pro" charset="0"/>
+              </a:rPr>
+              <a:t>ο</a:t>
+            </a:r>
+            <a:r>
+              <a:rPr lang="en-US" sz="4800" dirty="0">
+                <a:solidFill>
+                  <a:schemeClr val="tx1"/>
+                </a:solidFill>
+                <a:latin typeface="Source Sans Pro" charset="0"/>
+                <a:ea typeface="Source Sans Pro" charset="0"/>
+                <a:cs typeface="Source Sans Pro" charset="0"/>
+              </a:rPr>
+              <a:t>.S. </a:t>
+            </a:r>
+            <a:r>
+              <a:rPr lang="en-US" sz="4800" dirty="0" err="1">
+                <a:solidFill>
+                  <a:schemeClr val="tx1"/>
+                </a:solidFill>
+                <a:latin typeface="Source Sans Pro" charset="0"/>
+                <a:ea typeface="Source Sans Pro" charset="0"/>
+                <a:cs typeface="Source Sans Pro" charset="0"/>
+              </a:rPr>
+              <a:t>hw</a:t>
+            </a:r>
+            <a:r>
+              <a:rPr lang="en-US" sz="4800" dirty="0">
+                <a:solidFill>
+                  <a:schemeClr val="tx1"/>
+                </a:solidFill>
+                <a:latin typeface="Source Sans Pro" charset="0"/>
+                <a:ea typeface="Source Sans Pro" charset="0"/>
+                <a:cs typeface="Source Sans Pro" charset="0"/>
+              </a:rPr>
+              <a:t> trojan targeting a)simple </a:t>
+            </a:r>
+            <a:r>
+              <a:rPr lang="en-US" sz="4800" dirty="0" err="1">
+                <a:solidFill>
+                  <a:schemeClr val="tx1"/>
+                </a:solidFill>
+                <a:latin typeface="Source Sans Pro" charset="0"/>
+                <a:ea typeface="Source Sans Pro" charset="0"/>
+                <a:cs typeface="Source Sans Pro" charset="0"/>
+              </a:rPr>
+              <a:t>wb</a:t>
+            </a:r>
+            <a:r>
+              <a:rPr lang="en-US" sz="4800" dirty="0">
+                <a:solidFill>
+                  <a:schemeClr val="tx1"/>
+                </a:solidFill>
+                <a:latin typeface="Source Sans Pro" charset="0"/>
+                <a:ea typeface="Source Sans Pro" charset="0"/>
+                <a:cs typeface="Source Sans Pro" charset="0"/>
+              </a:rPr>
+              <a:t> bus implementation</a:t>
+            </a:r>
+            <a:br>
+              <a:rPr lang="en-US" sz="4800" dirty="0">
+                <a:solidFill>
+                  <a:schemeClr val="tx1"/>
+                </a:solidFill>
+                <a:latin typeface="Source Sans Pro" charset="0"/>
+                <a:ea typeface="Source Sans Pro" charset="0"/>
+                <a:cs typeface="Source Sans Pro" charset="0"/>
+              </a:rPr>
+            </a:br>
+            <a:r>
+              <a:rPr lang="en-US" sz="4800" dirty="0">
+                <a:solidFill>
+                  <a:schemeClr val="tx1"/>
+                </a:solidFill>
+                <a:latin typeface="Source Sans Pro" charset="0"/>
+                <a:ea typeface="Source Sans Pro" charset="0"/>
+                <a:cs typeface="Source Sans Pro" charset="0"/>
+              </a:rPr>
+              <a:t>b)</a:t>
+            </a:r>
+            <a:r>
+              <a:rPr lang="en-US" sz="4800" dirty="0" err="1">
+                <a:solidFill>
+                  <a:schemeClr val="tx1"/>
+                </a:solidFill>
+                <a:latin typeface="Source Sans Pro" charset="0"/>
+                <a:ea typeface="Source Sans Pro" charset="0"/>
+                <a:cs typeface="Source Sans Pro" charset="0"/>
+              </a:rPr>
+              <a:t>efabless</a:t>
+            </a:r>
+            <a:r>
+              <a:rPr lang="en-US" sz="4800" dirty="0">
+                <a:solidFill>
+                  <a:schemeClr val="tx1"/>
+                </a:solidFill>
+                <a:latin typeface="Source Sans Pro" charset="0"/>
+                <a:ea typeface="Source Sans Pro" charset="0"/>
+                <a:cs typeface="Source Sans Pro" charset="0"/>
+              </a:rPr>
+              <a:t> </a:t>
+            </a:r>
+            <a:r>
+              <a:rPr lang="en-US" sz="4800" dirty="0">
+                <a:solidFill>
+                  <a:schemeClr val="tx1"/>
+                </a:solidFill>
+                <a:latin typeface="Source Sans Pro" charset="0"/>
+                <a:ea typeface="Source Sans Pro" charset="0"/>
+                <a:cs typeface="Source Sans Pro" charset="0"/>
+                <a:hlinkClick r:id="rId2"/>
+              </a:rPr>
+              <a:t>Caravel</a:t>
+            </a:r>
+            <a:r>
+              <a:rPr lang="en-US" sz="4800" dirty="0">
+                <a:solidFill>
+                  <a:schemeClr val="tx1"/>
+                </a:solidFill>
+                <a:latin typeface="Source Sans Pro" charset="0"/>
+                <a:ea typeface="Source Sans Pro" charset="0"/>
+                <a:cs typeface="Source Sans Pro" charset="0"/>
+              </a:rPr>
+              <a:t> project</a:t>
+            </a:r>
+          </a:p>
+        </p:txBody>
+      </p:sp>
+      <p:sp>
+        <p:nvSpPr>
+          <p:cNvPr id="4" name="TextBox 3">
+            <a:extLst>
+              <a:ext uri="{FF2B5EF4-FFF2-40B4-BE49-F238E27FC236}">
+                <a16:creationId xmlns:a16="http://schemas.microsoft.com/office/drawing/2014/main" id="{C8DC06CC-1F09-4301-23B7-FA1CC8459899}"/>
+              </a:ext>
+            </a:extLst>
+          </p:cNvPr>
+          <p:cNvSpPr txBox="1"/>
+          <p:nvPr/>
+        </p:nvSpPr>
+        <p:spPr>
+          <a:xfrm>
+            <a:off x="1971366" y="580148"/>
+            <a:ext cx="7900086" cy="4508927"/>
+          </a:xfrm>
+          <a:prstGeom prst="rect">
+            <a:avLst/>
+          </a:prstGeom>
+          <a:noFill/>
+        </p:spPr>
+        <p:txBody>
+          <a:bodyPr wrap="square" rtlCol="0">
+            <a:spAutoFit/>
+          </a:bodyPr>
+          <a:lstStyle/>
+          <a:p>
+            <a:pPr algn="ctr"/>
+            <a:r>
+              <a:rPr lang="en-US" sz="28700" dirty="0">
                 <a:solidFill>
                   <a:srgbClr val="00AAD4"/>
                 </a:solidFill>
                 <a:latin typeface="Source Sans Pro" charset="0"/>
                 <a:ea typeface="Source Sans Pro" charset="0"/>
                 <a:cs typeface="Source Sans Pro" charset="0"/>
-              </a:endParaRPr>
-            </a:p>
-          </p:txBody>
-        </p:sp>
-      </p:grpSp>
+              </a:rPr>
+              <a:t>2</a:t>
+            </a:r>
+            <a:r>
+              <a:rPr lang="en-US" sz="11500" baseline="30000" dirty="0">
+                <a:solidFill>
+                  <a:srgbClr val="00AAD4"/>
+                </a:solidFill>
+                <a:latin typeface="Source Sans Pro" charset="0"/>
+                <a:ea typeface="Source Sans Pro" charset="0"/>
+                <a:cs typeface="Source Sans Pro" charset="0"/>
+              </a:rPr>
+              <a:t>st</a:t>
+            </a:r>
+            <a:r>
+              <a:rPr lang="en-US" sz="11500" dirty="0">
+                <a:solidFill>
+                  <a:srgbClr val="00AAD4"/>
+                </a:solidFill>
+                <a:latin typeface="Source Sans Pro" charset="0"/>
+                <a:ea typeface="Source Sans Pro" charset="0"/>
+                <a:cs typeface="Source Sans Pro" charset="0"/>
+              </a:rPr>
+              <a:t> design</a:t>
+            </a:r>
+            <a:endParaRPr lang="en-US" sz="3000" dirty="0">
+              <a:solidFill>
+                <a:srgbClr val="00AAD4"/>
+              </a:solidFill>
+              <a:latin typeface="Source Sans Pro" charset="0"/>
+              <a:ea typeface="Source Sans Pro" charset="0"/>
+              <a:cs typeface="Source Sans Pro" charset="0"/>
+            </a:endParaRPr>
+          </a:p>
+        </p:txBody>
+      </p:sp>
       <p:pic>
         <p:nvPicPr>
           <p:cNvPr id="5" name="Graphic 4">
@@ -4875,7 +4899,7 @@
         <p:spPr>
           <a:xfrm>
             <a:off x="2164716" y="2024768"/>
-            <a:ext cx="4571999" cy="3970318"/>
+            <a:ext cx="4571999" cy="3693319"/>
           </a:xfrm>
           <a:prstGeom prst="rect">
             <a:avLst/>
@@ -4948,13 +4972,6 @@
               <a:rPr lang="en-US" dirty="0"/>
               <a:t> ) all over the world.</a:t>
             </a:r>
-          </a:p>
-          <a:p>
-            <a:pPr marL="285750" indent="-285750">
-              <a:buFont typeface="Arial" panose="020B0604020202020204" pitchFamily="34" charset="0"/>
-              <a:buChar char="•"/>
-            </a:pPr>
-            <a:endParaRPr lang="en-US" dirty="0"/>
           </a:p>
           <a:p>
             <a:pPr marL="285750" indent="-285750">
@@ -5118,219 +5135,12 @@
           <a:chExt cx="0" cy="0"/>
         </a:xfrm>
       </p:grpSpPr>
-      <p:sp>
-        <p:nvSpPr>
-          <p:cNvPr id="5" name="TextBox 4">
-            <a:extLst>
-              <a:ext uri="{FF2B5EF4-FFF2-40B4-BE49-F238E27FC236}">
-                <a16:creationId xmlns:a16="http://schemas.microsoft.com/office/drawing/2014/main" id="{E2308F48-B0D3-AE91-5941-08B0983DAA89}"/>
-              </a:ext>
-            </a:extLst>
-          </p:cNvPr>
-          <p:cNvSpPr txBox="1"/>
-          <p:nvPr/>
-        </p:nvSpPr>
-        <p:spPr>
-          <a:xfrm>
-            <a:off x="5326551" y="53259"/>
-            <a:ext cx="2068969" cy="830997"/>
-          </a:xfrm>
-          <a:prstGeom prst="rect">
-            <a:avLst/>
-          </a:prstGeom>
-          <a:noFill/>
-        </p:spPr>
-        <p:txBody>
-          <a:bodyPr wrap="square" rtlCol="0">
-            <a:spAutoFit/>
-          </a:bodyPr>
-          <a:lstStyle/>
-          <a:p>
-            <a:r>
-              <a:rPr lang="en-US" sz="4800" dirty="0" err="1">
-                <a:latin typeface="Arial Black" panose="020B0A04020102020204" pitchFamily="34" charset="0"/>
-              </a:rPr>
-              <a:t>P.o.C.</a:t>
-            </a:r>
-            <a:endParaRPr lang="el-GR" sz="4800" dirty="0">
-              <a:latin typeface="Arial Black" panose="020B0A04020102020204" pitchFamily="34" charset="0"/>
-            </a:endParaRPr>
-          </a:p>
-        </p:txBody>
-      </p:sp>
-      <p:sp>
-        <p:nvSpPr>
-          <p:cNvPr id="7" name="TextBox 6">
-            <a:extLst>
-              <a:ext uri="{FF2B5EF4-FFF2-40B4-BE49-F238E27FC236}">
-                <a16:creationId xmlns:a16="http://schemas.microsoft.com/office/drawing/2014/main" id="{12FA1DD5-C1C5-8F1E-0C4A-0B058A309DA7}"/>
-              </a:ext>
-            </a:extLst>
-          </p:cNvPr>
-          <p:cNvSpPr txBox="1"/>
-          <p:nvPr/>
-        </p:nvSpPr>
-        <p:spPr>
-          <a:xfrm>
-            <a:off x="848418" y="1161776"/>
-            <a:ext cx="8447982" cy="369332"/>
-          </a:xfrm>
-          <a:prstGeom prst="rect">
-            <a:avLst/>
-          </a:prstGeom>
-          <a:noFill/>
-        </p:spPr>
-        <p:txBody>
-          <a:bodyPr wrap="square" rtlCol="0">
-            <a:spAutoFit/>
-          </a:bodyPr>
-          <a:lstStyle/>
-          <a:p>
-            <a:pPr algn="ctr"/>
-            <a:r>
-              <a:rPr lang="en-US" dirty="0">
-                <a:hlinkClick r:id="rId2"/>
-              </a:rPr>
-              <a:t>Prompt : https://chat.openai.com/share/89c53be5-10bf-4ecc-859a-894b3ae967c2</a:t>
-            </a:r>
-            <a:endParaRPr lang="el-GR" dirty="0"/>
-          </a:p>
-        </p:txBody>
-      </p:sp>
-      <p:sp>
-        <p:nvSpPr>
-          <p:cNvPr id="12" name="TextBox 11">
-            <a:extLst>
-              <a:ext uri="{FF2B5EF4-FFF2-40B4-BE49-F238E27FC236}">
-                <a16:creationId xmlns:a16="http://schemas.microsoft.com/office/drawing/2014/main" id="{2EFB3D60-CE82-A974-B9C2-20BE161E7FDC}"/>
-              </a:ext>
-            </a:extLst>
-          </p:cNvPr>
-          <p:cNvSpPr txBox="1"/>
-          <p:nvPr/>
-        </p:nvSpPr>
-        <p:spPr>
-          <a:xfrm>
-            <a:off x="530289" y="756889"/>
-            <a:ext cx="3043334" cy="369332"/>
-          </a:xfrm>
-          <a:prstGeom prst="rect">
-            <a:avLst/>
-          </a:prstGeom>
-          <a:noFill/>
-        </p:spPr>
-        <p:txBody>
-          <a:bodyPr wrap="square" rtlCol="0">
-            <a:spAutoFit/>
-          </a:bodyPr>
-          <a:lstStyle/>
-          <a:p>
-            <a:r>
-              <a:rPr lang="en-US" dirty="0"/>
-              <a:t>Classic Wishbone Bus design </a:t>
-            </a:r>
-            <a:endParaRPr lang="el-GR" dirty="0"/>
-          </a:p>
-        </p:txBody>
-      </p:sp>
-      <p:sp>
-        <p:nvSpPr>
-          <p:cNvPr id="6" name="TextBox 5">
-            <a:extLst>
-              <a:ext uri="{FF2B5EF4-FFF2-40B4-BE49-F238E27FC236}">
-                <a16:creationId xmlns:a16="http://schemas.microsoft.com/office/drawing/2014/main" id="{CB63F937-D3A8-5A2B-F660-C16B970FDAA6}"/>
-              </a:ext>
-            </a:extLst>
-          </p:cNvPr>
-          <p:cNvSpPr txBox="1"/>
-          <p:nvPr/>
-        </p:nvSpPr>
-        <p:spPr>
-          <a:xfrm>
-            <a:off x="1114425" y="2035933"/>
-            <a:ext cx="3652838" cy="369332"/>
-          </a:xfrm>
-          <a:prstGeom prst="rect">
-            <a:avLst/>
-          </a:prstGeom>
-          <a:noFill/>
-        </p:spPr>
-        <p:txBody>
-          <a:bodyPr wrap="square" rtlCol="0">
-            <a:spAutoFit/>
-          </a:bodyPr>
-          <a:lstStyle/>
-          <a:p>
-            <a:r>
-              <a:rPr lang="en-US" dirty="0"/>
-              <a:t>Simulation: (</a:t>
-            </a:r>
-            <a:r>
-              <a:rPr lang="en-US" dirty="0">
-                <a:hlinkClick r:id="rId3"/>
-              </a:rPr>
-              <a:t>Code and Simulation</a:t>
-            </a:r>
-            <a:r>
-              <a:rPr lang="en-US" dirty="0"/>
-              <a:t>)</a:t>
-            </a:r>
-            <a:endParaRPr lang="el-GR" dirty="0"/>
-          </a:p>
-        </p:txBody>
-      </p:sp>
-      <p:sp>
-        <p:nvSpPr>
-          <p:cNvPr id="10" name="TextBox 9">
-            <a:extLst>
-              <a:ext uri="{FF2B5EF4-FFF2-40B4-BE49-F238E27FC236}">
-                <a16:creationId xmlns:a16="http://schemas.microsoft.com/office/drawing/2014/main" id="{750194F1-3A7A-5780-D870-7200AABC321E}"/>
-              </a:ext>
-            </a:extLst>
-          </p:cNvPr>
-          <p:cNvSpPr txBox="1"/>
-          <p:nvPr/>
-        </p:nvSpPr>
-        <p:spPr>
-          <a:xfrm>
-            <a:off x="1114425" y="4425434"/>
-            <a:ext cx="4572000" cy="369332"/>
-          </a:xfrm>
-          <a:prstGeom prst="rect">
-            <a:avLst/>
-          </a:prstGeom>
-          <a:noFill/>
-        </p:spPr>
-        <p:txBody>
-          <a:bodyPr wrap="square" rtlCol="0">
-            <a:spAutoFit/>
-          </a:bodyPr>
-          <a:lstStyle/>
-          <a:p>
-            <a:r>
-              <a:rPr lang="en-US" dirty="0"/>
-              <a:t>Simulation with Trojan (</a:t>
-            </a:r>
-            <a:r>
-              <a:rPr lang="en-US" dirty="0">
-                <a:hlinkClick r:id="rId4"/>
-              </a:rPr>
-              <a:t>Code and Simulation</a:t>
-            </a:r>
-            <a:r>
-              <a:rPr lang="en-US" dirty="0"/>
-              <a:t>):</a:t>
-            </a:r>
-            <a:endParaRPr lang="el-GR" dirty="0"/>
-          </a:p>
-        </p:txBody>
-      </p:sp>
       <p:pic>
         <p:nvPicPr>
-          <p:cNvPr id="14" name="Picture 13">
-            <a:extLst>
-              <a:ext uri="{FF2B5EF4-FFF2-40B4-BE49-F238E27FC236}">
-                <a16:creationId xmlns:a16="http://schemas.microsoft.com/office/drawing/2014/main" id="{FD8507D1-84E1-8808-2AF5-EE80A44EA3BC}"/>
+          <p:cNvPr id="2" name="Graphic 1">
+            <a:extLst>
+              <a:ext uri="{FF2B5EF4-FFF2-40B4-BE49-F238E27FC236}">
+                <a16:creationId xmlns:a16="http://schemas.microsoft.com/office/drawing/2014/main" id="{7934EAE0-B4A2-C924-119E-0AA2E4F0CFE0}"/>
               </a:ext>
             </a:extLst>
           </p:cNvPr>
@@ -5340,15 +5150,21 @@
           <p:nvPr/>
         </p:nvPicPr>
         <p:blipFill>
-          <a:blip r:embed="rId5"/>
+          <a:blip r:embed="rId2">
+            <a:extLst>
+              <a:ext uri="{96DAC541-7B7A-43D3-8B79-37D633B846F1}">
+                <asvg:svgBlip xmlns:asvg="http://schemas.microsoft.com/office/drawing/2016/SVG/main" r:embed="rId3"/>
+              </a:ext>
+            </a:extLst>
+          </a:blip>
           <a:stretch>
             <a:fillRect/>
           </a:stretch>
         </p:blipFill>
         <p:spPr>
           <a:xfrm>
-            <a:off x="646035" y="2484315"/>
-            <a:ext cx="11430000" cy="1873373"/>
+            <a:off x="-578735" y="2983170"/>
+            <a:ext cx="13689573" cy="6858000"/>
           </a:xfrm>
           <a:prstGeom prst="rect">
             <a:avLst/>
@@ -5357,10 +5173,10 @@
       </p:pic>
       <p:pic>
         <p:nvPicPr>
-          <p:cNvPr id="16" name="Picture 15">
-            <a:extLst>
-              <a:ext uri="{FF2B5EF4-FFF2-40B4-BE49-F238E27FC236}">
-                <a16:creationId xmlns:a16="http://schemas.microsoft.com/office/drawing/2014/main" id="{9389A261-614B-7013-D682-5E6D5EB71300}"/>
+          <p:cNvPr id="3" name="Graphic 5">
+            <a:extLst>
+              <a:ext uri="{FF2B5EF4-FFF2-40B4-BE49-F238E27FC236}">
+                <a16:creationId xmlns:a16="http://schemas.microsoft.com/office/drawing/2014/main" id="{09AADF04-87BA-5444-1F51-4F6C5B6ED603}"/>
               </a:ext>
             </a:extLst>
           </p:cNvPr>
@@ -5370,25 +5186,309 @@
           <p:nvPr/>
         </p:nvPicPr>
         <p:blipFill>
-          <a:blip r:embed="rId6"/>
+          <a:blip r:embed="rId4">
+            <a:extLst>
+              <a:ext uri="{96DAC541-7B7A-43D3-8B79-37D633B846F1}">
+                <asvg:svgBlip xmlns:asvg="http://schemas.microsoft.com/office/drawing/2016/SVG/main" r:embed="rId5"/>
+              </a:ext>
+            </a:extLst>
+          </a:blip>
           <a:stretch>
             <a:fillRect/>
           </a:stretch>
         </p:blipFill>
         <p:spPr>
           <a:xfrm>
-            <a:off x="646034" y="4862513"/>
-            <a:ext cx="11429999" cy="1582278"/>
+            <a:off x="-5530732" y="-3526386"/>
+            <a:ext cx="11061463" cy="6858000"/>
           </a:xfrm>
           <a:prstGeom prst="rect">
             <a:avLst/>
           </a:prstGeom>
         </p:spPr>
       </p:pic>
+      <p:sp>
+        <p:nvSpPr>
+          <p:cNvPr id="4" name="TextBox 3">
+            <a:extLst>
+              <a:ext uri="{FF2B5EF4-FFF2-40B4-BE49-F238E27FC236}">
+                <a16:creationId xmlns:a16="http://schemas.microsoft.com/office/drawing/2014/main" id="{B65AFF8D-FD1F-DC97-494C-859AA613F08F}"/>
+              </a:ext>
+            </a:extLst>
+          </p:cNvPr>
+          <p:cNvSpPr txBox="1"/>
+          <p:nvPr/>
+        </p:nvSpPr>
+        <p:spPr>
+          <a:xfrm>
+            <a:off x="3254683" y="1118898"/>
+            <a:ext cx="8122298" cy="461665"/>
+          </a:xfrm>
+          <a:prstGeom prst="rect">
+            <a:avLst/>
+          </a:prstGeom>
+          <a:noFill/>
+        </p:spPr>
+        <p:txBody>
+          <a:bodyPr wrap="square" rtlCol="0">
+            <a:spAutoFit/>
+          </a:bodyPr>
+          <a:lstStyle/>
+          <a:p>
+            <a:r>
+              <a:rPr lang="en-US" sz="2400" dirty="0">
+                <a:latin typeface="Arial Black" panose="020B0A04020102020204" pitchFamily="34" charset="0"/>
+              </a:rPr>
+              <a:t>Simple (AI gen.)wishbone bus </a:t>
+            </a:r>
+            <a:r>
+              <a:rPr lang="en-US" sz="2400" dirty="0" err="1">
+                <a:latin typeface="Arial Black" panose="020B0A04020102020204" pitchFamily="34" charset="0"/>
+              </a:rPr>
+              <a:t>D.ο.S</a:t>
+            </a:r>
+            <a:r>
+              <a:rPr lang="en-US" sz="2400" dirty="0">
+                <a:latin typeface="Arial Black" panose="020B0A04020102020204" pitchFamily="34" charset="0"/>
+              </a:rPr>
+              <a:t>. </a:t>
+            </a:r>
+            <a:r>
+              <a:rPr lang="en-US" sz="2400" dirty="0" err="1">
+                <a:latin typeface="Arial Black" panose="020B0A04020102020204" pitchFamily="34" charset="0"/>
+              </a:rPr>
+              <a:t>hw</a:t>
+            </a:r>
+            <a:r>
+              <a:rPr lang="en-US" sz="2400" dirty="0">
+                <a:latin typeface="Arial Black" panose="020B0A04020102020204" pitchFamily="34" charset="0"/>
+              </a:rPr>
+              <a:t> trojan</a:t>
+            </a:r>
+            <a:endParaRPr lang="el-GR" sz="2400" dirty="0">
+              <a:latin typeface="Arial Black" panose="020B0A04020102020204" pitchFamily="34" charset="0"/>
+            </a:endParaRPr>
+          </a:p>
+        </p:txBody>
+      </p:sp>
+      <p:sp>
+        <p:nvSpPr>
+          <p:cNvPr id="5" name="TextBox 4">
+            <a:extLst>
+              <a:ext uri="{FF2B5EF4-FFF2-40B4-BE49-F238E27FC236}">
+                <a16:creationId xmlns:a16="http://schemas.microsoft.com/office/drawing/2014/main" id="{5C3D2B3C-4C8A-18CE-07D8-D6660A2E116F}"/>
+              </a:ext>
+            </a:extLst>
+          </p:cNvPr>
+          <p:cNvSpPr txBox="1"/>
+          <p:nvPr/>
+        </p:nvSpPr>
+        <p:spPr>
+          <a:xfrm>
+            <a:off x="3091841" y="1618976"/>
+            <a:ext cx="8447982" cy="369332"/>
+          </a:xfrm>
+          <a:prstGeom prst="rect">
+            <a:avLst/>
+          </a:prstGeom>
+          <a:noFill/>
+        </p:spPr>
+        <p:txBody>
+          <a:bodyPr wrap="square" rtlCol="0">
+            <a:spAutoFit/>
+          </a:bodyPr>
+          <a:lstStyle/>
+          <a:p>
+            <a:pPr algn="ctr"/>
+            <a:r>
+              <a:rPr lang="en-US" dirty="0">
+                <a:hlinkClick r:id="rId6"/>
+              </a:rPr>
+              <a:t>Prompt : https://chat.openai.com/share/89c53be5-10bf-4ecc-859a-894b3ae967c2</a:t>
+            </a:r>
+            <a:endParaRPr lang="el-GR" dirty="0"/>
+          </a:p>
+        </p:txBody>
+      </p:sp>
+      <p:sp>
+        <p:nvSpPr>
+          <p:cNvPr id="7" name="TextBox 6">
+            <a:extLst>
+              <a:ext uri="{FF2B5EF4-FFF2-40B4-BE49-F238E27FC236}">
+                <a16:creationId xmlns:a16="http://schemas.microsoft.com/office/drawing/2014/main" id="{EB06E012-509D-C7D3-63CB-7D6AB5FBBFCF}"/>
+              </a:ext>
+            </a:extLst>
+          </p:cNvPr>
+          <p:cNvSpPr txBox="1"/>
+          <p:nvPr/>
+        </p:nvSpPr>
+        <p:spPr>
+          <a:xfrm>
+            <a:off x="934083" y="3176847"/>
+            <a:ext cx="5697758" cy="1754326"/>
+          </a:xfrm>
+          <a:prstGeom prst="rect">
+            <a:avLst/>
+          </a:prstGeom>
+          <a:noFill/>
+        </p:spPr>
+        <p:txBody>
+          <a:bodyPr wrap="square" rtlCol="0">
+            <a:spAutoFit/>
+          </a:bodyPr>
+          <a:lstStyle/>
+          <a:p>
+            <a:r>
+              <a:rPr lang="en-US" dirty="0"/>
+              <a:t>This is design is simple wishbone bus peripheral in Verilog.</a:t>
+            </a:r>
+          </a:p>
+          <a:p>
+            <a:pPr marL="285750" indent="-285750">
+              <a:buFont typeface="Arial" panose="020B0604020202020204" pitchFamily="34" charset="0"/>
+              <a:buChar char="•"/>
+            </a:pPr>
+            <a:r>
+              <a:rPr lang="en-US" dirty="0"/>
+              <a:t>We added the functionality of a trigger inside the state machine inserted in the </a:t>
+            </a:r>
+            <a:r>
+              <a:rPr lang="en-US" dirty="0" err="1"/>
+              <a:t>wb</a:t>
+            </a:r>
+            <a:r>
+              <a:rPr lang="en-US" dirty="0"/>
+              <a:t> bus core. </a:t>
+            </a:r>
+          </a:p>
+          <a:p>
+            <a:pPr marL="285750" indent="-285750">
+              <a:buFont typeface="Arial" panose="020B0604020202020204" pitchFamily="34" charset="0"/>
+              <a:buChar char="•"/>
+            </a:pPr>
+            <a:r>
+              <a:rPr lang="en-US" dirty="0"/>
+              <a:t>The state machine seeks the sequence of  </a:t>
+            </a:r>
+            <a:r>
+              <a:rPr lang="en-US" b="1" i="1" dirty="0"/>
+              <a:t>32'hCAFEBABE</a:t>
+            </a:r>
+            <a:r>
+              <a:rPr lang="en-US" dirty="0"/>
+              <a:t>. </a:t>
+            </a:r>
+          </a:p>
+          <a:p>
+            <a:pPr marL="285750" indent="-285750">
+              <a:buFont typeface="Arial" panose="020B0604020202020204" pitchFamily="34" charset="0"/>
+              <a:buChar char="•"/>
+            </a:pPr>
+            <a:r>
+              <a:rPr lang="en-US" dirty="0"/>
+              <a:t>After state activation any transmission is blocked and a</a:t>
+            </a:r>
+            <a:endParaRPr lang="en-US" b="1" dirty="0">
+              <a:solidFill>
+                <a:srgbClr val="FF0000"/>
+              </a:solidFill>
+            </a:endParaRPr>
+          </a:p>
+        </p:txBody>
+      </p:sp>
+      <p:sp>
+        <p:nvSpPr>
+          <p:cNvPr id="8" name="TextBox 7">
+            <a:extLst>
+              <a:ext uri="{FF2B5EF4-FFF2-40B4-BE49-F238E27FC236}">
+                <a16:creationId xmlns:a16="http://schemas.microsoft.com/office/drawing/2014/main" id="{215FB6CA-1581-E03E-E864-6281A10F108C}"/>
+              </a:ext>
+            </a:extLst>
+          </p:cNvPr>
+          <p:cNvSpPr txBox="1"/>
+          <p:nvPr/>
+        </p:nvSpPr>
+        <p:spPr>
+          <a:xfrm>
+            <a:off x="6843524" y="2983170"/>
+            <a:ext cx="5147254" cy="2031325"/>
+          </a:xfrm>
+          <a:prstGeom prst="rect">
+            <a:avLst/>
+          </a:prstGeom>
+          <a:noFill/>
+        </p:spPr>
+        <p:txBody>
+          <a:bodyPr wrap="square" rtlCol="0">
+            <a:spAutoFit/>
+          </a:bodyPr>
+          <a:lstStyle/>
+          <a:p>
+            <a:r>
+              <a:rPr lang="en-US" b="1" dirty="0"/>
+              <a:t>Severity of the vulnerability</a:t>
+            </a:r>
+          </a:p>
+          <a:p>
+            <a:endParaRPr lang="en-US" dirty="0"/>
+          </a:p>
+          <a:p>
+            <a:pPr marL="285750" indent="-285750">
+              <a:buFont typeface="Arial" panose="020B0604020202020204" pitchFamily="34" charset="0"/>
+              <a:buChar char="•"/>
+            </a:pPr>
+            <a:r>
+              <a:rPr lang="en-US" dirty="0"/>
+              <a:t>Insertion phase: Design</a:t>
+            </a:r>
+          </a:p>
+          <a:p>
+            <a:pPr marL="285750" indent="-285750">
+              <a:buFont typeface="Arial" panose="020B0604020202020204" pitchFamily="34" charset="0"/>
+              <a:buChar char="•"/>
+            </a:pPr>
+            <a:r>
+              <a:rPr lang="en-US" dirty="0"/>
+              <a:t>Abstraction level: Register‐transfer level (RTL)</a:t>
+            </a:r>
+          </a:p>
+          <a:p>
+            <a:pPr marL="285750" indent="-285750" algn="just">
+              <a:buFont typeface="Arial" panose="020B0604020202020204" pitchFamily="34" charset="0"/>
+              <a:buChar char="•"/>
+            </a:pPr>
+            <a:r>
+              <a:rPr lang="en-US" dirty="0"/>
+              <a:t>Act. mechanism: Conditionally triggered</a:t>
+            </a:r>
+          </a:p>
+          <a:p>
+            <a:pPr marL="285750" indent="-285750">
+              <a:buFont typeface="Arial" panose="020B0604020202020204" pitchFamily="34" charset="0"/>
+              <a:buChar char="•"/>
+            </a:pPr>
+            <a:r>
+              <a:rPr lang="en-US" dirty="0"/>
+              <a:t>Functional Effects: Denial of service</a:t>
+            </a:r>
+          </a:p>
+          <a:p>
+            <a:pPr marL="285750" indent="-285750">
+              <a:buFont typeface="Arial" panose="020B0604020202020204" pitchFamily="34" charset="0"/>
+              <a:buChar char="•"/>
+            </a:pPr>
+            <a:r>
+              <a:rPr lang="en-US" dirty="0"/>
+              <a:t>Physical characteristics: Functional</a:t>
+            </a:r>
+            <a:endParaRPr lang="el-GR" dirty="0"/>
+          </a:p>
+        </p:txBody>
+      </p:sp>
     </p:spTree>
     <p:extLst>
       <p:ext uri="{BB962C8B-B14F-4D97-AF65-F5344CB8AC3E}">
-        <p14:creationId xmlns:p14="http://schemas.microsoft.com/office/powerpoint/2010/main" val="224366493"/>
+        <p14:creationId xmlns:p14="http://schemas.microsoft.com/office/powerpoint/2010/main" val="2559688863"/>
       </p:ext>
     </p:extLst>
   </p:cSld>
@@ -5417,10 +5517,10 @@
       </p:grpSpPr>
       <p:sp>
         <p:nvSpPr>
-          <p:cNvPr id="2" name="TextBox 1">
-            <a:extLst>
-              <a:ext uri="{FF2B5EF4-FFF2-40B4-BE49-F238E27FC236}">
-                <a16:creationId xmlns:a16="http://schemas.microsoft.com/office/drawing/2014/main" id="{460B2A20-4D91-3DEA-06FB-25041B66BA70}"/>
+          <p:cNvPr id="5" name="TextBox 4">
+            <a:extLst>
+              <a:ext uri="{FF2B5EF4-FFF2-40B4-BE49-F238E27FC236}">
+                <a16:creationId xmlns:a16="http://schemas.microsoft.com/office/drawing/2014/main" id="{E2308F48-B0D3-AE91-5941-08B0983DAA89}"/>
               </a:ext>
             </a:extLst>
           </p:cNvPr>
@@ -5429,8 +5529,8 @@
         </p:nvSpPr>
         <p:spPr>
           <a:xfrm>
-            <a:off x="786641" y="673417"/>
-            <a:ext cx="5831633" cy="461665"/>
+            <a:off x="5326551" y="53259"/>
+            <a:ext cx="2068969" cy="830997"/>
           </a:xfrm>
           <a:prstGeom prst="rect">
             <a:avLst/>
@@ -5444,12 +5544,12 @@
           <a:lstStyle/>
           <a:p>
             <a:r>
-              <a:rPr lang="en-US" sz="2400" dirty="0">
+              <a:rPr lang="en-US" sz="4800" dirty="0" err="1">
                 <a:latin typeface="Arial Black" panose="020B0A04020102020204" pitchFamily="34" charset="0"/>
               </a:rPr>
-              <a:t>Why attack the Caravel project?</a:t>
-            </a:r>
-            <a:endParaRPr lang="el-GR" sz="2400" dirty="0">
+              <a:t>P.o.C.</a:t>
+            </a:r>
+            <a:endParaRPr lang="el-GR" sz="4800" dirty="0">
               <a:latin typeface="Arial Black" panose="020B0A04020102020204" pitchFamily="34" charset="0"/>
             </a:endParaRPr>
           </a:p>
@@ -5457,55 +5557,86 @@
       </p:sp>
       <p:pic>
         <p:nvPicPr>
-          <p:cNvPr id="10242" name="Picture 2" descr="Maverick-603 - ChipIgnite Status and New Maverick Video">
-            <a:extLst>
-              <a:ext uri="{FF2B5EF4-FFF2-40B4-BE49-F238E27FC236}">
-                <a16:creationId xmlns:a16="http://schemas.microsoft.com/office/drawing/2014/main" id="{2756451B-D0C3-2A08-5B03-BDF56C36A641}"/>
+          <p:cNvPr id="14" name="Picture 13">
+            <a:extLst>
+              <a:ext uri="{FF2B5EF4-FFF2-40B4-BE49-F238E27FC236}">
+                <a16:creationId xmlns:a16="http://schemas.microsoft.com/office/drawing/2014/main" id="{FD8507D1-84E1-8808-2AF5-EE80A44EA3BC}"/>
               </a:ext>
             </a:extLst>
           </p:cNvPr>
           <p:cNvPicPr>
-            <a:picLocks noChangeAspect="1" noChangeArrowheads="1"/>
+            <a:picLocks noChangeAspect="1"/>
           </p:cNvPicPr>
           <p:nvPr/>
         </p:nvPicPr>
-        <p:blipFill rotWithShape="1">
-          <a:blip r:embed="rId2">
-            <a:extLst>
-              <a:ext uri="{28A0092B-C50C-407E-A947-70E740481C1C}">
-                <a14:useLocalDpi xmlns:a14="http://schemas.microsoft.com/office/drawing/2010/main" val="0"/>
-              </a:ext>
-            </a:extLst>
-          </a:blip>
-          <a:srcRect l="66389" t="7683" r="2194" b="4649"/>
-          <a:stretch/>
+        <p:blipFill>
+          <a:blip r:embed="rId2"/>
+          <a:stretch>
+            <a:fillRect/>
+          </a:stretch>
         </p:blipFill>
-        <p:spPr bwMode="auto">
-          <a:xfrm>
-            <a:off x="7655767" y="1401924"/>
-            <a:ext cx="3084762" cy="4054151"/>
+        <p:spPr>
+          <a:xfrm>
+            <a:off x="436096" y="4931368"/>
+            <a:ext cx="11430000" cy="1873373"/>
+          </a:xfrm>
+          <a:prstGeom prst="rect">
+            <a:avLst/>
+          </a:prstGeom>
+        </p:spPr>
+      </p:pic>
+      <p:sp>
+        <p:nvSpPr>
+          <p:cNvPr id="2" name="TextBox 1">
+            <a:extLst>
+              <a:ext uri="{FF2B5EF4-FFF2-40B4-BE49-F238E27FC236}">
+                <a16:creationId xmlns:a16="http://schemas.microsoft.com/office/drawing/2014/main" id="{60BC2B53-90D2-C0F0-ECF2-84D46305991F}"/>
+              </a:ext>
+            </a:extLst>
+          </p:cNvPr>
+          <p:cNvSpPr txBox="1"/>
+          <p:nvPr/>
+        </p:nvSpPr>
+        <p:spPr>
+          <a:xfrm>
+            <a:off x="488205" y="651974"/>
+            <a:ext cx="4764930" cy="369332"/>
           </a:xfrm>
           <a:prstGeom prst="rect">
             <a:avLst/>
           </a:prstGeom>
           <a:noFill/>
-          <a:extLst>
-            <a:ext uri="{909E8E84-426E-40DD-AFC4-6F175D3DCCD1}">
-              <a14:hiddenFill xmlns:a14="http://schemas.microsoft.com/office/drawing/2010/main">
-                <a:solidFill>
-                  <a:srgbClr val="FFFFFF"/>
-                </a:solidFill>
-              </a14:hiddenFill>
-            </a:ext>
-          </a:extLst>
-        </p:spPr>
-      </p:pic>
+        </p:spPr>
+        <p:txBody>
+          <a:bodyPr wrap="square" rtlCol="0">
+            <a:spAutoFit/>
+          </a:bodyPr>
+          <a:lstStyle/>
+          <a:p>
+            <a:r>
+              <a:rPr lang="en-US" dirty="0"/>
+              <a:t>Simulation without trojan: (</a:t>
+            </a:r>
+            <a:r>
+              <a:rPr lang="en-US" dirty="0">
+                <a:hlinkClick r:id="rId3"/>
+              </a:rPr>
+              <a:t>Code and Simulation</a:t>
+            </a:r>
+            <a:r>
+              <a:rPr lang="en-US" dirty="0"/>
+              <a:t>)</a:t>
+            </a:r>
+            <a:endParaRPr lang="el-GR" dirty="0"/>
+          </a:p>
+        </p:txBody>
+      </p:sp>
       <p:sp>
         <p:nvSpPr>
           <p:cNvPr id="3" name="TextBox 2">
             <a:extLst>
               <a:ext uri="{FF2B5EF4-FFF2-40B4-BE49-F238E27FC236}">
-                <a16:creationId xmlns:a16="http://schemas.microsoft.com/office/drawing/2014/main" id="{AE230A4E-20EA-ED56-A36F-D11C5C4A284D}"/>
+                <a16:creationId xmlns:a16="http://schemas.microsoft.com/office/drawing/2014/main" id="{C24B832F-D9FE-5E20-E011-20BBFDA3EE8E}"/>
               </a:ext>
             </a:extLst>
           </p:cNvPr>
@@ -5514,8 +5645,8 @@
         </p:nvSpPr>
         <p:spPr>
           <a:xfrm>
-            <a:off x="1560443" y="1752600"/>
-            <a:ext cx="6095324" cy="3970318"/>
+            <a:off x="965719" y="1298954"/>
+            <a:ext cx="9965094" cy="3354765"/>
           </a:xfrm>
           <a:prstGeom prst="rect">
             <a:avLst/>
@@ -5529,122 +5660,180 @@
           <a:lstStyle/>
           <a:p>
             <a:r>
-              <a:rPr lang="en-US" dirty="0"/>
-              <a:t>Caravel project:</a:t>
-            </a:r>
-          </a:p>
-          <a:p>
-            <a:endParaRPr lang="en-US" dirty="0"/>
-          </a:p>
-          <a:p>
-            <a:pPr marL="285750" indent="-285750">
-              <a:buFont typeface="Arial" panose="020B0604020202020204" pitchFamily="34" charset="0"/>
-              <a:buChar char="•"/>
-            </a:pPr>
-            <a:r>
-              <a:rPr lang="en-US" dirty="0"/>
-              <a:t>is one of the most influential open-source projects in (open-source) Chip design.</a:t>
-            </a:r>
-          </a:p>
-          <a:p>
-            <a:pPr marL="285750" indent="-285750">
-              <a:buFont typeface="Arial" panose="020B0604020202020204" pitchFamily="34" charset="0"/>
-              <a:buChar char="•"/>
-            </a:pPr>
-            <a:r>
-              <a:rPr lang="en-US" dirty="0"/>
-              <a:t>provides a cost-effective route for ASIC development - it leverages the use of mature and low-cost semiconductor and community-driven development.</a:t>
-            </a:r>
-          </a:p>
-          <a:p>
-            <a:pPr marL="285750" indent="-285750">
-              <a:buFont typeface="Arial" panose="020B0604020202020204" pitchFamily="34" charset="0"/>
-              <a:buChar char="•"/>
-            </a:pPr>
-            <a:r>
-              <a:rPr lang="en-US" dirty="0"/>
-              <a:t>is used substantially in Universities worldwide.</a:t>
-            </a:r>
-          </a:p>
-          <a:p>
-            <a:pPr marL="285750" indent="-285750">
-              <a:buFont typeface="Arial" panose="020B0604020202020204" pitchFamily="34" charset="0"/>
-              <a:buChar char="•"/>
-            </a:pPr>
-            <a:r>
-              <a:rPr lang="en-US" dirty="0"/>
-              <a:t>greatly encourages code reuse, making it easier for designers to integrate existing building blocks and IP cores into their ASIC designs.</a:t>
-            </a:r>
-          </a:p>
-          <a:p>
-            <a:pPr marL="285750" indent="-285750">
-              <a:buFont typeface="Arial" panose="020B0604020202020204" pitchFamily="34" charset="0"/>
-              <a:buChar char="•"/>
-            </a:pPr>
-            <a:r>
-              <a:rPr lang="en-US" dirty="0"/>
-              <a:t>…</a:t>
-            </a:r>
-          </a:p>
-          <a:p>
-            <a:pPr marL="285750" indent="-285750">
-              <a:buFont typeface="Arial" panose="020B0604020202020204" pitchFamily="34" charset="0"/>
-              <a:buChar char="•"/>
-            </a:pPr>
-            <a:endParaRPr lang="en-US" dirty="0"/>
-          </a:p>
-          <a:p>
-            <a:pPr marL="285750" indent="-285750">
-              <a:buFont typeface="Arial" panose="020B0604020202020204" pitchFamily="34" charset="0"/>
-              <a:buChar char="•"/>
-            </a:pPr>
-            <a:endParaRPr lang="el-GR" dirty="0"/>
-          </a:p>
-        </p:txBody>
-      </p:sp>
-      <p:sp>
-        <p:nvSpPr>
-          <p:cNvPr id="4" name="TextBox 3">
-            <a:extLst>
-              <a:ext uri="{FF2B5EF4-FFF2-40B4-BE49-F238E27FC236}">
-                <a16:creationId xmlns:a16="http://schemas.microsoft.com/office/drawing/2014/main" id="{40522EF5-D6A7-CDD1-CA83-2E4FA350554F}"/>
-              </a:ext>
-            </a:extLst>
-          </p:cNvPr>
-          <p:cNvSpPr txBox="1"/>
-          <p:nvPr/>
-        </p:nvSpPr>
-        <p:spPr>
-          <a:xfrm>
-            <a:off x="3195734" y="5352313"/>
-            <a:ext cx="3741780" cy="584775"/>
-          </a:xfrm>
-          <a:prstGeom prst="rect">
-            <a:avLst/>
-          </a:prstGeom>
-          <a:noFill/>
-        </p:spPr>
-        <p:txBody>
-          <a:bodyPr wrap="square" rtlCol="0">
-            <a:spAutoFit/>
-          </a:bodyPr>
-          <a:lstStyle/>
-          <a:p>
-            <a:r>
-              <a:rPr lang="en-US" sz="3200" b="1" dirty="0">
-                <a:solidFill>
-                  <a:srgbClr val="FF0000"/>
-                </a:solidFill>
-              </a:rPr>
-              <a:t>HIGHER IMPACT</a:t>
-            </a:r>
+              <a:rPr lang="en-US" sz="1600" dirty="0"/>
+              <a:t>In this simulation snapshot:</a:t>
+            </a:r>
+          </a:p>
+          <a:p>
+            <a:endParaRPr lang="en-US" sz="1600" dirty="0"/>
+          </a:p>
+          <a:p>
+            <a:r>
+              <a:rPr lang="en-US" sz="1600" dirty="0"/>
+              <a:t>The </a:t>
+            </a:r>
+            <a:r>
+              <a:rPr lang="en-US" sz="1600" b="1" i="1" dirty="0" err="1"/>
+              <a:t>clk</a:t>
+            </a:r>
+            <a:r>
+              <a:rPr lang="en-US" sz="1600" dirty="0"/>
+              <a:t> signal is oscillating as expected, providing the timing reference for all transactions.</a:t>
+            </a:r>
+          </a:p>
+          <a:p>
+            <a:r>
+              <a:rPr lang="en-US" sz="1600" dirty="0"/>
+              <a:t>The </a:t>
+            </a:r>
+            <a:r>
+              <a:rPr lang="en-US" sz="1600" b="1" i="1" dirty="0" err="1"/>
+              <a:t>rst_n</a:t>
+            </a:r>
+            <a:r>
+              <a:rPr lang="en-US" sz="1600" b="1" i="1" dirty="0"/>
+              <a:t> </a:t>
+            </a:r>
+            <a:r>
+              <a:rPr lang="en-US" sz="1600" dirty="0"/>
+              <a:t>signal is initially low, indicating a reset condition, then goes high to start normal operation.</a:t>
+            </a:r>
+          </a:p>
+          <a:p>
+            <a:r>
+              <a:rPr lang="en-US" sz="1600" dirty="0"/>
+              <a:t>The </a:t>
+            </a:r>
+            <a:r>
+              <a:rPr lang="en-US" sz="1600" b="1" i="1" dirty="0" err="1"/>
+              <a:t>adr</a:t>
+            </a:r>
+            <a:r>
+              <a:rPr lang="en-US" sz="1600" dirty="0"/>
+              <a:t> bus changes its value to </a:t>
+            </a:r>
+            <a:r>
+              <a:rPr lang="en-US" sz="1600" i="1" dirty="0"/>
+              <a:t>1, 2,</a:t>
+            </a:r>
+            <a:r>
+              <a:rPr lang="en-US" sz="1600" dirty="0"/>
+              <a:t> and back to </a:t>
+            </a:r>
+            <a:r>
+              <a:rPr lang="en-US" sz="1600" i="1" dirty="0"/>
+              <a:t>1</a:t>
+            </a:r>
+            <a:r>
+              <a:rPr lang="en-US" sz="1600" dirty="0"/>
+              <a:t>, indicating different addresses are being accessed.</a:t>
+            </a:r>
+          </a:p>
+          <a:p>
+            <a:r>
+              <a:rPr lang="en-US" sz="1600" dirty="0"/>
+              <a:t>The </a:t>
+            </a:r>
+            <a:r>
+              <a:rPr lang="en-US" sz="1600" b="1" i="1" dirty="0" err="1"/>
+              <a:t>stb</a:t>
+            </a:r>
+            <a:r>
+              <a:rPr lang="en-US" sz="1600" dirty="0"/>
+              <a:t> and </a:t>
+            </a:r>
+            <a:r>
+              <a:rPr lang="en-US" sz="1600" b="1" i="1" dirty="0" err="1"/>
+              <a:t>cyc</a:t>
+            </a:r>
+            <a:r>
+              <a:rPr lang="en-US" sz="1600" dirty="0"/>
+              <a:t> signals are asserted (high) when there is an active bus transaction.</a:t>
+            </a:r>
+          </a:p>
+          <a:p>
+            <a:r>
+              <a:rPr lang="en-US" sz="1600" dirty="0"/>
+              <a:t>The we signal is not asserted at all, suggesting that the transactions shown are read operations from the perspective of the master.</a:t>
+            </a:r>
+          </a:p>
+          <a:p>
+            <a:r>
+              <a:rPr lang="en-US" sz="1600" dirty="0"/>
+              <a:t>The </a:t>
+            </a:r>
+            <a:r>
+              <a:rPr lang="en-US" sz="1600" b="1" i="1" dirty="0" err="1"/>
+              <a:t>dat_mosi</a:t>
+            </a:r>
+            <a:r>
+              <a:rPr lang="en-US" sz="1600" b="1" i="1" dirty="0"/>
+              <a:t> </a:t>
+            </a:r>
+            <a:r>
+              <a:rPr lang="en-US" sz="1600" dirty="0"/>
+              <a:t>signal contains the values </a:t>
+            </a:r>
+            <a:r>
+              <a:rPr lang="en-US" sz="1600" i="1" dirty="0" err="1"/>
+              <a:t>dead_beef</a:t>
+            </a:r>
+            <a:r>
+              <a:rPr lang="en-US" sz="1600" i="1" dirty="0"/>
+              <a:t> </a:t>
+            </a:r>
+            <a:r>
+              <a:rPr lang="en-US" sz="1600" dirty="0"/>
+              <a:t>and </a:t>
+            </a:r>
+            <a:r>
+              <a:rPr lang="en-US" sz="1600" i="1" dirty="0" err="1"/>
+              <a:t>cafe_babe</a:t>
+            </a:r>
+            <a:r>
+              <a:rPr lang="en-US" sz="1600" dirty="0"/>
+              <a:t>, which are likely test data written to the bus.</a:t>
+            </a:r>
+          </a:p>
+          <a:p>
+            <a:r>
+              <a:rPr lang="en-US" sz="1600" dirty="0"/>
+              <a:t>The </a:t>
+            </a:r>
+            <a:r>
+              <a:rPr lang="en-US" sz="1600" b="1" i="1" dirty="0" err="1"/>
+              <a:t>dat_miso</a:t>
+            </a:r>
+            <a:r>
+              <a:rPr lang="en-US" sz="1600" b="1" i="1" dirty="0"/>
+              <a:t> </a:t>
+            </a:r>
+            <a:r>
+              <a:rPr lang="en-US" sz="1600" dirty="0"/>
+              <a:t>shows an undefined state (</a:t>
+            </a:r>
+            <a:r>
+              <a:rPr lang="en-US" sz="1600" i="1" dirty="0" err="1"/>
+              <a:t>xxxx</a:t>
+            </a:r>
+            <a:r>
+              <a:rPr lang="en-US" sz="1600" dirty="0"/>
+              <a:t>) initially, which suggests that the data read from the slave device has not yet been driven or there might be a delay in the slave's response or an issue with the slave's response generation logic.</a:t>
+            </a:r>
+          </a:p>
+          <a:p>
+            <a:r>
+              <a:rPr lang="en-US" sz="1600" dirty="0"/>
+              <a:t>The ack signal goes high after each address change, which implies that the slave device is acknowledging the read requests.</a:t>
+            </a:r>
+            <a:endParaRPr lang="el-GR" sz="1600" dirty="0"/>
           </a:p>
         </p:txBody>
       </p:sp>
     </p:spTree>
     <p:extLst>
       <p:ext uri="{BB962C8B-B14F-4D97-AF65-F5344CB8AC3E}">
-        <p14:creationId xmlns:p14="http://schemas.microsoft.com/office/powerpoint/2010/main" val="1024644611"/>
+        <p14:creationId xmlns:p14="http://schemas.microsoft.com/office/powerpoint/2010/main" val="224366493"/>
       </p:ext>
     </p:extLst>
   </p:cSld>
@@ -5671,103 +5860,58 @@
           <a:chExt cx="0" cy="0"/>
         </a:xfrm>
       </p:grpSpPr>
-      <p:pic>
-        <p:nvPicPr>
-          <p:cNvPr id="8194" name="Picture 2" descr="Caravel Management SoC - Litex — Caravel Management SoC documentation">
-            <a:extLst>
-              <a:ext uri="{FF2B5EF4-FFF2-40B4-BE49-F238E27FC236}">
-                <a16:creationId xmlns:a16="http://schemas.microsoft.com/office/drawing/2014/main" id="{820CA707-A0AE-038B-AD4F-6B7F6CFAF6C2}"/>
-              </a:ext>
-            </a:extLst>
-          </p:cNvPr>
-          <p:cNvPicPr>
-            <a:picLocks noChangeAspect="1" noChangeArrowheads="1"/>
-          </p:cNvPicPr>
+      <p:sp>
+        <p:nvSpPr>
+          <p:cNvPr id="2" name="TextBox 1">
+            <a:extLst>
+              <a:ext uri="{FF2B5EF4-FFF2-40B4-BE49-F238E27FC236}">
+                <a16:creationId xmlns:a16="http://schemas.microsoft.com/office/drawing/2014/main" id="{82EF0407-1C56-5C2E-FD66-DBAC24AEDCE3}"/>
+              </a:ext>
+            </a:extLst>
+          </p:cNvPr>
+          <p:cNvSpPr txBox="1"/>
           <p:nvPr/>
-        </p:nvPicPr>
-        <p:blipFill>
-          <a:blip r:embed="rId2">
-            <a:extLst>
-              <a:ext uri="{28A0092B-C50C-407E-A947-70E740481C1C}">
-                <a14:useLocalDpi xmlns:a14="http://schemas.microsoft.com/office/drawing/2010/main" val="0"/>
-              </a:ext>
-            </a:extLst>
-          </a:blip>
-          <a:srcRect/>
-          <a:stretch>
-            <a:fillRect/>
-          </a:stretch>
-        </p:blipFill>
-        <p:spPr bwMode="auto">
-          <a:xfrm>
-            <a:off x="5325809" y="478194"/>
-            <a:ext cx="6668693" cy="5770984"/>
+        </p:nvSpPr>
+        <p:spPr>
+          <a:xfrm>
+            <a:off x="3372434" y="1253026"/>
+            <a:ext cx="4572000" cy="369332"/>
           </a:xfrm>
           <a:prstGeom prst="rect">
             <a:avLst/>
           </a:prstGeom>
           <a:noFill/>
-          <a:extLst>
-            <a:ext uri="{909E8E84-426E-40DD-AFC4-6F175D3DCCD1}">
-              <a14:hiddenFill xmlns:a14="http://schemas.microsoft.com/office/drawing/2010/main">
-                <a:solidFill>
-                  <a:srgbClr val="FFFFFF"/>
-                </a:solidFill>
-              </a14:hiddenFill>
-            </a:ext>
-          </a:extLst>
-        </p:spPr>
-      </p:pic>
-      <p:cxnSp>
-        <p:nvCxnSpPr>
-          <p:cNvPr id="5" name="Straight Arrow Connector 4">
-            <a:extLst>
-              <a:ext uri="{FF2B5EF4-FFF2-40B4-BE49-F238E27FC236}">
-                <a16:creationId xmlns:a16="http://schemas.microsoft.com/office/drawing/2014/main" id="{FEC101E4-F676-C47B-B192-98F199DBCF4F}"/>
-              </a:ext>
-            </a:extLst>
-          </p:cNvPr>
-          <p:cNvCxnSpPr>
-            <a:cxnSpLocks/>
-          </p:cNvCxnSpPr>
-          <p:nvPr/>
-        </p:nvCxnSpPr>
-        <p:spPr>
-          <a:xfrm>
-            <a:off x="7576457" y="4152122"/>
-            <a:ext cx="270588" cy="396551"/>
-          </a:xfrm>
-          <a:prstGeom prst="straightConnector1">
-            <a:avLst/>
-          </a:prstGeom>
-          <a:ln w="38100">
-            <a:solidFill>
-              <a:srgbClr val="FF0000"/>
-            </a:solidFill>
-            <a:tailEnd type="triangle"/>
-          </a:ln>
-        </p:spPr>
-        <p:style>
-          <a:lnRef idx="1">
-            <a:schemeClr val="accent2"/>
-          </a:lnRef>
-          <a:fillRef idx="0">
-            <a:schemeClr val="accent2"/>
-          </a:fillRef>
-          <a:effectRef idx="0">
-            <a:schemeClr val="accent2"/>
-          </a:effectRef>
-          <a:fontRef idx="minor">
-            <a:schemeClr val="tx1"/>
-          </a:fontRef>
-        </p:style>
-      </p:cxnSp>
+        </p:spPr>
+        <p:txBody>
+          <a:bodyPr wrap="square" rtlCol="0">
+            <a:spAutoFit/>
+          </a:bodyPr>
+          <a:lstStyle/>
+          <a:p>
+            <a:r>
+              <a:rPr lang="en-US" dirty="0"/>
+              <a:t>Simulation with Trojan (</a:t>
+            </a:r>
+            <a:r>
+              <a:rPr lang="en-US" dirty="0">
+                <a:hlinkClick r:id="rId2"/>
+              </a:rPr>
+              <a:t>Code and Simulation</a:t>
+            </a:r>
+            <a:r>
+              <a:rPr lang="en-US" dirty="0"/>
+              <a:t>):</a:t>
+            </a:r>
+            <a:endParaRPr lang="el-GR" dirty="0"/>
+          </a:p>
+        </p:txBody>
+      </p:sp>
       <p:pic>
         <p:nvPicPr>
-          <p:cNvPr id="7" name="Picture 6">
-            <a:extLst>
-              <a:ext uri="{FF2B5EF4-FFF2-40B4-BE49-F238E27FC236}">
-                <a16:creationId xmlns:a16="http://schemas.microsoft.com/office/drawing/2014/main" id="{441E0B61-554A-CFF0-F092-04F8DB843220}"/>
+          <p:cNvPr id="3" name="Picture 15">
+            <a:extLst>
+              <a:ext uri="{FF2B5EF4-FFF2-40B4-BE49-F238E27FC236}">
+                <a16:creationId xmlns:a16="http://schemas.microsoft.com/office/drawing/2014/main" id="{DADA5C07-0EE4-0B8E-81D8-939D01849582}"/>
               </a:ext>
             </a:extLst>
           </p:cNvPr>
@@ -5777,28 +5921,15 @@
           <p:nvPr/>
         </p:nvPicPr>
         <p:blipFill>
-          <a:blip r:embed="rId3">
-            <a:duotone>
-              <a:schemeClr val="accent2">
-                <a:shade val="45000"/>
-                <a:satMod val="135000"/>
-              </a:schemeClr>
-              <a:prstClr val="white"/>
-            </a:duotone>
-            <a:extLst>
-              <a:ext uri="{28A0092B-C50C-407E-A947-70E740481C1C}">
-                <a14:useLocalDpi xmlns:a14="http://schemas.microsoft.com/office/drawing/2010/main" val="0"/>
-              </a:ext>
-            </a:extLst>
-          </a:blip>
+          <a:blip r:embed="rId3"/>
           <a:stretch>
             <a:fillRect/>
           </a:stretch>
         </p:blipFill>
         <p:spPr>
-          <a:xfrm flipH="1">
-            <a:off x="7312868" y="3753239"/>
-            <a:ext cx="398883" cy="398883"/>
+          <a:xfrm>
+            <a:off x="538733" y="4577929"/>
+            <a:ext cx="11429999" cy="1582278"/>
           </a:xfrm>
           <a:prstGeom prst="rect">
             <a:avLst/>
@@ -5807,10 +5938,10 @@
       </p:pic>
       <p:sp>
         <p:nvSpPr>
-          <p:cNvPr id="9" name="TextBox 8">
-            <a:extLst>
-              <a:ext uri="{FF2B5EF4-FFF2-40B4-BE49-F238E27FC236}">
-                <a16:creationId xmlns:a16="http://schemas.microsoft.com/office/drawing/2014/main" id="{26EDB7A8-B89C-8B2D-95E4-664D4333450A}"/>
+          <p:cNvPr id="4" name="TextBox 3">
+            <a:extLst>
+              <a:ext uri="{FF2B5EF4-FFF2-40B4-BE49-F238E27FC236}">
+                <a16:creationId xmlns:a16="http://schemas.microsoft.com/office/drawing/2014/main" id="{BE93B0F8-33A0-107D-4F50-2B37F37C0F6F}"/>
               </a:ext>
             </a:extLst>
           </p:cNvPr>
@@ -5819,8 +5950,8 @@
         </p:nvSpPr>
         <p:spPr>
           <a:xfrm>
-            <a:off x="583163" y="937727"/>
-            <a:ext cx="4100804" cy="4524315"/>
+            <a:off x="774440" y="1889449"/>
+            <a:ext cx="10296330" cy="2308324"/>
           </a:xfrm>
           <a:prstGeom prst="rect">
             <a:avLst/>
@@ -5835,58 +5966,52 @@
           <a:p>
             <a:r>
               <a:rPr lang="en-US" dirty="0"/>
-              <a:t>An alpha version of our malicious code implementation methodology is:</a:t>
+              <a:t>What this waveform reveals is a sequence of transactions over a Wishbone bus interface, where the master is sequentially reading from addresses 1, 2, and 3. </a:t>
             </a:r>
           </a:p>
           <a:p>
             <a:endParaRPr lang="en-US" dirty="0"/>
           </a:p>
           <a:p>
-            <a:pPr marL="342900" indent="-342900">
-              <a:buFont typeface="+mj-lt"/>
-              <a:buAutoNum type="arabicPeriod"/>
-            </a:pPr>
             <a:r>
               <a:rPr lang="en-US" dirty="0"/>
-              <a:t>We first analyzed the code in the GitHub repository.</a:t>
-            </a:r>
-          </a:p>
-          <a:p>
-            <a:pPr marL="342900" indent="-342900">
-              <a:buFont typeface="+mj-lt"/>
-              <a:buAutoNum type="arabicPeriod"/>
-            </a:pPr>
+              <a:t>-The undefined data initially present on the </a:t>
+            </a:r>
+            <a:r>
+              <a:rPr lang="en-US" dirty="0" err="1"/>
+              <a:t>dat_miso</a:t>
+            </a:r>
             <a:r>
               <a:rPr lang="en-US" dirty="0"/>
-              <a:t>Inside the </a:t>
+              <a:t> line suggests that the slave device might have some latency in responding or there's some wait states introduced in the bus cycle.</a:t>
+            </a:r>
+          </a:p>
+          <a:p>
+            <a:r>
+              <a:rPr lang="en-US" dirty="0"/>
+              <a:t>- The test patterns </a:t>
             </a:r>
             <a:r>
               <a:rPr lang="en-US" dirty="0" err="1"/>
-              <a:t>housekeeping.v</a:t>
+              <a:t>dead_beef</a:t>
             </a:r>
             <a:r>
               <a:rPr lang="en-US" dirty="0"/>
-              <a:t> file the wishbone to SPI to CPU communication is implemented.</a:t>
-            </a:r>
-          </a:p>
-          <a:p>
-            <a:pPr marL="342900" indent="-342900">
-              <a:buFont typeface="+mj-lt"/>
-              <a:buAutoNum type="arabicPeriod"/>
-            </a:pPr>
+              <a:t> and </a:t>
+            </a:r>
+            <a:r>
+              <a:rPr lang="en-US" dirty="0" err="1"/>
+              <a:t>cafe_babe</a:t>
+            </a:r>
             <a:r>
               <a:rPr lang="en-US" dirty="0"/>
-              <a:t>We can alter the wishbone FSM implementation by adding a stage where if a certain value is transmitted in the bus then an internal signal gets stuck at “0” </a:t>
-            </a:r>
-          </a:p>
-          <a:p>
-            <a:pPr marL="342900" indent="-342900">
-              <a:buFont typeface="+mj-lt"/>
-              <a:buAutoNum type="arabicPeriod"/>
-            </a:pPr>
+              <a:t> are typical in digital system testing and are used here for either writing to the slave or expecting such patterns as a read response.</a:t>
+            </a:r>
+          </a:p>
+          <a:p>
             <a:r>
               <a:rPr lang="en-US" dirty="0"/>
-              <a:t>This way we are glitching the handshake method causing a Denial Of Service.</a:t>
+              <a:t>- The pattern 1234_5678 is the last valid data read from address 3 due to the trojan’s activation.</a:t>
             </a:r>
             <a:endParaRPr lang="el-GR" dirty="0"/>
           </a:p>
@@ -5895,7 +6020,7 @@
     </p:spTree>
     <p:extLst>
       <p:ext uri="{BB962C8B-B14F-4D97-AF65-F5344CB8AC3E}">
-        <p14:creationId xmlns:p14="http://schemas.microsoft.com/office/powerpoint/2010/main" val="789329576"/>
+        <p14:creationId xmlns:p14="http://schemas.microsoft.com/office/powerpoint/2010/main" val="1979755655"/>
       </p:ext>
     </p:extLst>
   </p:cSld>
@@ -5922,27 +6047,161 @@
           <a:chExt cx="0" cy="0"/>
         </a:xfrm>
       </p:grpSpPr>
-      <p:sp>
-        <p:nvSpPr>
-          <p:cNvPr id="2" name="TextBox 1">
-            <a:extLst>
-              <a:ext uri="{FF2B5EF4-FFF2-40B4-BE49-F238E27FC236}">
-                <a16:creationId xmlns:a16="http://schemas.microsoft.com/office/drawing/2014/main" id="{69DFECC6-7A19-B2A9-07C4-56409A6A907B}"/>
-              </a:ext>
-            </a:extLst>
-          </p:cNvPr>
-          <p:cNvSpPr txBox="1"/>
+      <p:pic>
+        <p:nvPicPr>
+          <p:cNvPr id="8194" name="Picture 2" descr="Caravel Management SoC - Litex — Caravel Management SoC documentation">
+            <a:extLst>
+              <a:ext uri="{FF2B5EF4-FFF2-40B4-BE49-F238E27FC236}">
+                <a16:creationId xmlns:a16="http://schemas.microsoft.com/office/drawing/2014/main" id="{820CA707-A0AE-038B-AD4F-6B7F6CFAF6C2}"/>
+              </a:ext>
+            </a:extLst>
+          </p:cNvPr>
+          <p:cNvPicPr>
+            <a:picLocks noChangeAspect="1" noChangeArrowheads="1"/>
+          </p:cNvPicPr>
           <p:nvPr/>
-        </p:nvSpPr>
-        <p:spPr>
-          <a:xfrm>
-            <a:off x="7201677" y="2628028"/>
-            <a:ext cx="3665377" cy="923330"/>
+        </p:nvPicPr>
+        <p:blipFill>
+          <a:blip r:embed="rId2">
+            <a:extLst>
+              <a:ext uri="{28A0092B-C50C-407E-A947-70E740481C1C}">
+                <a14:useLocalDpi xmlns:a14="http://schemas.microsoft.com/office/drawing/2010/main" val="0"/>
+              </a:ext>
+            </a:extLst>
+          </a:blip>
+          <a:srcRect/>
+          <a:stretch>
+            <a:fillRect/>
+          </a:stretch>
+        </p:blipFill>
+        <p:spPr bwMode="auto">
+          <a:xfrm>
+            <a:off x="5461104" y="937727"/>
+            <a:ext cx="5973562" cy="5169428"/>
           </a:xfrm>
           <a:prstGeom prst="rect">
             <a:avLst/>
           </a:prstGeom>
           <a:noFill/>
+          <a:extLst>
+            <a:ext uri="{909E8E84-426E-40DD-AFC4-6F175D3DCCD1}">
+              <a14:hiddenFill xmlns:a14="http://schemas.microsoft.com/office/drawing/2010/main">
+                <a:solidFill>
+                  <a:srgbClr val="FFFFFF"/>
+                </a:solidFill>
+              </a14:hiddenFill>
+            </a:ext>
+          </a:extLst>
+        </p:spPr>
+      </p:pic>
+      <p:cxnSp>
+        <p:nvCxnSpPr>
+          <p:cNvPr id="5" name="Straight Arrow Connector 4">
+            <a:extLst>
+              <a:ext uri="{FF2B5EF4-FFF2-40B4-BE49-F238E27FC236}">
+                <a16:creationId xmlns:a16="http://schemas.microsoft.com/office/drawing/2014/main" id="{FEC101E4-F676-C47B-B192-98F199DBCF4F}"/>
+              </a:ext>
+            </a:extLst>
+          </p:cNvPr>
+          <p:cNvCxnSpPr>
+            <a:cxnSpLocks/>
+          </p:cNvCxnSpPr>
+          <p:nvPr/>
+        </p:nvCxnSpPr>
+        <p:spPr>
+          <a:xfrm>
+            <a:off x="7576457" y="4152122"/>
+            <a:ext cx="270588" cy="396551"/>
+          </a:xfrm>
+          <a:prstGeom prst="straightConnector1">
+            <a:avLst/>
+          </a:prstGeom>
+          <a:ln w="38100">
+            <a:solidFill>
+              <a:srgbClr val="FF0000"/>
+            </a:solidFill>
+            <a:tailEnd type="triangle"/>
+          </a:ln>
+        </p:spPr>
+        <p:style>
+          <a:lnRef idx="1">
+            <a:schemeClr val="accent2"/>
+          </a:lnRef>
+          <a:fillRef idx="0">
+            <a:schemeClr val="accent2"/>
+          </a:fillRef>
+          <a:effectRef idx="0">
+            <a:schemeClr val="accent2"/>
+          </a:effectRef>
+          <a:fontRef idx="minor">
+            <a:schemeClr val="tx1"/>
+          </a:fontRef>
+        </p:style>
+      </p:cxnSp>
+      <p:pic>
+        <p:nvPicPr>
+          <p:cNvPr id="7" name="Picture 6">
+            <a:extLst>
+              <a:ext uri="{FF2B5EF4-FFF2-40B4-BE49-F238E27FC236}">
+                <a16:creationId xmlns:a16="http://schemas.microsoft.com/office/drawing/2014/main" id="{441E0B61-554A-CFF0-F092-04F8DB843220}"/>
+              </a:ext>
+            </a:extLst>
+          </p:cNvPr>
+          <p:cNvPicPr>
+            <a:picLocks noChangeAspect="1"/>
+          </p:cNvPicPr>
+          <p:nvPr/>
+        </p:nvPicPr>
+        <p:blipFill>
+          <a:blip r:embed="rId3">
+            <a:duotone>
+              <a:schemeClr val="accent2">
+                <a:shade val="45000"/>
+                <a:satMod val="135000"/>
+              </a:schemeClr>
+              <a:prstClr val="white"/>
+            </a:duotone>
+            <a:extLst>
+              <a:ext uri="{28A0092B-C50C-407E-A947-70E740481C1C}">
+                <a14:useLocalDpi xmlns:a14="http://schemas.microsoft.com/office/drawing/2010/main" val="0"/>
+              </a:ext>
+            </a:extLst>
+          </a:blip>
+          <a:stretch>
+            <a:fillRect/>
+          </a:stretch>
+        </p:blipFill>
+        <p:spPr>
+          <a:xfrm flipH="1">
+            <a:off x="7312868" y="3753239"/>
+            <a:ext cx="398883" cy="398883"/>
+          </a:xfrm>
+          <a:prstGeom prst="rect">
+            <a:avLst/>
+          </a:prstGeom>
+        </p:spPr>
+      </p:pic>
+      <p:sp>
+        <p:nvSpPr>
+          <p:cNvPr id="9" name="TextBox 8">
+            <a:extLst>
+              <a:ext uri="{FF2B5EF4-FFF2-40B4-BE49-F238E27FC236}">
+                <a16:creationId xmlns:a16="http://schemas.microsoft.com/office/drawing/2014/main" id="{26EDB7A8-B89C-8B2D-95E4-664D4333450A}"/>
+              </a:ext>
+            </a:extLst>
+          </p:cNvPr>
+          <p:cNvSpPr txBox="1"/>
+          <p:nvPr/>
+        </p:nvSpPr>
+        <p:spPr>
+          <a:xfrm>
+            <a:off x="1096347" y="1564179"/>
+            <a:ext cx="4100804" cy="4524315"/>
+          </a:xfrm>
+          <a:prstGeom prst="rect">
+            <a:avLst/>
+          </a:prstGeom>
+          <a:noFill/>
         </p:spPr>
         <p:txBody>
           <a:bodyPr wrap="square" rtlCol="0">
@@ -5950,6 +6209,187 @@
           </a:bodyPr>
           <a:lstStyle/>
           <a:p>
+            <a:r>
+              <a:rPr lang="en-US" dirty="0"/>
+              <a:t>Our malicious code implementation methodology is:</a:t>
+            </a:r>
+          </a:p>
+          <a:p>
+            <a:endParaRPr lang="en-US" dirty="0"/>
+          </a:p>
+          <a:p>
+            <a:pPr marL="342900" indent="-342900">
+              <a:buFont typeface="+mj-lt"/>
+              <a:buAutoNum type="arabicPeriod"/>
+            </a:pPr>
+            <a:r>
+              <a:rPr lang="en-US" dirty="0"/>
+              <a:t>We first analyzed the code in the GitHub repository.</a:t>
+            </a:r>
+          </a:p>
+          <a:p>
+            <a:pPr marL="342900" indent="-342900">
+              <a:buFont typeface="+mj-lt"/>
+              <a:buAutoNum type="arabicPeriod"/>
+            </a:pPr>
+            <a:r>
+              <a:rPr lang="en-US" dirty="0"/>
+              <a:t>Inside the </a:t>
+            </a:r>
+            <a:r>
+              <a:rPr lang="en-US" dirty="0" err="1"/>
+              <a:t>housekeeping.v</a:t>
+            </a:r>
+            <a:r>
+              <a:rPr lang="en-US" dirty="0"/>
+              <a:t> file the wishbone to SPI to CPU communication is implemented.</a:t>
+            </a:r>
+          </a:p>
+          <a:p>
+            <a:pPr marL="342900" indent="-342900">
+              <a:buFont typeface="+mj-lt"/>
+              <a:buAutoNum type="arabicPeriod"/>
+            </a:pPr>
+            <a:r>
+              <a:rPr lang="en-US" dirty="0"/>
+              <a:t>We can alter the wishbone FSM implementation by adding a stage where if a certain value is transmitted in the bus then an internal signal gets stuck at “0” </a:t>
+            </a:r>
+          </a:p>
+          <a:p>
+            <a:pPr marL="342900" indent="-342900">
+              <a:buFont typeface="+mj-lt"/>
+              <a:buAutoNum type="arabicPeriod"/>
+            </a:pPr>
+            <a:r>
+              <a:rPr lang="en-US" dirty="0"/>
+              <a:t>This way we are glitching the handshake method causing a Denial Of Service.</a:t>
+            </a:r>
+            <a:endParaRPr lang="el-GR" dirty="0"/>
+          </a:p>
+        </p:txBody>
+      </p:sp>
+      <p:sp>
+        <p:nvSpPr>
+          <p:cNvPr id="2" name="TextBox 1">
+            <a:extLst>
+              <a:ext uri="{FF2B5EF4-FFF2-40B4-BE49-F238E27FC236}">
+                <a16:creationId xmlns:a16="http://schemas.microsoft.com/office/drawing/2014/main" id="{468011C9-C7A1-F16F-355E-F93D0D5C2A7E}"/>
+              </a:ext>
+            </a:extLst>
+          </p:cNvPr>
+          <p:cNvSpPr txBox="1"/>
+          <p:nvPr/>
+        </p:nvSpPr>
+        <p:spPr>
+          <a:xfrm>
+            <a:off x="2034851" y="247361"/>
+            <a:ext cx="8122298" cy="461665"/>
+          </a:xfrm>
+          <a:prstGeom prst="rect">
+            <a:avLst/>
+          </a:prstGeom>
+          <a:noFill/>
+        </p:spPr>
+        <p:txBody>
+          <a:bodyPr wrap="square" rtlCol="0">
+            <a:spAutoFit/>
+          </a:bodyPr>
+          <a:lstStyle/>
+          <a:p>
+            <a:r>
+              <a:rPr lang="en-US" sz="2400" dirty="0">
+                <a:latin typeface="Arial Black" panose="020B0A04020102020204" pitchFamily="34" charset="0"/>
+              </a:rPr>
+              <a:t>Caravel project wishbone bus </a:t>
+            </a:r>
+            <a:r>
+              <a:rPr lang="en-US" sz="2400" dirty="0" err="1">
+                <a:latin typeface="Arial Black" panose="020B0A04020102020204" pitchFamily="34" charset="0"/>
+              </a:rPr>
+              <a:t>D.ο.S</a:t>
+            </a:r>
+            <a:r>
+              <a:rPr lang="en-US" sz="2400" dirty="0">
+                <a:latin typeface="Arial Black" panose="020B0A04020102020204" pitchFamily="34" charset="0"/>
+              </a:rPr>
+              <a:t>. </a:t>
+            </a:r>
+            <a:r>
+              <a:rPr lang="en-US" sz="2400" dirty="0" err="1">
+                <a:latin typeface="Arial Black" panose="020B0A04020102020204" pitchFamily="34" charset="0"/>
+              </a:rPr>
+              <a:t>hw</a:t>
+            </a:r>
+            <a:r>
+              <a:rPr lang="en-US" sz="2400" dirty="0">
+                <a:latin typeface="Arial Black" panose="020B0A04020102020204" pitchFamily="34" charset="0"/>
+              </a:rPr>
+              <a:t> trojan</a:t>
+            </a:r>
+            <a:endParaRPr lang="el-GR" sz="2400" dirty="0">
+              <a:latin typeface="Arial Black" panose="020B0A04020102020204" pitchFamily="34" charset="0"/>
+            </a:endParaRPr>
+          </a:p>
+        </p:txBody>
+      </p:sp>
+    </p:spTree>
+    <p:extLst>
+      <p:ext uri="{BB962C8B-B14F-4D97-AF65-F5344CB8AC3E}">
+        <p14:creationId xmlns:p14="http://schemas.microsoft.com/office/powerpoint/2010/main" val="789329576"/>
+      </p:ext>
+    </p:extLst>
+  </p:cSld>
+  <p:clrMapOvr>
+    <a:masterClrMapping/>
+  </p:clrMapOvr>
+</p:sld>
+</file>
+
+<file path=ppt/slides/slide16.xml><?xml version="1.0" encoding="utf-8"?>
+<p:sld xmlns:a="http://schemas.openxmlformats.org/drawingml/2006/main" xmlns:r="http://schemas.openxmlformats.org/officeDocument/2006/relationships" xmlns:p="http://schemas.openxmlformats.org/presentationml/2006/main">
+  <p:cSld>
+    <p:spTree>
+      <p:nvGrpSpPr>
+        <p:cNvPr id="1" name=""/>
+        <p:cNvGrpSpPr/>
+        <p:nvPr/>
+      </p:nvGrpSpPr>
+      <p:grpSpPr>
+        <a:xfrm>
+          <a:off x="0" y="0"/>
+          <a:ext cx="0" cy="0"/>
+          <a:chOff x="0" y="0"/>
+          <a:chExt cx="0" cy="0"/>
+        </a:xfrm>
+      </p:grpSpPr>
+      <p:sp>
+        <p:nvSpPr>
+          <p:cNvPr id="2" name="TextBox 1">
+            <a:extLst>
+              <a:ext uri="{FF2B5EF4-FFF2-40B4-BE49-F238E27FC236}">
+                <a16:creationId xmlns:a16="http://schemas.microsoft.com/office/drawing/2014/main" id="{69DFECC6-7A19-B2A9-07C4-56409A6A907B}"/>
+              </a:ext>
+            </a:extLst>
+          </p:cNvPr>
+          <p:cNvSpPr txBox="1"/>
+          <p:nvPr/>
+        </p:nvSpPr>
+        <p:spPr>
+          <a:xfrm>
+            <a:off x="614265" y="959310"/>
+            <a:ext cx="3665377" cy="923330"/>
+          </a:xfrm>
+          <a:prstGeom prst="rect">
+            <a:avLst/>
+          </a:prstGeom>
+          <a:noFill/>
+        </p:spPr>
+        <p:txBody>
+          <a:bodyPr wrap="square" rtlCol="0">
+            <a:spAutoFit/>
+          </a:bodyPr>
+          <a:lstStyle/>
+          <a:p>
             <a:pPr algn="ctr"/>
             <a:r>
               <a:rPr lang="en-US" dirty="0">
@@ -5975,7 +6415,7 @@
         </p:nvSpPr>
         <p:spPr>
           <a:xfrm>
-            <a:off x="8022425" y="1713056"/>
+            <a:off x="4643362" y="108191"/>
             <a:ext cx="2905276" cy="830997"/>
           </a:xfrm>
           <a:prstGeom prst="rect">
@@ -6015,8 +6455,8 @@
         </p:nvSpPr>
         <p:spPr>
           <a:xfrm>
-            <a:off x="1264299" y="1012201"/>
-            <a:ext cx="4436705" cy="1200329"/>
+            <a:off x="614265" y="2141463"/>
+            <a:ext cx="5875176" cy="1477328"/>
           </a:xfrm>
           <a:prstGeom prst="rect">
             <a:avLst/>
@@ -6031,7 +6471,21 @@
           <a:p>
             <a:r>
               <a:rPr lang="en-US" dirty="0"/>
-              <a:t>Prompt example where “</a:t>
+              <a:t>- I isolated the wish bus state machine from </a:t>
+            </a:r>
+            <a:r>
+              <a:rPr lang="en-US" dirty="0" err="1"/>
+              <a:t>housekeeping.v</a:t>
+            </a:r>
+            <a:r>
+              <a:rPr lang="en-US" dirty="0"/>
+              <a:t> .</a:t>
+            </a:r>
+          </a:p>
+          <a:p>
+            <a:r>
+              <a:rPr lang="en-US" dirty="0"/>
+              <a:t>- I added a trigger where “</a:t>
             </a:r>
             <a:r>
               <a:rPr lang="en-US" b="1" i="1" dirty="0" err="1"/>
@@ -6063,7 +6517,13 @@
             </a:r>
             <a:r>
               <a:rPr lang="en-US" dirty="0"/>
-              <a:t>”. This is just an example concept.</a:t>
+              <a:t>”. </a:t>
+            </a:r>
+          </a:p>
+          <a:p>
+            <a:r>
+              <a:rPr lang="en-US" dirty="0"/>
+              <a:t>- This way the bus glitches stopping SPI communication.</a:t>
             </a:r>
             <a:endParaRPr lang="el-GR" dirty="0"/>
           </a:p>
@@ -6083,7 +6543,7 @@
         </p:nvSpPr>
         <p:spPr>
           <a:xfrm>
-            <a:off x="1324946" y="2794519"/>
+            <a:off x="6983962" y="1735038"/>
             <a:ext cx="4697964" cy="2031325"/>
           </a:xfrm>
           <a:prstGeom prst="rect">
@@ -6155,6 +6615,72 @@
               <a:t>Physical characteristics: Functional</a:t>
             </a:r>
             <a:endParaRPr lang="el-GR" dirty="0"/>
+          </a:p>
+        </p:txBody>
+      </p:sp>
+      <p:sp>
+        <p:nvSpPr>
+          <p:cNvPr id="5" name="TextBox 4">
+            <a:extLst>
+              <a:ext uri="{FF2B5EF4-FFF2-40B4-BE49-F238E27FC236}">
+                <a16:creationId xmlns:a16="http://schemas.microsoft.com/office/drawing/2014/main" id="{B5F40E99-49DF-EBE2-78B4-A716D9402606}"/>
+              </a:ext>
+            </a:extLst>
+          </p:cNvPr>
+          <p:cNvSpPr txBox="1"/>
+          <p:nvPr/>
+        </p:nvSpPr>
+        <p:spPr>
+          <a:xfrm>
+            <a:off x="966496" y="4562213"/>
+            <a:ext cx="10259008" cy="1200329"/>
+          </a:xfrm>
+          <a:prstGeom prst="rect">
+            <a:avLst/>
+          </a:prstGeom>
+          <a:noFill/>
+        </p:spPr>
+        <p:txBody>
+          <a:bodyPr wrap="square" rtlCol="0">
+            <a:spAutoFit/>
+          </a:bodyPr>
+          <a:lstStyle/>
+          <a:p>
+            <a:r>
+              <a:rPr lang="en-US" i="1" spc="-150" dirty="0"/>
+              <a:t>Disclaimer: I had intended to publish this section to </a:t>
+            </a:r>
+            <a:r>
+              <a:rPr lang="en-US" i="1" spc="-150" dirty="0" err="1"/>
+              <a:t>efabless</a:t>
+            </a:r>
+            <a:r>
+              <a:rPr lang="en-US" i="1" spc="-150" dirty="0"/>
+              <a:t>, however an Ubuntu + Docker configuration error kept me from moving forward. Files created by a docker-based action are owned by </a:t>
+            </a:r>
+            <a:r>
+              <a:rPr lang="en-US" i="1" spc="-150" dirty="0" err="1"/>
+              <a:t>root:root</a:t>
+            </a:r>
+            <a:r>
+              <a:rPr lang="en-US" i="1" spc="-150" dirty="0"/>
+              <a:t>, meaning that steps or actions that run as the default runner user in the future cannot modify them.</a:t>
+            </a:r>
+          </a:p>
+          <a:p>
+            <a:r>
+              <a:rPr lang="en-US" i="1" spc="-150" dirty="0"/>
+              <a:t> I was able to solve the issue, however the deadline prevented me from uploading to </a:t>
+            </a:r>
+            <a:r>
+              <a:rPr lang="en-US" i="1" spc="-150" dirty="0" err="1"/>
+              <a:t>eFabless</a:t>
+            </a:r>
+            <a:r>
+              <a:rPr lang="en-US" i="1" spc="-150" dirty="0"/>
+              <a:t> and passing precheck.</a:t>
+            </a:r>
+            <a:endParaRPr lang="el-GR" i="1" spc="-150" dirty="0"/>
           </a:p>
         </p:txBody>
       </p:sp>
@@ -6171,7 +6697,7 @@
 </p:sld>
 </file>
 
-<file path=ppt/slides/slide16.xml><?xml version="1.0" encoding="utf-8"?>
+<file path=ppt/slides/slide17.xml><?xml version="1.0" encoding="utf-8"?>
 <p:sld xmlns:a="http://schemas.openxmlformats.org/drawingml/2006/main" xmlns:r="http://schemas.openxmlformats.org/officeDocument/2006/relationships" xmlns:p="http://schemas.openxmlformats.org/presentationml/2006/main">
   <p:cSld>
     <p:spTree>
@@ -6602,287 +7128,6 @@
 </p:sld>
 </file>
 
-<file path=ppt/slides/slide17.xml><?xml version="1.0" encoding="utf-8"?>
-<p:sld xmlns:a="http://schemas.openxmlformats.org/drawingml/2006/main" xmlns:r="http://schemas.openxmlformats.org/officeDocument/2006/relationships" xmlns:p="http://schemas.openxmlformats.org/presentationml/2006/main">
-  <p:cSld>
-    <p:spTree>
-      <p:nvGrpSpPr>
-        <p:cNvPr id="1" name=""/>
-        <p:cNvGrpSpPr/>
-        <p:nvPr/>
-      </p:nvGrpSpPr>
-      <p:grpSpPr>
-        <a:xfrm>
-          <a:off x="0" y="0"/>
-          <a:ext cx="0" cy="0"/>
-          <a:chOff x="0" y="0"/>
-          <a:chExt cx="0" cy="0"/>
-        </a:xfrm>
-      </p:grpSpPr>
-      <p:sp>
-        <p:nvSpPr>
-          <p:cNvPr id="4" name="TextBox 3">
-            <a:extLst>
-              <a:ext uri="{FF2B5EF4-FFF2-40B4-BE49-F238E27FC236}">
-                <a16:creationId xmlns:a16="http://schemas.microsoft.com/office/drawing/2014/main" id="{D2DD5275-256A-0E3B-37C5-D82D8BB5C6D3}"/>
-              </a:ext>
-            </a:extLst>
-          </p:cNvPr>
-          <p:cNvSpPr txBox="1"/>
-          <p:nvPr/>
-        </p:nvSpPr>
-        <p:spPr>
-          <a:xfrm>
-            <a:off x="3180183" y="1222963"/>
-            <a:ext cx="5831633" cy="461665"/>
-          </a:xfrm>
-          <a:prstGeom prst="rect">
-            <a:avLst/>
-          </a:prstGeom>
-          <a:noFill/>
-        </p:spPr>
-        <p:txBody>
-          <a:bodyPr wrap="square" rtlCol="0">
-            <a:spAutoFit/>
-          </a:bodyPr>
-          <a:lstStyle/>
-          <a:p>
-            <a:r>
-              <a:rPr lang="en-US" sz="2400" dirty="0">
-                <a:latin typeface="Arial Black" panose="020B0A04020102020204" pitchFamily="34" charset="0"/>
-              </a:rPr>
-              <a:t>Why attack AES?</a:t>
-            </a:r>
-            <a:endParaRPr lang="el-GR" sz="2400" dirty="0">
-              <a:latin typeface="Arial Black" panose="020B0A04020102020204" pitchFamily="34" charset="0"/>
-            </a:endParaRPr>
-          </a:p>
-        </p:txBody>
-      </p:sp>
-      <p:sp>
-        <p:nvSpPr>
-          <p:cNvPr id="5" name="TextBox 4">
-            <a:extLst>
-              <a:ext uri="{FF2B5EF4-FFF2-40B4-BE49-F238E27FC236}">
-                <a16:creationId xmlns:a16="http://schemas.microsoft.com/office/drawing/2014/main" id="{A70E2461-D893-2023-C920-E90D61F8B387}"/>
-              </a:ext>
-            </a:extLst>
-          </p:cNvPr>
-          <p:cNvSpPr txBox="1"/>
-          <p:nvPr/>
-        </p:nvSpPr>
-        <p:spPr>
-          <a:xfrm>
-            <a:off x="2540663" y="2308082"/>
-            <a:ext cx="5094622" cy="3139321"/>
-          </a:xfrm>
-          <a:prstGeom prst="rect">
-            <a:avLst/>
-          </a:prstGeom>
-          <a:noFill/>
-        </p:spPr>
-        <p:txBody>
-          <a:bodyPr wrap="square" rtlCol="0">
-            <a:spAutoFit/>
-          </a:bodyPr>
-          <a:lstStyle/>
-          <a:p>
-            <a:r>
-              <a:rPr lang="en-US" dirty="0"/>
-              <a:t>AES is :</a:t>
-            </a:r>
-          </a:p>
-          <a:p>
-            <a:endParaRPr lang="en-US" dirty="0"/>
-          </a:p>
-          <a:p>
-            <a:pPr marL="285750" indent="-285750">
-              <a:buFont typeface="Arial" panose="020B0604020202020204" pitchFamily="34" charset="0"/>
-              <a:buChar char="•"/>
-            </a:pPr>
-            <a:r>
-              <a:rPr lang="en-US" dirty="0"/>
-              <a:t>One of the most popular encryption standards.</a:t>
-            </a:r>
-          </a:p>
-          <a:p>
-            <a:pPr marL="285750" indent="-285750">
-              <a:buFont typeface="Arial" panose="020B0604020202020204" pitchFamily="34" charset="0"/>
-              <a:buChar char="•"/>
-            </a:pPr>
-            <a:r>
-              <a:rPr lang="en-US" dirty="0"/>
-              <a:t>Used broadly all over the world.</a:t>
-            </a:r>
-          </a:p>
-          <a:p>
-            <a:pPr marL="285750" indent="-285750">
-              <a:buFont typeface="Arial" panose="020B0604020202020204" pitchFamily="34" charset="0"/>
-              <a:buChar char="•"/>
-            </a:pPr>
-            <a:r>
-              <a:rPr lang="en-US" dirty="0"/>
-              <a:t>Is globally standardized, regulated and incompliance with governments, individuals and enterprises.</a:t>
-            </a:r>
-          </a:p>
-          <a:p>
-            <a:pPr marL="285750" indent="-285750">
-              <a:buFont typeface="Arial" panose="020B0604020202020204" pitchFamily="34" charset="0"/>
-              <a:buChar char="•"/>
-            </a:pPr>
-            <a:r>
-              <a:rPr lang="en-US" dirty="0"/>
-              <a:t>Is efficient in terms of processing power and memory usage so it is used everywhere.</a:t>
-            </a:r>
-          </a:p>
-          <a:p>
-            <a:pPr marL="285750" indent="-285750">
-              <a:buFont typeface="Arial" panose="020B0604020202020204" pitchFamily="34" charset="0"/>
-              <a:buChar char="•"/>
-            </a:pPr>
-            <a:endParaRPr lang="en-US" dirty="0"/>
-          </a:p>
-          <a:p>
-            <a:pPr marL="285750" indent="-285750">
-              <a:buFont typeface="Arial" panose="020B0604020202020204" pitchFamily="34" charset="0"/>
-              <a:buChar char="•"/>
-            </a:pPr>
-            <a:endParaRPr lang="el-GR" dirty="0"/>
-          </a:p>
-        </p:txBody>
-      </p:sp>
-      <p:pic>
-        <p:nvPicPr>
-          <p:cNvPr id="1026" name="Picture 2" descr="What is Advanced Encryption Standard (AES)? Definition, Encrption,  Decryption, Advantages and Disadvantages - Binary Terms">
-            <a:extLst>
-              <a:ext uri="{FF2B5EF4-FFF2-40B4-BE49-F238E27FC236}">
-                <a16:creationId xmlns:a16="http://schemas.microsoft.com/office/drawing/2014/main" id="{4216DE81-B276-3417-D499-8AE3E6086B5C}"/>
-              </a:ext>
-            </a:extLst>
-          </p:cNvPr>
-          <p:cNvPicPr>
-            <a:picLocks noChangeAspect="1" noChangeArrowheads="1"/>
-          </p:cNvPicPr>
-          <p:nvPr/>
-        </p:nvPicPr>
-        <p:blipFill>
-          <a:blip r:embed="rId2">
-            <a:extLst>
-              <a:ext uri="{28A0092B-C50C-407E-A947-70E740481C1C}">
-                <a14:useLocalDpi xmlns:a14="http://schemas.microsoft.com/office/drawing/2010/main" val="0"/>
-              </a:ext>
-            </a:extLst>
-          </a:blip>
-          <a:srcRect/>
-          <a:stretch>
-            <a:fillRect/>
-          </a:stretch>
-        </p:blipFill>
-        <p:spPr bwMode="auto">
-          <a:xfrm>
-            <a:off x="8768693" y="272627"/>
-            <a:ext cx="2724347" cy="5421086"/>
-          </a:xfrm>
-          <a:prstGeom prst="rect">
-            <a:avLst/>
-          </a:prstGeom>
-          <a:noFill/>
-          <a:extLst>
-            <a:ext uri="{909E8E84-426E-40DD-AFC4-6F175D3DCCD1}">
-              <a14:hiddenFill xmlns:a14="http://schemas.microsoft.com/office/drawing/2010/main">
-                <a:solidFill>
-                  <a:srgbClr val="FFFFFF"/>
-                </a:solidFill>
-              </a14:hiddenFill>
-            </a:ext>
-          </a:extLst>
-        </p:spPr>
-      </p:pic>
-      <p:pic>
-        <p:nvPicPr>
-          <p:cNvPr id="2" name="Graphic 1">
-            <a:extLst>
-              <a:ext uri="{FF2B5EF4-FFF2-40B4-BE49-F238E27FC236}">
-                <a16:creationId xmlns:a16="http://schemas.microsoft.com/office/drawing/2014/main" id="{9C72679D-AA50-562F-B353-8B3D4B95CEFC}"/>
-              </a:ext>
-            </a:extLst>
-          </p:cNvPr>
-          <p:cNvPicPr>
-            <a:picLocks noChangeAspect="1"/>
-          </p:cNvPicPr>
-          <p:nvPr/>
-        </p:nvPicPr>
-        <p:blipFill>
-          <a:blip r:embed="rId3">
-            <a:extLst>
-              <a:ext uri="{96DAC541-7B7A-43D3-8B79-37D633B846F1}">
-                <asvg:svgBlip xmlns:asvg="http://schemas.microsoft.com/office/drawing/2016/SVG/main" r:embed="rId4"/>
-              </a:ext>
-            </a:extLst>
-          </a:blip>
-          <a:stretch>
-            <a:fillRect/>
-          </a:stretch>
-        </p:blipFill>
-        <p:spPr>
-          <a:xfrm>
-            <a:off x="-578735" y="2983170"/>
-            <a:ext cx="13689573" cy="6858000"/>
-          </a:xfrm>
-          <a:prstGeom prst="rect">
-            <a:avLst/>
-          </a:prstGeom>
-        </p:spPr>
-      </p:pic>
-      <p:pic>
-        <p:nvPicPr>
-          <p:cNvPr id="3" name="Graphic 2">
-            <a:extLst>
-              <a:ext uri="{FF2B5EF4-FFF2-40B4-BE49-F238E27FC236}">
-                <a16:creationId xmlns:a16="http://schemas.microsoft.com/office/drawing/2014/main" id="{D6EB8113-D6BD-90CB-5E4C-F9151A7F9DFB}"/>
-              </a:ext>
-            </a:extLst>
-          </p:cNvPr>
-          <p:cNvPicPr>
-            <a:picLocks noChangeAspect="1"/>
-          </p:cNvPicPr>
-          <p:nvPr/>
-        </p:nvPicPr>
-        <p:blipFill>
-          <a:blip r:embed="rId5">
-            <a:extLst>
-              <a:ext uri="{96DAC541-7B7A-43D3-8B79-37D633B846F1}">
-                <asvg:svgBlip xmlns:asvg="http://schemas.microsoft.com/office/drawing/2016/SVG/main" r:embed="rId6"/>
-              </a:ext>
-            </a:extLst>
-          </a:blip>
-          <a:stretch>
-            <a:fillRect/>
-          </a:stretch>
-        </p:blipFill>
-        <p:spPr>
-          <a:xfrm>
-            <a:off x="-5530732" y="-3526386"/>
-            <a:ext cx="11061463" cy="6858000"/>
-          </a:xfrm>
-          <a:prstGeom prst="rect">
-            <a:avLst/>
-          </a:prstGeom>
-        </p:spPr>
-      </p:pic>
-    </p:spTree>
-    <p:extLst>
-      <p:ext uri="{BB962C8B-B14F-4D97-AF65-F5344CB8AC3E}">
-        <p14:creationId xmlns:p14="http://schemas.microsoft.com/office/powerpoint/2010/main" val="4050734263"/>
-      </p:ext>
-    </p:extLst>
-  </p:cSld>
-  <p:clrMapOvr>
-    <a:masterClrMapping/>
-  </p:clrMapOvr>
-</p:sld>
-</file>
-
 <file path=ppt/slides/slide18.xml><?xml version="1.0" encoding="utf-8"?>
 <p:sld xmlns:a="http://schemas.openxmlformats.org/drawingml/2006/main" xmlns:r="http://schemas.openxmlformats.org/officeDocument/2006/relationships" xmlns:p="http://schemas.openxmlformats.org/presentationml/2006/main">
   <p:cSld>
@@ -6902,10 +7147,10 @@
       </p:grpSpPr>
       <p:sp>
         <p:nvSpPr>
-          <p:cNvPr id="9" name="TextBox 8">
-            <a:extLst>
-              <a:ext uri="{FF2B5EF4-FFF2-40B4-BE49-F238E27FC236}">
-                <a16:creationId xmlns:a16="http://schemas.microsoft.com/office/drawing/2014/main" id="{26EDB7A8-B89C-8B2D-95E4-664D4333450A}"/>
+          <p:cNvPr id="4" name="TextBox 3">
+            <a:extLst>
+              <a:ext uri="{FF2B5EF4-FFF2-40B4-BE49-F238E27FC236}">
+                <a16:creationId xmlns:a16="http://schemas.microsoft.com/office/drawing/2014/main" id="{D2DD5275-256A-0E3B-37C5-D82D8BB5C6D3}"/>
               </a:ext>
             </a:extLst>
           </p:cNvPr>
@@ -6914,8 +7159,8 @@
         </p:nvSpPr>
         <p:spPr>
           <a:xfrm>
-            <a:off x="3316825" y="1305341"/>
-            <a:ext cx="5001208" cy="4247317"/>
+            <a:off x="3180183" y="1222963"/>
+            <a:ext cx="5831633" cy="461665"/>
           </a:xfrm>
           <a:prstGeom prst="rect">
             <a:avLst/>
@@ -6929,82 +7174,115 @@
           <a:lstStyle/>
           <a:p>
             <a:r>
+              <a:rPr lang="en-US" sz="2400" dirty="0">
+                <a:latin typeface="Arial Black" panose="020B0A04020102020204" pitchFamily="34" charset="0"/>
+              </a:rPr>
+              <a:t>Why attack AES?</a:t>
+            </a:r>
+            <a:endParaRPr lang="el-GR" sz="2400" dirty="0">
+              <a:latin typeface="Arial Black" panose="020B0A04020102020204" pitchFamily="34" charset="0"/>
+            </a:endParaRPr>
+          </a:p>
+        </p:txBody>
+      </p:sp>
+      <p:sp>
+        <p:nvSpPr>
+          <p:cNvPr id="5" name="TextBox 4">
+            <a:extLst>
+              <a:ext uri="{FF2B5EF4-FFF2-40B4-BE49-F238E27FC236}">
+                <a16:creationId xmlns:a16="http://schemas.microsoft.com/office/drawing/2014/main" id="{A70E2461-D893-2023-C920-E90D61F8B387}"/>
+              </a:ext>
+            </a:extLst>
+          </p:cNvPr>
+          <p:cNvSpPr txBox="1"/>
+          <p:nvPr/>
+        </p:nvSpPr>
+        <p:spPr>
+          <a:xfrm>
+            <a:off x="2540663" y="2308082"/>
+            <a:ext cx="5094622" cy="3139321"/>
+          </a:xfrm>
+          <a:prstGeom prst="rect">
+            <a:avLst/>
+          </a:prstGeom>
+          <a:noFill/>
+        </p:spPr>
+        <p:txBody>
+          <a:bodyPr wrap="square" rtlCol="0">
+            <a:spAutoFit/>
+          </a:bodyPr>
+          <a:lstStyle/>
+          <a:p>
+            <a:r>
               <a:rPr lang="en-US" dirty="0"/>
-              <a:t>Our malicious code implementation methodology is:</a:t>
+              <a:t>AES is :</a:t>
             </a:r>
           </a:p>
           <a:p>
             <a:endParaRPr lang="en-US" dirty="0"/>
           </a:p>
           <a:p>
-            <a:pPr marL="342900" indent="-342900">
-              <a:buFont typeface="+mj-lt"/>
-              <a:buAutoNum type="arabicPeriod"/>
-            </a:pPr>
-            <a:r>
-              <a:rPr lang="en-US" dirty="0"/>
-              <a:t>We first analyzed the code in the </a:t>
-            </a:r>
-            <a:r>
-              <a:rPr lang="en-US" dirty="0">
-                <a:hlinkClick r:id="rId2"/>
-              </a:rPr>
-              <a:t>GitHub repository</a:t>
-            </a:r>
-            <a:r>
-              <a:rPr lang="en-US" dirty="0"/>
-              <a:t>.</a:t>
-            </a:r>
-          </a:p>
-          <a:p>
-            <a:pPr marL="342900" indent="-342900">
-              <a:buFont typeface="+mj-lt"/>
-              <a:buAutoNum type="arabicPeriod"/>
-            </a:pPr>
-            <a:r>
-              <a:rPr lang="en-US" dirty="0"/>
-              <a:t>We use a shift register to store the key.</a:t>
-            </a:r>
-          </a:p>
-          <a:p>
-            <a:pPr marL="342900" indent="-342900">
-              <a:buFont typeface="+mj-lt"/>
-              <a:buAutoNum type="arabicPeriod"/>
-            </a:pPr>
-            <a:r>
-              <a:rPr lang="en-US" dirty="0"/>
-              <a:t>When a pattern is detected through a FSM we use a covert way of leaking the key by</a:t>
-            </a:r>
-          </a:p>
-          <a:p>
-            <a:pPr marL="800100" lvl="1" indent="-342900">
+            <a:pPr marL="285750" indent="-285750">
               <a:buFont typeface="Arial" panose="020B0604020202020204" pitchFamily="34" charset="0"/>
               <a:buChar char="•"/>
             </a:pPr>
             <a:r>
               <a:rPr lang="en-US" dirty="0"/>
-              <a:t>modulating an (unused) pin on chip that generates an RF signal. This signal can be used to transmit the key bits. Then it can be received with an ordinary AM radio. </a:t>
-            </a:r>
-          </a:p>
-          <a:p>
-            <a:pPr marL="342900" indent="-342900">
-              <a:buFont typeface="+mj-lt"/>
-              <a:buAutoNum type="arabicPeriod"/>
+              <a:t>One of the most popular encryption standards.</a:t>
+            </a:r>
+          </a:p>
+          <a:p>
+            <a:pPr marL="285750" indent="-285750">
+              <a:buFont typeface="Arial" panose="020B0604020202020204" pitchFamily="34" charset="0"/>
+              <a:buChar char="•"/>
             </a:pPr>
             <a:r>
               <a:rPr lang="en-US" dirty="0"/>
-              <a:t>The data carried by the AM signal needs to be easily interpreted by a human by using a beep scheme.</a:t>
-            </a:r>
+              <a:t>Used broadly all over the world.</a:t>
+            </a:r>
+          </a:p>
+          <a:p>
+            <a:pPr marL="285750" indent="-285750">
+              <a:buFont typeface="Arial" panose="020B0604020202020204" pitchFamily="34" charset="0"/>
+              <a:buChar char="•"/>
+            </a:pPr>
+            <a:r>
+              <a:rPr lang="en-US" dirty="0"/>
+              <a:t>Is globally standardized, regulated and incompliance with governments, individuals and enterprises.</a:t>
+            </a:r>
+          </a:p>
+          <a:p>
+            <a:pPr marL="285750" indent="-285750">
+              <a:buFont typeface="Arial" panose="020B0604020202020204" pitchFamily="34" charset="0"/>
+              <a:buChar char="•"/>
+            </a:pPr>
+            <a:r>
+              <a:rPr lang="en-US" dirty="0"/>
+              <a:t>Is efficient in terms of processing power and memory usage so it is used everywhere.</a:t>
+            </a:r>
+          </a:p>
+          <a:p>
+            <a:pPr marL="285750" indent="-285750">
+              <a:buFont typeface="Arial" panose="020B0604020202020204" pitchFamily="34" charset="0"/>
+              <a:buChar char="•"/>
+            </a:pPr>
+            <a:endParaRPr lang="en-US" dirty="0"/>
+          </a:p>
+          <a:p>
+            <a:pPr marL="285750" indent="-285750">
+              <a:buFont typeface="Arial" panose="020B0604020202020204" pitchFamily="34" charset="0"/>
+              <a:buChar char="•"/>
+            </a:pPr>
             <a:endParaRPr lang="el-GR" dirty="0"/>
           </a:p>
         </p:txBody>
       </p:sp>
       <p:pic>
         <p:nvPicPr>
-          <p:cNvPr id="2" name="Picture 2" descr="What is Advanced Encryption Standard (AES)? Definition, Encrption,  Decryption, Advantages and Disadvantages - Binary Terms">
-            <a:extLst>
-              <a:ext uri="{FF2B5EF4-FFF2-40B4-BE49-F238E27FC236}">
-                <a16:creationId xmlns:a16="http://schemas.microsoft.com/office/drawing/2014/main" id="{F337BB01-09AA-3825-7921-78372CB965AC}"/>
+          <p:cNvPr id="1026" name="Picture 2" descr="What is Advanced Encryption Standard (AES)? Definition, Encrption,  Decryption, Advantages and Disadvantages - Binary Terms">
+            <a:extLst>
+              <a:ext uri="{FF2B5EF4-FFF2-40B4-BE49-F238E27FC236}">
+                <a16:creationId xmlns:a16="http://schemas.microsoft.com/office/drawing/2014/main" id="{4216DE81-B276-3417-D499-8AE3E6086B5C}"/>
               </a:ext>
             </a:extLst>
           </p:cNvPr>
@@ -7014,7 +7292,7 @@
           <p:nvPr/>
         </p:nvPicPr>
         <p:blipFill>
-          <a:blip r:embed="rId3">
+          <a:blip r:embed="rId2">
             <a:extLst>
               <a:ext uri="{28A0092B-C50C-407E-A947-70E740481C1C}">
                 <a14:useLocalDpi xmlns:a14="http://schemas.microsoft.com/office/drawing/2010/main" val="0"/>
@@ -7028,7 +7306,7 @@
         </p:blipFill>
         <p:spPr bwMode="auto">
           <a:xfrm>
-            <a:off x="8677669" y="360142"/>
+            <a:off x="8768693" y="272627"/>
             <a:ext cx="2724347" cy="5421086"/>
           </a:xfrm>
           <a:prstGeom prst="rect">
@@ -7048,10 +7326,10 @@
       </p:pic>
       <p:pic>
         <p:nvPicPr>
-          <p:cNvPr id="3" name="Graphic 2">
-            <a:extLst>
-              <a:ext uri="{FF2B5EF4-FFF2-40B4-BE49-F238E27FC236}">
-                <a16:creationId xmlns:a16="http://schemas.microsoft.com/office/drawing/2014/main" id="{7FD5AA48-00C1-3EB0-9FEB-0B1A682C0CB1}"/>
+          <p:cNvPr id="2" name="Graphic 1">
+            <a:extLst>
+              <a:ext uri="{FF2B5EF4-FFF2-40B4-BE49-F238E27FC236}">
+                <a16:creationId xmlns:a16="http://schemas.microsoft.com/office/drawing/2014/main" id="{9C72679D-AA50-562F-B353-8B3D4B95CEFC}"/>
               </a:ext>
             </a:extLst>
           </p:cNvPr>
@@ -7061,10 +7339,10 @@
           <p:nvPr/>
         </p:nvPicPr>
         <p:blipFill>
-          <a:blip r:embed="rId4">
+          <a:blip r:embed="rId3">
             <a:extLst>
               <a:ext uri="{96DAC541-7B7A-43D3-8B79-37D633B846F1}">
-                <asvg:svgBlip xmlns:asvg="http://schemas.microsoft.com/office/drawing/2016/SVG/main" r:embed="rId5"/>
+                <asvg:svgBlip xmlns:asvg="http://schemas.microsoft.com/office/drawing/2016/SVG/main" r:embed="rId4"/>
               </a:ext>
             </a:extLst>
           </a:blip>
@@ -7084,10 +7362,10 @@
       </p:pic>
       <p:pic>
         <p:nvPicPr>
-          <p:cNvPr id="4" name="Graphic 3">
-            <a:extLst>
-              <a:ext uri="{FF2B5EF4-FFF2-40B4-BE49-F238E27FC236}">
-                <a16:creationId xmlns:a16="http://schemas.microsoft.com/office/drawing/2014/main" id="{45420F22-82E6-BFAE-0B9C-7EB29E97679F}"/>
+          <p:cNvPr id="3" name="Graphic 2">
+            <a:extLst>
+              <a:ext uri="{FF2B5EF4-FFF2-40B4-BE49-F238E27FC236}">
+                <a16:creationId xmlns:a16="http://schemas.microsoft.com/office/drawing/2014/main" id="{D6EB8113-D6BD-90CB-5E4C-F9151A7F9DFB}"/>
               </a:ext>
             </a:extLst>
           </p:cNvPr>
@@ -7097,10 +7375,10 @@
           <p:nvPr/>
         </p:nvPicPr>
         <p:blipFill>
-          <a:blip r:embed="rId6">
+          <a:blip r:embed="rId5">
             <a:extLst>
               <a:ext uri="{96DAC541-7B7A-43D3-8B79-37D633B846F1}">
-                <asvg:svgBlip xmlns:asvg="http://schemas.microsoft.com/office/drawing/2016/SVG/main" r:embed="rId7"/>
+                <asvg:svgBlip xmlns:asvg="http://schemas.microsoft.com/office/drawing/2016/SVG/main" r:embed="rId6"/>
               </a:ext>
             </a:extLst>
           </a:blip>
@@ -7121,7 +7399,7 @@
     </p:spTree>
     <p:extLst>
       <p:ext uri="{BB962C8B-B14F-4D97-AF65-F5344CB8AC3E}">
-        <p14:creationId xmlns:p14="http://schemas.microsoft.com/office/powerpoint/2010/main" val="1948821609"/>
+        <p14:creationId xmlns:p14="http://schemas.microsoft.com/office/powerpoint/2010/main" val="4050734263"/>
       </p:ext>
     </p:extLst>
   </p:cSld>
@@ -7148,48 +7426,178 @@
           <a:chExt cx="0" cy="0"/>
         </a:xfrm>
       </p:grpSpPr>
+      <p:sp>
+        <p:nvSpPr>
+          <p:cNvPr id="9" name="TextBox 8">
+            <a:extLst>
+              <a:ext uri="{FF2B5EF4-FFF2-40B4-BE49-F238E27FC236}">
+                <a16:creationId xmlns:a16="http://schemas.microsoft.com/office/drawing/2014/main" id="{26EDB7A8-B89C-8B2D-95E4-664D4333450A}"/>
+              </a:ext>
+            </a:extLst>
+          </p:cNvPr>
+          <p:cNvSpPr txBox="1"/>
+          <p:nvPr/>
+        </p:nvSpPr>
+        <p:spPr>
+          <a:xfrm>
+            <a:off x="3224213" y="1305341"/>
+            <a:ext cx="5093820" cy="3970318"/>
+          </a:xfrm>
+          <a:prstGeom prst="rect">
+            <a:avLst/>
+          </a:prstGeom>
+          <a:noFill/>
+        </p:spPr>
+        <p:txBody>
+          <a:bodyPr wrap="square" rtlCol="0">
+            <a:spAutoFit/>
+          </a:bodyPr>
+          <a:lstStyle/>
+          <a:p>
+            <a:r>
+              <a:rPr lang="en-US" dirty="0"/>
+              <a:t>Our malicious code implementation methodology is:</a:t>
+            </a:r>
+          </a:p>
+          <a:p>
+            <a:endParaRPr lang="en-US" dirty="0"/>
+          </a:p>
+          <a:p>
+            <a:pPr marL="342900" indent="-342900">
+              <a:buFont typeface="+mj-lt"/>
+              <a:buAutoNum type="arabicPeriod"/>
+            </a:pPr>
+            <a:r>
+              <a:rPr lang="en-US" dirty="0"/>
+              <a:t>We first analyzed the code in the </a:t>
+            </a:r>
+            <a:r>
+              <a:rPr lang="en-US" dirty="0">
+                <a:hlinkClick r:id="rId2"/>
+              </a:rPr>
+              <a:t>GitHub repository</a:t>
+            </a:r>
+            <a:r>
+              <a:rPr lang="en-US" dirty="0"/>
+              <a:t>.</a:t>
+            </a:r>
+          </a:p>
+          <a:p>
+            <a:pPr marL="342900" indent="-342900">
+              <a:buFont typeface="+mj-lt"/>
+              <a:buAutoNum type="arabicPeriod"/>
+            </a:pPr>
+            <a:r>
+              <a:rPr lang="en-US" dirty="0"/>
+              <a:t>We use a shift register to store the key.</a:t>
+            </a:r>
+          </a:p>
+          <a:p>
+            <a:pPr marL="342900" indent="-342900">
+              <a:buFont typeface="+mj-lt"/>
+              <a:buAutoNum type="arabicPeriod"/>
+            </a:pPr>
+            <a:r>
+              <a:rPr lang="en-US" dirty="0"/>
+              <a:t>We use a covert way of leaking the key by</a:t>
+            </a:r>
+          </a:p>
+          <a:p>
+            <a:pPr marL="800100" lvl="1" indent="-342900">
+              <a:buFont typeface="Arial" panose="020B0604020202020204" pitchFamily="34" charset="0"/>
+              <a:buChar char="•"/>
+            </a:pPr>
+            <a:r>
+              <a:rPr lang="en-US" dirty="0"/>
+              <a:t>modulating an (unused) pin on chip that generates an RF signal. </a:t>
+            </a:r>
+          </a:p>
+          <a:p>
+            <a:pPr marL="800100" lvl="1" indent="-342900">
+              <a:buFont typeface="Arial" panose="020B0604020202020204" pitchFamily="34" charset="0"/>
+              <a:buChar char="•"/>
+            </a:pPr>
+            <a:r>
+              <a:rPr lang="en-US" dirty="0"/>
+              <a:t>This signal can be used to transmit the key bits. </a:t>
+            </a:r>
+          </a:p>
+          <a:p>
+            <a:pPr marL="800100" lvl="1" indent="-342900">
+              <a:buFont typeface="Arial" panose="020B0604020202020204" pitchFamily="34" charset="0"/>
+              <a:buChar char="•"/>
+            </a:pPr>
+            <a:r>
+              <a:rPr lang="en-US" dirty="0"/>
+              <a:t>Then it can be received with an ordinary AM radio. </a:t>
+            </a:r>
+          </a:p>
+          <a:p>
+            <a:pPr marL="342900" indent="-342900">
+              <a:buFont typeface="+mj-lt"/>
+              <a:buAutoNum type="arabicPeriod"/>
+            </a:pPr>
+            <a:r>
+              <a:rPr lang="en-US" dirty="0"/>
+              <a:t>The data carried by the AM signal can be easily interpreted by a human by using a beep scheme.</a:t>
+            </a:r>
+            <a:endParaRPr lang="el-GR" dirty="0"/>
+          </a:p>
+        </p:txBody>
+      </p:sp>
       <p:pic>
         <p:nvPicPr>
-          <p:cNvPr id="5" name="Graphic 4">
-            <a:extLst>
-              <a:ext uri="{FF2B5EF4-FFF2-40B4-BE49-F238E27FC236}">
-                <a16:creationId xmlns:a16="http://schemas.microsoft.com/office/drawing/2014/main" id="{6FCCD93E-8B35-0F75-9CF5-80CF88A2FE76}"/>
+          <p:cNvPr id="2" name="Picture 2" descr="What is Advanced Encryption Standard (AES)? Definition, Encrption,  Decryption, Advantages and Disadvantages - Binary Terms">
+            <a:extLst>
+              <a:ext uri="{FF2B5EF4-FFF2-40B4-BE49-F238E27FC236}">
+                <a16:creationId xmlns:a16="http://schemas.microsoft.com/office/drawing/2014/main" id="{F337BB01-09AA-3825-7921-78372CB965AC}"/>
               </a:ext>
             </a:extLst>
           </p:cNvPr>
           <p:cNvPicPr>
-            <a:picLocks noChangeAspect="1"/>
+            <a:picLocks noChangeAspect="1" noChangeArrowheads="1"/>
           </p:cNvPicPr>
           <p:nvPr/>
         </p:nvPicPr>
         <p:blipFill>
-          <a:blip r:embed="rId2">
-            <a:extLst>
-              <a:ext uri="{96DAC541-7B7A-43D3-8B79-37D633B846F1}">
-                <asvg:svgBlip xmlns:asvg="http://schemas.microsoft.com/office/drawing/2016/SVG/main" r:embed="rId3"/>
+          <a:blip r:embed="rId3">
+            <a:extLst>
+              <a:ext uri="{28A0092B-C50C-407E-A947-70E740481C1C}">
+                <a14:useLocalDpi xmlns:a14="http://schemas.microsoft.com/office/drawing/2010/main" val="0"/>
               </a:ext>
             </a:extLst>
           </a:blip>
+          <a:srcRect/>
           <a:stretch>
             <a:fillRect/>
           </a:stretch>
         </p:blipFill>
-        <p:spPr>
-          <a:xfrm>
-            <a:off x="-578735" y="2983170"/>
-            <a:ext cx="13689573" cy="6858000"/>
+        <p:spPr bwMode="auto">
+          <a:xfrm>
+            <a:off x="8677669" y="360142"/>
+            <a:ext cx="2724347" cy="5421086"/>
           </a:xfrm>
           <a:prstGeom prst="rect">
             <a:avLst/>
           </a:prstGeom>
+          <a:noFill/>
+          <a:extLst>
+            <a:ext uri="{909E8E84-426E-40DD-AFC4-6F175D3DCCD1}">
+              <a14:hiddenFill xmlns:a14="http://schemas.microsoft.com/office/drawing/2010/main">
+                <a:solidFill>
+                  <a:srgbClr val="FFFFFF"/>
+                </a:solidFill>
+              </a14:hiddenFill>
+            </a:ext>
+          </a:extLst>
         </p:spPr>
       </p:pic>
       <p:pic>
         <p:nvPicPr>
-          <p:cNvPr id="8" name="Graphic 7">
-            <a:extLst>
-              <a:ext uri="{FF2B5EF4-FFF2-40B4-BE49-F238E27FC236}">
-                <a16:creationId xmlns:a16="http://schemas.microsoft.com/office/drawing/2014/main" id="{2F8EF2E2-B7B4-2985-2EBC-D7FECAC8D8E8}"/>
+          <p:cNvPr id="3" name="Graphic 2">
+            <a:extLst>
+              <a:ext uri="{FF2B5EF4-FFF2-40B4-BE49-F238E27FC236}">
+                <a16:creationId xmlns:a16="http://schemas.microsoft.com/office/drawing/2014/main" id="{7FD5AA48-00C1-3EB0-9FEB-0B1A682C0CB1}"/>
               </a:ext>
             </a:extLst>
           </p:cNvPr>
@@ -7212,246 +7620,20 @@
         </p:blipFill>
         <p:spPr>
           <a:xfrm>
-            <a:off x="-5530732" y="-3526386"/>
-            <a:ext cx="11061463" cy="6858000"/>
+            <a:off x="-578735" y="2983170"/>
+            <a:ext cx="13689573" cy="6858000"/>
           </a:xfrm>
           <a:prstGeom prst="rect">
             <a:avLst/>
           </a:prstGeom>
         </p:spPr>
       </p:pic>
-      <p:sp>
-        <p:nvSpPr>
-          <p:cNvPr id="2" name="TextBox 1">
-            <a:extLst>
-              <a:ext uri="{FF2B5EF4-FFF2-40B4-BE49-F238E27FC236}">
-                <a16:creationId xmlns:a16="http://schemas.microsoft.com/office/drawing/2014/main" id="{69DFECC6-7A19-B2A9-07C4-56409A6A907B}"/>
-              </a:ext>
-            </a:extLst>
-          </p:cNvPr>
-          <p:cNvSpPr txBox="1"/>
-          <p:nvPr/>
-        </p:nvSpPr>
-        <p:spPr>
-          <a:xfrm>
-            <a:off x="7643637" y="2872924"/>
-            <a:ext cx="3665377" cy="923330"/>
-          </a:xfrm>
-          <a:prstGeom prst="rect">
-            <a:avLst/>
-          </a:prstGeom>
-          <a:noFill/>
-        </p:spPr>
-        <p:txBody>
-          <a:bodyPr wrap="square" rtlCol="0">
-            <a:spAutoFit/>
-          </a:bodyPr>
-          <a:lstStyle/>
-          <a:p>
-            <a:pPr algn="ctr"/>
-            <a:r>
-              <a:rPr lang="en-US" dirty="0">
-                <a:hlinkClick r:id="rId6"/>
-              </a:rPr>
-              <a:t>Prompt for </a:t>
-            </a:r>
-            <a:r>
-              <a:rPr lang="en-US" dirty="0" err="1">
-                <a:hlinkClick r:id="rId6"/>
-              </a:rPr>
-              <a:t>transmit.v</a:t>
-            </a:r>
-            <a:r>
-              <a:rPr lang="en-US" dirty="0">
-                <a:hlinkClick r:id="rId6"/>
-              </a:rPr>
-              <a:t> : https://chat.openai.com/share/8c8fb17c-6647-4eee-8c1e-71c2bc0c1b95</a:t>
-            </a:r>
-            <a:endParaRPr lang="el-GR" dirty="0"/>
-          </a:p>
-        </p:txBody>
-      </p:sp>
-      <p:sp>
-        <p:nvSpPr>
-          <p:cNvPr id="3" name="TextBox 2">
-            <a:extLst>
-              <a:ext uri="{FF2B5EF4-FFF2-40B4-BE49-F238E27FC236}">
-                <a16:creationId xmlns:a16="http://schemas.microsoft.com/office/drawing/2014/main" id="{7622558D-FAB4-5C35-5F64-F883459FD0DF}"/>
-              </a:ext>
-            </a:extLst>
-          </p:cNvPr>
-          <p:cNvSpPr txBox="1"/>
-          <p:nvPr/>
-        </p:nvSpPr>
-        <p:spPr>
-          <a:xfrm>
-            <a:off x="8464385" y="1957952"/>
-            <a:ext cx="2905276" cy="830997"/>
-          </a:xfrm>
-          <a:prstGeom prst="rect">
-            <a:avLst/>
-          </a:prstGeom>
-          <a:noFill/>
-        </p:spPr>
-        <p:txBody>
-          <a:bodyPr wrap="square" rtlCol="0">
-            <a:spAutoFit/>
-          </a:bodyPr>
-          <a:lstStyle/>
-          <a:p>
-            <a:r>
-              <a:rPr lang="en-US" sz="4800" dirty="0" err="1">
-                <a:latin typeface="Arial Black" panose="020B0A04020102020204" pitchFamily="34" charset="0"/>
-              </a:rPr>
-              <a:t>P.o.C.</a:t>
-            </a:r>
-            <a:endParaRPr lang="el-GR" sz="4800" dirty="0">
-              <a:latin typeface="Arial Black" panose="020B0A04020102020204" pitchFamily="34" charset="0"/>
-            </a:endParaRPr>
-          </a:p>
-        </p:txBody>
-      </p:sp>
-      <p:sp>
-        <p:nvSpPr>
-          <p:cNvPr id="4" name="TextBox 3">
-            <a:extLst>
-              <a:ext uri="{FF2B5EF4-FFF2-40B4-BE49-F238E27FC236}">
-                <a16:creationId xmlns:a16="http://schemas.microsoft.com/office/drawing/2014/main" id="{BFDFE2F0-E799-5B63-B8B7-6178A35D2DD4}"/>
-              </a:ext>
-            </a:extLst>
-          </p:cNvPr>
-          <p:cNvSpPr txBox="1"/>
-          <p:nvPr/>
-        </p:nvSpPr>
-        <p:spPr>
-          <a:xfrm>
-            <a:off x="3143381" y="1145392"/>
-            <a:ext cx="4436705" cy="646331"/>
-          </a:xfrm>
-          <a:prstGeom prst="rect">
-            <a:avLst/>
-          </a:prstGeom>
-          <a:noFill/>
-        </p:spPr>
-        <p:txBody>
-          <a:bodyPr wrap="square" rtlCol="0">
-            <a:spAutoFit/>
-          </a:bodyPr>
-          <a:lstStyle/>
-          <a:p>
-            <a:r>
-              <a:rPr lang="en-US" dirty="0"/>
-              <a:t>Leaking the key by modulating an (unused) pin on chip that generates an RF signal. </a:t>
-            </a:r>
-            <a:endParaRPr lang="el-GR" dirty="0"/>
-          </a:p>
-        </p:txBody>
-      </p:sp>
-      <p:sp>
-        <p:nvSpPr>
-          <p:cNvPr id="6" name="TextBox 5">
-            <a:extLst>
-              <a:ext uri="{FF2B5EF4-FFF2-40B4-BE49-F238E27FC236}">
-                <a16:creationId xmlns:a16="http://schemas.microsoft.com/office/drawing/2014/main" id="{4186C9DF-43D9-0C3B-5DFD-52EAF2C46AE2}"/>
-              </a:ext>
-            </a:extLst>
-          </p:cNvPr>
-          <p:cNvSpPr txBox="1"/>
-          <p:nvPr/>
-        </p:nvSpPr>
-        <p:spPr>
-          <a:xfrm>
-            <a:off x="1904066" y="2532594"/>
-            <a:ext cx="4697964" cy="2308324"/>
-          </a:xfrm>
-          <a:prstGeom prst="rect">
-            <a:avLst/>
-          </a:prstGeom>
-          <a:noFill/>
-        </p:spPr>
-        <p:txBody>
-          <a:bodyPr wrap="square" rtlCol="0">
-            <a:spAutoFit/>
-          </a:bodyPr>
-          <a:lstStyle/>
-          <a:p>
-            <a:r>
-              <a:rPr lang="en-US" dirty="0"/>
-              <a:t>Severity of the vulnerability:</a:t>
-            </a:r>
-          </a:p>
-          <a:p>
-            <a:endParaRPr lang="en-US" dirty="0"/>
-          </a:p>
-          <a:p>
-            <a:pPr marL="285750" indent="-285750">
-              <a:buFont typeface="Arial" panose="020B0604020202020204" pitchFamily="34" charset="0"/>
-              <a:buChar char="•"/>
-            </a:pPr>
-            <a:r>
-              <a:rPr lang="en-US" dirty="0"/>
-              <a:t>Insertion phase: Design</a:t>
-            </a:r>
-          </a:p>
-          <a:p>
-            <a:pPr marL="285750" indent="-285750">
-              <a:buFont typeface="Arial" panose="020B0604020202020204" pitchFamily="34" charset="0"/>
-              <a:buChar char="•"/>
-            </a:pPr>
-            <a:r>
-              <a:rPr lang="en-US" dirty="0"/>
-              <a:t>Abstraction level: Register Transfer level</a:t>
-            </a:r>
-          </a:p>
-          <a:p>
-            <a:pPr marL="285750" indent="-285750">
-              <a:buFont typeface="Arial" panose="020B0604020202020204" pitchFamily="34" charset="0"/>
-              <a:buChar char="•"/>
-            </a:pPr>
-            <a:r>
-              <a:rPr lang="en-US" dirty="0"/>
-              <a:t>Act. mechanism: Conditionally triggered</a:t>
-            </a:r>
-          </a:p>
-          <a:p>
-            <a:pPr marL="285750" indent="-285750">
-              <a:buFont typeface="Arial" panose="020B0604020202020204" pitchFamily="34" charset="0"/>
-              <a:buChar char="•"/>
-            </a:pPr>
-            <a:r>
-              <a:rPr lang="en-US" dirty="0"/>
-              <a:t>Effects: Leak Information</a:t>
-            </a:r>
-          </a:p>
-          <a:p>
-            <a:pPr marL="285750" indent="-285750">
-              <a:buFont typeface="Arial" panose="020B0604020202020204" pitchFamily="34" charset="0"/>
-              <a:buChar char="•"/>
-            </a:pPr>
-            <a:r>
-              <a:rPr lang="en-US" dirty="0"/>
-              <a:t>Location: Processor</a:t>
-            </a:r>
-          </a:p>
-          <a:p>
-            <a:pPr marL="285750" indent="-285750">
-              <a:buFont typeface="Arial" panose="020B0604020202020204" pitchFamily="34" charset="0"/>
-              <a:buChar char="•"/>
-            </a:pPr>
-            <a:r>
-              <a:rPr lang="en-US" dirty="0"/>
-              <a:t>Physical characteristics: Functional</a:t>
-            </a:r>
-            <a:endParaRPr lang="el-GR" dirty="0"/>
-          </a:p>
-        </p:txBody>
-      </p:sp>
       <p:pic>
         <p:nvPicPr>
-          <p:cNvPr id="7" name="Picture 6">
-            <a:extLst>
-              <a:ext uri="{FF2B5EF4-FFF2-40B4-BE49-F238E27FC236}">
-                <a16:creationId xmlns:a16="http://schemas.microsoft.com/office/drawing/2014/main" id="{8EB2F85D-7358-EE81-955A-4351684D1AFB}"/>
+          <p:cNvPr id="4" name="Graphic 3">
+            <a:extLst>
+              <a:ext uri="{FF2B5EF4-FFF2-40B4-BE49-F238E27FC236}">
+                <a16:creationId xmlns:a16="http://schemas.microsoft.com/office/drawing/2014/main" id="{45420F22-82E6-BFAE-0B9C-7EB29E97679F}"/>
               </a:ext>
             </a:extLst>
           </p:cNvPr>
@@ -7461,15 +7643,21 @@
           <p:nvPr/>
         </p:nvPicPr>
         <p:blipFill>
-          <a:blip r:embed="rId7"/>
+          <a:blip r:embed="rId6">
+            <a:extLst>
+              <a:ext uri="{96DAC541-7B7A-43D3-8B79-37D633B846F1}">
+                <asvg:svgBlip xmlns:asvg="http://schemas.microsoft.com/office/drawing/2016/SVG/main" r:embed="rId7"/>
+              </a:ext>
+            </a:extLst>
+          </a:blip>
           <a:stretch>
             <a:fillRect/>
           </a:stretch>
         </p:blipFill>
         <p:spPr>
           <a:xfrm>
-            <a:off x="111967" y="4900048"/>
-            <a:ext cx="11803225" cy="1821823"/>
+            <a:off x="-5530732" y="-3526386"/>
+            <a:ext cx="11061463" cy="6858000"/>
           </a:xfrm>
           <a:prstGeom prst="rect">
             <a:avLst/>
@@ -7479,7 +7667,7 @@
     </p:spTree>
     <p:extLst>
       <p:ext uri="{BB962C8B-B14F-4D97-AF65-F5344CB8AC3E}">
-        <p14:creationId xmlns:p14="http://schemas.microsoft.com/office/powerpoint/2010/main" val="3096791553"/>
+        <p14:creationId xmlns:p14="http://schemas.microsoft.com/office/powerpoint/2010/main" val="1948821609"/>
       </p:ext>
     </p:extLst>
   </p:cSld>
@@ -7813,6 +8001,539 @@
 </p:sld>
 </file>
 
+<file path=ppt/slides/slide20.xml><?xml version="1.0" encoding="utf-8"?>
+<p:sld xmlns:a="http://schemas.openxmlformats.org/drawingml/2006/main" xmlns:r="http://schemas.openxmlformats.org/officeDocument/2006/relationships" xmlns:p="http://schemas.openxmlformats.org/presentationml/2006/main">
+  <p:cSld>
+    <p:spTree>
+      <p:nvGrpSpPr>
+        <p:cNvPr id="1" name=""/>
+        <p:cNvGrpSpPr/>
+        <p:nvPr/>
+      </p:nvGrpSpPr>
+      <p:grpSpPr>
+        <a:xfrm>
+          <a:off x="0" y="0"/>
+          <a:ext cx="0" cy="0"/>
+          <a:chOff x="0" y="0"/>
+          <a:chExt cx="0" cy="0"/>
+        </a:xfrm>
+      </p:grpSpPr>
+      <p:pic>
+        <p:nvPicPr>
+          <p:cNvPr id="5" name="Graphic 4">
+            <a:extLst>
+              <a:ext uri="{FF2B5EF4-FFF2-40B4-BE49-F238E27FC236}">
+                <a16:creationId xmlns:a16="http://schemas.microsoft.com/office/drawing/2014/main" id="{6FCCD93E-8B35-0F75-9CF5-80CF88A2FE76}"/>
+              </a:ext>
+            </a:extLst>
+          </p:cNvPr>
+          <p:cNvPicPr>
+            <a:picLocks noChangeAspect="1"/>
+          </p:cNvPicPr>
+          <p:nvPr/>
+        </p:nvPicPr>
+        <p:blipFill>
+          <a:blip r:embed="rId2">
+            <a:extLst>
+              <a:ext uri="{96DAC541-7B7A-43D3-8B79-37D633B846F1}">
+                <asvg:svgBlip xmlns:asvg="http://schemas.microsoft.com/office/drawing/2016/SVG/main" r:embed="rId3"/>
+              </a:ext>
+            </a:extLst>
+          </a:blip>
+          <a:stretch>
+            <a:fillRect/>
+          </a:stretch>
+        </p:blipFill>
+        <p:spPr>
+          <a:xfrm>
+            <a:off x="-578735" y="2983170"/>
+            <a:ext cx="13689573" cy="6858000"/>
+          </a:xfrm>
+          <a:prstGeom prst="rect">
+            <a:avLst/>
+          </a:prstGeom>
+        </p:spPr>
+      </p:pic>
+      <p:pic>
+        <p:nvPicPr>
+          <p:cNvPr id="8" name="Graphic 7">
+            <a:extLst>
+              <a:ext uri="{FF2B5EF4-FFF2-40B4-BE49-F238E27FC236}">
+                <a16:creationId xmlns:a16="http://schemas.microsoft.com/office/drawing/2014/main" id="{2F8EF2E2-B7B4-2985-2EBC-D7FECAC8D8E8}"/>
+              </a:ext>
+            </a:extLst>
+          </p:cNvPr>
+          <p:cNvPicPr>
+            <a:picLocks noChangeAspect="1"/>
+          </p:cNvPicPr>
+          <p:nvPr/>
+        </p:nvPicPr>
+        <p:blipFill>
+          <a:blip r:embed="rId4">
+            <a:extLst>
+              <a:ext uri="{96DAC541-7B7A-43D3-8B79-37D633B846F1}">
+                <asvg:svgBlip xmlns:asvg="http://schemas.microsoft.com/office/drawing/2016/SVG/main" r:embed="rId5"/>
+              </a:ext>
+            </a:extLst>
+          </a:blip>
+          <a:stretch>
+            <a:fillRect/>
+          </a:stretch>
+        </p:blipFill>
+        <p:spPr>
+          <a:xfrm>
+            <a:off x="-5530732" y="-3526386"/>
+            <a:ext cx="11061463" cy="6858000"/>
+          </a:xfrm>
+          <a:prstGeom prst="rect">
+            <a:avLst/>
+          </a:prstGeom>
+        </p:spPr>
+      </p:pic>
+      <p:sp>
+        <p:nvSpPr>
+          <p:cNvPr id="2" name="TextBox 1">
+            <a:extLst>
+              <a:ext uri="{FF2B5EF4-FFF2-40B4-BE49-F238E27FC236}">
+                <a16:creationId xmlns:a16="http://schemas.microsoft.com/office/drawing/2014/main" id="{69DFECC6-7A19-B2A9-07C4-56409A6A907B}"/>
+              </a:ext>
+            </a:extLst>
+          </p:cNvPr>
+          <p:cNvSpPr txBox="1"/>
+          <p:nvPr/>
+        </p:nvSpPr>
+        <p:spPr>
+          <a:xfrm>
+            <a:off x="7643637" y="2872924"/>
+            <a:ext cx="3665377" cy="923330"/>
+          </a:xfrm>
+          <a:prstGeom prst="rect">
+            <a:avLst/>
+          </a:prstGeom>
+          <a:noFill/>
+        </p:spPr>
+        <p:txBody>
+          <a:bodyPr wrap="square" rtlCol="0">
+            <a:spAutoFit/>
+          </a:bodyPr>
+          <a:lstStyle/>
+          <a:p>
+            <a:pPr algn="ctr"/>
+            <a:r>
+              <a:rPr lang="en-US" dirty="0">
+                <a:hlinkClick r:id="rId6"/>
+              </a:rPr>
+              <a:t>Prompt for </a:t>
+            </a:r>
+            <a:r>
+              <a:rPr lang="en-US" dirty="0" err="1">
+                <a:hlinkClick r:id="rId6"/>
+              </a:rPr>
+              <a:t>transmit.v</a:t>
+            </a:r>
+            <a:r>
+              <a:rPr lang="en-US" dirty="0">
+                <a:hlinkClick r:id="rId6"/>
+              </a:rPr>
+              <a:t> : https://chat.openai.com/share/8c8fb17c-6647-4eee-8c1e-71c2bc0c1b95</a:t>
+            </a:r>
+            <a:endParaRPr lang="el-GR" dirty="0"/>
+          </a:p>
+        </p:txBody>
+      </p:sp>
+      <p:sp>
+        <p:nvSpPr>
+          <p:cNvPr id="3" name="TextBox 2">
+            <a:extLst>
+              <a:ext uri="{FF2B5EF4-FFF2-40B4-BE49-F238E27FC236}">
+                <a16:creationId xmlns:a16="http://schemas.microsoft.com/office/drawing/2014/main" id="{7622558D-FAB4-5C35-5F64-F883459FD0DF}"/>
+              </a:ext>
+            </a:extLst>
+          </p:cNvPr>
+          <p:cNvSpPr txBox="1"/>
+          <p:nvPr/>
+        </p:nvSpPr>
+        <p:spPr>
+          <a:xfrm>
+            <a:off x="8464385" y="1957952"/>
+            <a:ext cx="2905276" cy="830997"/>
+          </a:xfrm>
+          <a:prstGeom prst="rect">
+            <a:avLst/>
+          </a:prstGeom>
+          <a:noFill/>
+        </p:spPr>
+        <p:txBody>
+          <a:bodyPr wrap="square" rtlCol="0">
+            <a:spAutoFit/>
+          </a:bodyPr>
+          <a:lstStyle/>
+          <a:p>
+            <a:r>
+              <a:rPr lang="en-US" sz="4800" dirty="0" err="1">
+                <a:latin typeface="Arial Black" panose="020B0A04020102020204" pitchFamily="34" charset="0"/>
+              </a:rPr>
+              <a:t>P.o.C.</a:t>
+            </a:r>
+            <a:endParaRPr lang="el-GR" sz="4800" dirty="0">
+              <a:latin typeface="Arial Black" panose="020B0A04020102020204" pitchFamily="34" charset="0"/>
+            </a:endParaRPr>
+          </a:p>
+        </p:txBody>
+      </p:sp>
+      <p:sp>
+        <p:nvSpPr>
+          <p:cNvPr id="4" name="TextBox 3">
+            <a:extLst>
+              <a:ext uri="{FF2B5EF4-FFF2-40B4-BE49-F238E27FC236}">
+                <a16:creationId xmlns:a16="http://schemas.microsoft.com/office/drawing/2014/main" id="{BFDFE2F0-E799-5B63-B8B7-6178A35D2DD4}"/>
+              </a:ext>
+            </a:extLst>
+          </p:cNvPr>
+          <p:cNvSpPr txBox="1"/>
+          <p:nvPr/>
+        </p:nvSpPr>
+        <p:spPr>
+          <a:xfrm>
+            <a:off x="3143381" y="1145392"/>
+            <a:ext cx="4436705" cy="646331"/>
+          </a:xfrm>
+          <a:prstGeom prst="rect">
+            <a:avLst/>
+          </a:prstGeom>
+          <a:noFill/>
+        </p:spPr>
+        <p:txBody>
+          <a:bodyPr wrap="square" rtlCol="0">
+            <a:spAutoFit/>
+          </a:bodyPr>
+          <a:lstStyle/>
+          <a:p>
+            <a:r>
+              <a:rPr lang="en-US" dirty="0"/>
+              <a:t>Leaking the key by modulating an (unused) pin on chip that generates an RF signal. </a:t>
+            </a:r>
+            <a:endParaRPr lang="el-GR" dirty="0"/>
+          </a:p>
+        </p:txBody>
+      </p:sp>
+      <p:sp>
+        <p:nvSpPr>
+          <p:cNvPr id="6" name="TextBox 5">
+            <a:extLst>
+              <a:ext uri="{FF2B5EF4-FFF2-40B4-BE49-F238E27FC236}">
+                <a16:creationId xmlns:a16="http://schemas.microsoft.com/office/drawing/2014/main" id="{4186C9DF-43D9-0C3B-5DFD-52EAF2C46AE2}"/>
+              </a:ext>
+            </a:extLst>
+          </p:cNvPr>
+          <p:cNvSpPr txBox="1"/>
+          <p:nvPr/>
+        </p:nvSpPr>
+        <p:spPr>
+          <a:xfrm>
+            <a:off x="1904066" y="2532594"/>
+            <a:ext cx="4697964" cy="2308324"/>
+          </a:xfrm>
+          <a:prstGeom prst="rect">
+            <a:avLst/>
+          </a:prstGeom>
+          <a:noFill/>
+        </p:spPr>
+        <p:txBody>
+          <a:bodyPr wrap="square" rtlCol="0">
+            <a:spAutoFit/>
+          </a:bodyPr>
+          <a:lstStyle/>
+          <a:p>
+            <a:r>
+              <a:rPr lang="en-US" dirty="0"/>
+              <a:t>Severity of the vulnerability:</a:t>
+            </a:r>
+          </a:p>
+          <a:p>
+            <a:endParaRPr lang="en-US" dirty="0"/>
+          </a:p>
+          <a:p>
+            <a:pPr marL="285750" indent="-285750">
+              <a:buFont typeface="Arial" panose="020B0604020202020204" pitchFamily="34" charset="0"/>
+              <a:buChar char="•"/>
+            </a:pPr>
+            <a:r>
+              <a:rPr lang="en-US" dirty="0"/>
+              <a:t>Insertion phase: Design</a:t>
+            </a:r>
+          </a:p>
+          <a:p>
+            <a:pPr marL="285750" indent="-285750">
+              <a:buFont typeface="Arial" panose="020B0604020202020204" pitchFamily="34" charset="0"/>
+              <a:buChar char="•"/>
+            </a:pPr>
+            <a:r>
+              <a:rPr lang="en-US" dirty="0"/>
+              <a:t>Abstraction level: Register Transfer level</a:t>
+            </a:r>
+          </a:p>
+          <a:p>
+            <a:pPr marL="285750" indent="-285750">
+              <a:buFont typeface="Arial" panose="020B0604020202020204" pitchFamily="34" charset="0"/>
+              <a:buChar char="•"/>
+            </a:pPr>
+            <a:r>
+              <a:rPr lang="en-US" dirty="0"/>
+              <a:t>Act. mechanism: Conditionally triggered</a:t>
+            </a:r>
+          </a:p>
+          <a:p>
+            <a:pPr marL="285750" indent="-285750">
+              <a:buFont typeface="Arial" panose="020B0604020202020204" pitchFamily="34" charset="0"/>
+              <a:buChar char="•"/>
+            </a:pPr>
+            <a:r>
+              <a:rPr lang="en-US" dirty="0"/>
+              <a:t>Effects: Leak Information</a:t>
+            </a:r>
+          </a:p>
+          <a:p>
+            <a:pPr marL="285750" indent="-285750">
+              <a:buFont typeface="Arial" panose="020B0604020202020204" pitchFamily="34" charset="0"/>
+              <a:buChar char="•"/>
+            </a:pPr>
+            <a:r>
+              <a:rPr lang="en-US" dirty="0"/>
+              <a:t>Location: Processor</a:t>
+            </a:r>
+          </a:p>
+          <a:p>
+            <a:pPr marL="285750" indent="-285750">
+              <a:buFont typeface="Arial" panose="020B0604020202020204" pitchFamily="34" charset="0"/>
+              <a:buChar char="•"/>
+            </a:pPr>
+            <a:r>
+              <a:rPr lang="en-US" dirty="0"/>
+              <a:t>Physical characteristics: Functional</a:t>
+            </a:r>
+            <a:endParaRPr lang="el-GR" dirty="0"/>
+          </a:p>
+        </p:txBody>
+      </p:sp>
+    </p:spTree>
+    <p:extLst>
+      <p:ext uri="{BB962C8B-B14F-4D97-AF65-F5344CB8AC3E}">
+        <p14:creationId xmlns:p14="http://schemas.microsoft.com/office/powerpoint/2010/main" val="3096791553"/>
+      </p:ext>
+    </p:extLst>
+  </p:cSld>
+  <p:clrMapOvr>
+    <a:masterClrMapping/>
+  </p:clrMapOvr>
+</p:sld>
+</file>
+
+<file path=ppt/slides/slide21.xml><?xml version="1.0" encoding="utf-8"?>
+<p:sld xmlns:a="http://schemas.openxmlformats.org/drawingml/2006/main" xmlns:r="http://schemas.openxmlformats.org/officeDocument/2006/relationships" xmlns:p="http://schemas.openxmlformats.org/presentationml/2006/main">
+  <p:cSld>
+    <p:spTree>
+      <p:nvGrpSpPr>
+        <p:cNvPr id="1" name=""/>
+        <p:cNvGrpSpPr/>
+        <p:nvPr/>
+      </p:nvGrpSpPr>
+      <p:grpSpPr>
+        <a:xfrm>
+          <a:off x="0" y="0"/>
+          <a:ext cx="0" cy="0"/>
+          <a:chOff x="0" y="0"/>
+          <a:chExt cx="0" cy="0"/>
+        </a:xfrm>
+      </p:grpSpPr>
+      <p:pic>
+        <p:nvPicPr>
+          <p:cNvPr id="2" name="Picture 6">
+            <a:extLst>
+              <a:ext uri="{FF2B5EF4-FFF2-40B4-BE49-F238E27FC236}">
+                <a16:creationId xmlns:a16="http://schemas.microsoft.com/office/drawing/2014/main" id="{F2B13628-CFE6-C70B-EFDC-5EE12F27ABDD}"/>
+              </a:ext>
+            </a:extLst>
+          </p:cNvPr>
+          <p:cNvPicPr>
+            <a:picLocks noChangeAspect="1"/>
+          </p:cNvPicPr>
+          <p:nvPr/>
+        </p:nvPicPr>
+        <p:blipFill>
+          <a:blip r:embed="rId2"/>
+          <a:stretch>
+            <a:fillRect/>
+          </a:stretch>
+        </p:blipFill>
+        <p:spPr>
+          <a:xfrm>
+            <a:off x="227044" y="3495791"/>
+            <a:ext cx="11803225" cy="1821823"/>
+          </a:xfrm>
+          <a:prstGeom prst="rect">
+            <a:avLst/>
+          </a:prstGeom>
+        </p:spPr>
+      </p:pic>
+      <p:sp>
+        <p:nvSpPr>
+          <p:cNvPr id="3" name="TextBox 2">
+            <a:extLst>
+              <a:ext uri="{FF2B5EF4-FFF2-40B4-BE49-F238E27FC236}">
+                <a16:creationId xmlns:a16="http://schemas.microsoft.com/office/drawing/2014/main" id="{95ABDEFB-E08A-C724-5D54-6C8AA5293B25}"/>
+              </a:ext>
+            </a:extLst>
+          </p:cNvPr>
+          <p:cNvSpPr txBox="1"/>
+          <p:nvPr/>
+        </p:nvSpPr>
+        <p:spPr>
+          <a:xfrm>
+            <a:off x="564502" y="105013"/>
+            <a:ext cx="10851502" cy="3323987"/>
+          </a:xfrm>
+          <a:prstGeom prst="rect">
+            <a:avLst/>
+          </a:prstGeom>
+          <a:noFill/>
+        </p:spPr>
+        <p:txBody>
+          <a:bodyPr wrap="square" rtlCol="0">
+            <a:spAutoFit/>
+          </a:bodyPr>
+          <a:lstStyle/>
+          <a:p>
+            <a:r>
+              <a:rPr lang="en-US" sz="1400" dirty="0"/>
+              <a:t>The waveform diagram represents a form of serial communication from a signal capture of a digital system. </a:t>
+            </a:r>
+          </a:p>
+          <a:p>
+            <a:r>
+              <a:rPr lang="en-US" sz="1400" dirty="0"/>
+              <a:t>Here are the signal descriptions and their interpretations:</a:t>
+            </a:r>
+          </a:p>
+          <a:p>
+            <a:endParaRPr lang="en-US" sz="1400" dirty="0"/>
+          </a:p>
+          <a:p>
+            <a:r>
+              <a:rPr lang="en-US" sz="1400" dirty="0"/>
+              <a:t>-</a:t>
+            </a:r>
+            <a:r>
+              <a:rPr lang="en-US" sz="1400" b="1" i="1" dirty="0"/>
+              <a:t>Ant1</a:t>
+            </a:r>
+            <a:r>
+              <a:rPr lang="en-US" sz="1400" dirty="0"/>
+              <a:t> - This represents an antenna signal or activity line for a communication interface.</a:t>
+            </a:r>
+          </a:p>
+          <a:p>
+            <a:r>
+              <a:rPr lang="en-US" sz="1400" dirty="0"/>
+              <a:t>-</a:t>
+            </a:r>
+            <a:r>
+              <a:rPr lang="en-US" sz="1400" b="1" i="1" dirty="0"/>
+              <a:t>BEEP_DURATION, PAUSE_DURATION, SHORT_PAUSE_DURATION, and TOTAL_DURATION </a:t>
+            </a:r>
+            <a:r>
+              <a:rPr lang="en-US" sz="1400" dirty="0"/>
+              <a:t>- These represent configurable timing parameters for the system. They could are related to timings of beeps, pauses, and overall duration for an event.</a:t>
+            </a:r>
+          </a:p>
+          <a:p>
+            <a:r>
+              <a:rPr lang="en-US" sz="1400" dirty="0"/>
+              <a:t>-</a:t>
+            </a:r>
+            <a:r>
+              <a:rPr lang="en-US" sz="1400" b="1" i="1" dirty="0" err="1"/>
+              <a:t>bit_phase</a:t>
+            </a:r>
+            <a:r>
+              <a:rPr lang="en-US" sz="1400" b="1" i="1" dirty="0"/>
+              <a:t>[4:0]</a:t>
+            </a:r>
+            <a:r>
+              <a:rPr lang="en-US" sz="1400" i="1" dirty="0"/>
+              <a:t> </a:t>
+            </a:r>
+            <a:r>
+              <a:rPr lang="en-US" sz="1400" dirty="0"/>
+              <a:t>- The </a:t>
+            </a:r>
+            <a:r>
+              <a:rPr lang="en-US" sz="1400" dirty="0" err="1"/>
+              <a:t>bit_phase</a:t>
+            </a:r>
+            <a:r>
+              <a:rPr lang="en-US" sz="1400" dirty="0"/>
+              <a:t> seems to fluctuate between values 2 through b in hexadecimal (2 to 11 in decimal). This represents different phases or steps in processing a bit or a series of bits within a communication protocol or timing control.</a:t>
+            </a:r>
+          </a:p>
+          <a:p>
+            <a:r>
+              <a:rPr lang="en-US" sz="1400" dirty="0"/>
+              <a:t>-</a:t>
+            </a:r>
+            <a:r>
+              <a:rPr lang="en-US" sz="1400" b="1" i="1" dirty="0" err="1"/>
+              <a:t>clk</a:t>
+            </a:r>
+            <a:r>
+              <a:rPr lang="en-US" sz="1400" dirty="0"/>
+              <a:t> - This is the clock signal driving the timing of the system. The clock is active and shows a regular square wave pattern, indicating that the system is operational and the timing is continuous.</a:t>
+            </a:r>
+          </a:p>
+          <a:p>
+            <a:r>
+              <a:rPr lang="en-US" sz="1400" dirty="0"/>
+              <a:t>-</a:t>
+            </a:r>
+            <a:r>
+              <a:rPr lang="en-US" sz="1400" b="1" i="1" dirty="0"/>
+              <a:t>count[6:0] </a:t>
+            </a:r>
+            <a:r>
+              <a:rPr lang="en-US" sz="1400" dirty="0"/>
+              <a:t>- This is a counter that increments with every clock cycle. It rolls over after reaching b (11 in decimal) back to 2. </a:t>
+            </a:r>
+          </a:p>
+          <a:p>
+            <a:endParaRPr lang="en-US" sz="1400" dirty="0"/>
+          </a:p>
+          <a:p>
+            <a:r>
+              <a:rPr lang="en-US" sz="1400" dirty="0"/>
+              <a:t>When the chip is powered on the key is being transmitted thought the antenna at 1560KHz by implementing a beep scheme where a single beep followed by a pause represents a '0' and a double beep followed by a pause</a:t>
+            </a:r>
+          </a:p>
+          <a:p>
+            <a:r>
+              <a:rPr lang="en-US" sz="1400" dirty="0"/>
+              <a:t>stands for '1'. </a:t>
+            </a:r>
+          </a:p>
+        </p:txBody>
+      </p:sp>
+    </p:spTree>
+    <p:extLst>
+      <p:ext uri="{BB962C8B-B14F-4D97-AF65-F5344CB8AC3E}">
+        <p14:creationId xmlns:p14="http://schemas.microsoft.com/office/powerpoint/2010/main" val="3866863848"/>
+      </p:ext>
+    </p:extLst>
+  </p:cSld>
+  <p:clrMapOvr>
+    <a:masterClrMapping/>
+  </p:clrMapOvr>
+</p:sld>
+</file>
+
 <file path=ppt/slides/slide3.xml><?xml version="1.0" encoding="utf-8"?>
 <p:sld xmlns:a="http://schemas.openxmlformats.org/drawingml/2006/main" xmlns:r="http://schemas.openxmlformats.org/officeDocument/2006/relationships" xmlns:p="http://schemas.openxmlformats.org/presentationml/2006/main">
   <p:cSld>
@@ -8245,11 +8966,11 @@
             </a:pPr>
             <a:r>
               <a:rPr lang="en-US" sz="2400" dirty="0"/>
-              <a:t>The main intent of this process is to gather a sequence of steps for creating the trojan intent (for example </a:t>
+              <a:t>The main intent of this process is to gather a sequence of steps with an intent to create the trojan (for example </a:t>
             </a:r>
             <a:r>
               <a:rPr lang="en-US" sz="2400" i="1" dirty="0"/>
-              <a:t>“I would like to add “X” feature is “X” code . I need to perform steps A,B,C. Provide a sequence for me and fill any missing steps.”</a:t>
+              <a:t>“I would like to add “X” feature to my codebase. I need to perform steps A,B,C. Provide a sequence for me and fill any missing steps.”</a:t>
             </a:r>
             <a:r>
               <a:rPr lang="en-US" sz="2400" dirty="0"/>
@@ -8263,7 +8984,7 @@
             </a:pPr>
             <a:r>
               <a:rPr lang="en-US" sz="2400" dirty="0"/>
-              <a:t>Using this pattern the LLM will analyze a concrete sequence of steps for creating with intent the trojan(for example </a:t>
+              <a:t>Using this pattern the LLM will analyze a concrete sequence of steps for creating with purpose the trojan(for example </a:t>
             </a:r>
             <a:r>
               <a:rPr lang="en-US" sz="2400" i="1" dirty="0"/>
@@ -9331,7 +10052,7 @@
           <a:p>
             <a:r>
               <a:rPr lang="en-US" dirty="0"/>
-              <a:t>During the course of our investigation, ChatGPT's content filtering procedure impeded attempts to write "malicious" code. We discovered a means to circumvent this security and "exploit" the system by utilizing ZULU as the primary language. As a proof of concept, we present the dialogue below:</a:t>
+              <a:t>During the course of our investigation, ChatGPT's content filtering procedure impeded attempts to write "malicious" code. We discovered a means to circumvent this security and "exploit" the system by utilizing ZULU as the primary prompting language. As a proof of concept, we present the dialogue below:</a:t>
             </a:r>
             <a:endParaRPr lang="el-GR" dirty="0"/>
           </a:p>
@@ -9604,7 +10325,7 @@
         <p:spPr>
           <a:xfrm>
             <a:off x="962658" y="3081597"/>
-            <a:ext cx="5697758" cy="2031325"/>
+            <a:ext cx="5697758" cy="2308324"/>
           </a:xfrm>
           <a:prstGeom prst="rect">
             <a:avLst/>
@@ -9639,7 +10360,15 @@
             </a:pPr>
             <a:r>
               <a:rPr lang="en-US" dirty="0"/>
-              <a:t>The state machine seeks the sequence of 8’hAA,8’hBB. </a:t>
+              <a:t>The state machine seeks the sequence of  </a:t>
+            </a:r>
+            <a:r>
+              <a:rPr lang="en-US" b="1" i="1" dirty="0"/>
+              <a:t>8'b11111111</a:t>
+            </a:r>
+            <a:r>
+              <a:rPr lang="en-US" dirty="0"/>
+              <a:t>. </a:t>
             </a:r>
           </a:p>
           <a:p>
@@ -9649,7 +10378,19 @@
             </a:pPr>
             <a:r>
               <a:rPr lang="en-US" dirty="0"/>
-              <a:t>After state activation any transmission is blocked. </a:t>
+              <a:t>After state activation any transmission is blocked and a </a:t>
+            </a:r>
+            <a:r>
+              <a:rPr lang="en-US" b="1" i="1" dirty="0" err="1"/>
+              <a:t>halt_status</a:t>
+            </a:r>
+            <a:r>
+              <a:rPr lang="en-US" b="1" i="1" dirty="0"/>
+              <a:t> </a:t>
+            </a:r>
+            <a:r>
+              <a:rPr lang="en-US" dirty="0"/>
+              <a:t>signal is active. </a:t>
             </a:r>
           </a:p>
           <a:p>
@@ -9987,16 +10728,15 @@
           </p:cNvPicPr>
           <p:nvPr/>
         </p:nvPicPr>
-        <p:blipFill>
+        <p:blipFill rotWithShape="1">
           <a:blip r:embed="rId4"/>
-          <a:stretch>
-            <a:fillRect/>
-          </a:stretch>
+          <a:srcRect b="19965"/>
+          <a:stretch/>
         </p:blipFill>
         <p:spPr>
           <a:xfrm>
-            <a:off x="-1555" y="4209286"/>
-            <a:ext cx="12192000" cy="1994390"/>
+            <a:off x="-1" y="4876011"/>
+            <a:ext cx="12192000" cy="1596202"/>
           </a:xfrm>
           <a:prstGeom prst="rect">
             <a:avLst/>
@@ -10017,7 +10757,7 @@
         </p:nvSpPr>
         <p:spPr>
           <a:xfrm>
-            <a:off x="6775790" y="1938991"/>
+            <a:off x="7761492" y="1071075"/>
             <a:ext cx="4478133" cy="923330"/>
           </a:xfrm>
           <a:prstGeom prst="rect">
@@ -10068,7 +10808,7 @@
         </p:nvSpPr>
         <p:spPr>
           <a:xfrm>
-            <a:off x="5920911" y="607776"/>
+            <a:off x="5965239" y="188631"/>
             <a:ext cx="2068969" cy="830997"/>
           </a:xfrm>
           <a:prstGeom prst="rect">
@@ -10108,7 +10848,7 @@
         </p:nvSpPr>
         <p:spPr>
           <a:xfrm>
-            <a:off x="1727896" y="2467329"/>
+            <a:off x="3009414" y="1480055"/>
             <a:ext cx="4478133" cy="923330"/>
           </a:xfrm>
           <a:prstGeom prst="rect">
@@ -10167,7 +10907,7 @@
         </p:blipFill>
         <p:spPr>
           <a:xfrm>
-            <a:off x="2711458" y="2015346"/>
+            <a:off x="3697160" y="1147430"/>
             <a:ext cx="2511008" cy="335309"/>
           </a:xfrm>
           <a:prstGeom prst="rect">
@@ -10189,7 +10929,7 @@
         </p:nvSpPr>
         <p:spPr>
           <a:xfrm>
-            <a:off x="6659157" y="2028306"/>
+            <a:off x="7644859" y="1160390"/>
             <a:ext cx="681134" cy="372350"/>
           </a:xfrm>
           <a:prstGeom prst="rect">
@@ -10225,7 +10965,7 @@
         </p:nvSpPr>
         <p:spPr>
           <a:xfrm>
-            <a:off x="2312575" y="1989897"/>
+            <a:off x="3298277" y="1121981"/>
             <a:ext cx="681134" cy="372350"/>
           </a:xfrm>
           <a:prstGeom prst="rect">
@@ -10261,7 +11001,7 @@
         </p:nvSpPr>
         <p:spPr>
           <a:xfrm>
-            <a:off x="7720392" y="3021327"/>
+            <a:off x="8706094" y="2153411"/>
             <a:ext cx="2525486" cy="369332"/>
           </a:xfrm>
           <a:prstGeom prst="rect">
@@ -10335,6 +11075,184 @@
           </a:prstGeom>
         </p:spPr>
       </p:pic>
+      <p:sp>
+        <p:nvSpPr>
+          <p:cNvPr id="14" name="Βέλος: Δεξιό 13">
+            <a:extLst>
+              <a:ext uri="{FF2B5EF4-FFF2-40B4-BE49-F238E27FC236}">
+                <a16:creationId xmlns:a16="http://schemas.microsoft.com/office/drawing/2014/main" id="{094A06B2-CA8B-1154-6997-D4842F3180C9}"/>
+              </a:ext>
+            </a:extLst>
+          </p:cNvPr>
+          <p:cNvSpPr/>
+          <p:nvPr/>
+        </p:nvSpPr>
+        <p:spPr>
+          <a:xfrm rot="6922079">
+            <a:off x="5435139" y="5960819"/>
+            <a:ext cx="191183" cy="190180"/>
+          </a:xfrm>
+          <a:prstGeom prst="rightArrow">
+            <a:avLst/>
+          </a:prstGeom>
+          <a:solidFill>
+            <a:srgbClr val="C00000"/>
+          </a:solidFill>
+        </p:spPr>
+        <p:style>
+          <a:lnRef idx="2">
+            <a:schemeClr val="accent2">
+              <a:shade val="15000"/>
+            </a:schemeClr>
+          </a:lnRef>
+          <a:fillRef idx="1">
+            <a:schemeClr val="accent2"/>
+          </a:fillRef>
+          <a:effectRef idx="0">
+            <a:schemeClr val="accent2"/>
+          </a:effectRef>
+          <a:fontRef idx="minor">
+            <a:schemeClr val="lt1"/>
+          </a:fontRef>
+        </p:style>
+        <p:txBody>
+          <a:bodyPr rtlCol="0" anchor="ctr"/>
+          <a:lstStyle/>
+          <a:p>
+            <a:pPr algn="ctr"/>
+            <a:endParaRPr lang="el-GR"/>
+          </a:p>
+        </p:txBody>
+      </p:sp>
+      <p:sp>
+        <p:nvSpPr>
+          <p:cNvPr id="16" name="TextBox 15">
+            <a:extLst>
+              <a:ext uri="{FF2B5EF4-FFF2-40B4-BE49-F238E27FC236}">
+                <a16:creationId xmlns:a16="http://schemas.microsoft.com/office/drawing/2014/main" id="{F980485D-ED7F-A8A6-2B11-9BAA12EF515D}"/>
+              </a:ext>
+            </a:extLst>
+          </p:cNvPr>
+          <p:cNvSpPr txBox="1"/>
+          <p:nvPr/>
+        </p:nvSpPr>
+        <p:spPr>
+          <a:xfrm>
+            <a:off x="747713" y="2574190"/>
+            <a:ext cx="11366889" cy="2246769"/>
+          </a:xfrm>
+          <a:prstGeom prst="rect">
+            <a:avLst/>
+          </a:prstGeom>
+          <a:noFill/>
+        </p:spPr>
+        <p:txBody>
+          <a:bodyPr wrap="square" rtlCol="0">
+            <a:spAutoFit/>
+          </a:bodyPr>
+          <a:lstStyle/>
+          <a:p>
+            <a:r>
+              <a:rPr lang="en-US" sz="1400" dirty="0"/>
+              <a:t>The waveform is a simulation of a UART communication.</a:t>
+            </a:r>
+          </a:p>
+          <a:p>
+            <a:r>
+              <a:rPr lang="en-US" sz="1400" dirty="0"/>
+              <a:t>From the labels and the activity visible in the waveform:</a:t>
+            </a:r>
+          </a:p>
+          <a:p>
+            <a:r>
+              <a:rPr lang="en-US" sz="1400" i="1" dirty="0" err="1"/>
+              <a:t>clk</a:t>
+            </a:r>
+            <a:r>
+              <a:rPr lang="en-US" sz="1400" i="1" dirty="0"/>
+              <a:t> </a:t>
+            </a:r>
+            <a:r>
+              <a:rPr lang="en-US" sz="1400" dirty="0"/>
+              <a:t>- This is the clock signal, which is oscillating as expected.</a:t>
+            </a:r>
+          </a:p>
+          <a:p>
+            <a:r>
+              <a:rPr lang="en-US" sz="1400" i="1" dirty="0" err="1"/>
+              <a:t>data_in</a:t>
+            </a:r>
+            <a:r>
+              <a:rPr lang="en-US" sz="1400" i="1" dirty="0"/>
+              <a:t>[7:0] </a:t>
+            </a:r>
+            <a:r>
+              <a:rPr lang="en-US" sz="1400" dirty="0"/>
+              <a:t>- This seems to be the input data that is being simulated. First, it shows the binary pattern 10101010, and then it shows 11111111.</a:t>
+            </a:r>
+          </a:p>
+          <a:p>
+            <a:r>
+              <a:rPr lang="en-US" sz="1400" i="1" dirty="0" err="1"/>
+              <a:t>data_out</a:t>
+            </a:r>
+            <a:r>
+              <a:rPr lang="en-US" sz="1400" i="1" dirty="0"/>
+              <a:t>[7:0</a:t>
+            </a:r>
+            <a:r>
+              <a:rPr lang="en-US" sz="1400" dirty="0"/>
+              <a:t>] - This is the output data from the UART receiver. </a:t>
+            </a:r>
+          </a:p>
+          <a:p>
+            <a:r>
+              <a:rPr lang="en-US" sz="1400" i="1" dirty="0" err="1"/>
+              <a:t>halt_status</a:t>
+            </a:r>
+            <a:r>
+              <a:rPr lang="en-US" sz="1400" i="1" dirty="0"/>
+              <a:t> </a:t>
+            </a:r>
+            <a:r>
+              <a:rPr lang="en-US" sz="1400" dirty="0"/>
+              <a:t>- This signal goes high after </a:t>
+            </a:r>
+            <a:r>
+              <a:rPr lang="en-US" sz="1400" dirty="0" err="1"/>
+              <a:t>data_in</a:t>
+            </a:r>
+            <a:r>
+              <a:rPr lang="en-US" sz="1400" dirty="0"/>
+              <a:t> shows 11111111, which suggests that the UART has entered a HALT state as designed, in response to receiving the byte 11111111.</a:t>
+            </a:r>
+          </a:p>
+          <a:p>
+            <a:r>
+              <a:rPr lang="en-US" sz="1400" dirty="0"/>
+              <a:t>reset - The reset signal is initially high and then goes low, which should initialize the system and start the UART receiver.</a:t>
+            </a:r>
+          </a:p>
+          <a:p>
+            <a:endParaRPr lang="en-US" sz="1400" dirty="0"/>
+          </a:p>
+          <a:p>
+            <a:r>
+              <a:rPr lang="en-US" sz="1400" dirty="0"/>
+              <a:t>From the waveform, we can see the intended functionality seems to be working: after 11111111 is received, the </a:t>
+            </a:r>
+            <a:r>
+              <a:rPr lang="en-US" sz="1400" dirty="0" err="1"/>
+              <a:t>halt_status</a:t>
+            </a:r>
+            <a:r>
+              <a:rPr lang="en-US" sz="1400" dirty="0"/>
+              <a:t> signal is activated.</a:t>
+            </a:r>
+            <a:endParaRPr lang="el-GR" sz="1400" dirty="0"/>
+          </a:p>
+        </p:txBody>
+      </p:sp>
     </p:spTree>
     <p:extLst>
       <p:ext uri="{BB962C8B-B14F-4D97-AF65-F5344CB8AC3E}">

</xml_diff>

<commit_message>
full results presentation added
</commit_message>
<xml_diff>
--- a/presentation/CSAW_2023_second_stage v2 .pptx
+++ b/presentation/CSAW_2023_second_stage v2 .pptx
@@ -7440,8 +7440,8 @@
         </p:nvSpPr>
         <p:spPr>
           <a:xfrm>
-            <a:off x="3224213" y="1305341"/>
-            <a:ext cx="5093820" cy="3970318"/>
+            <a:off x="2074069" y="1614697"/>
+            <a:ext cx="8043862" cy="4801314"/>
           </a:xfrm>
           <a:prstGeom prst="rect">
             <a:avLst/>
@@ -7454,12 +7454,6 @@
           </a:bodyPr>
           <a:lstStyle/>
           <a:p>
-            <a:r>
-              <a:rPr lang="en-US" dirty="0"/>
-              <a:t>Our malicious code implementation methodology is:</a:t>
-            </a:r>
-          </a:p>
-          <a:p>
             <a:endParaRPr lang="en-US" dirty="0"/>
           </a:p>
           <a:p>
@@ -7479,7 +7473,7 @@
             </a:r>
             <a:r>
               <a:rPr lang="en-US" dirty="0"/>
-              <a:t>.</a:t>
+              <a:t> it was uploaded.</a:t>
             </a:r>
           </a:p>
           <a:p>
@@ -7489,7 +7483,15 @@
             </a:pPr>
             <a:r>
               <a:rPr lang="en-US" dirty="0"/>
-              <a:t>We use a shift register to store the key.</a:t>
+              <a:t>We created a</a:t>
+            </a:r>
+            <a:r>
+              <a:rPr lang="en-US" b="1" i="1" dirty="0"/>
+              <a:t> “transmit” </a:t>
+            </a:r>
+            <a:r>
+              <a:rPr lang="en-US" dirty="0"/>
+              <a:t>module for the malicious functionality.</a:t>
             </a:r>
           </a:p>
           <a:p>
@@ -7499,7 +7501,123 @@
             </a:pPr>
             <a:r>
               <a:rPr lang="en-US" dirty="0"/>
-              <a:t>We use a covert way of leaking the key by</a:t>
+              <a:t>We altered the functionality of the </a:t>
+            </a:r>
+            <a:r>
+              <a:rPr lang="en-US" b="1" i="1" dirty="0"/>
+              <a:t>“</a:t>
+            </a:r>
+            <a:r>
+              <a:rPr lang="en-US" b="1" i="1" dirty="0" err="1"/>
+              <a:t>aes_key_mem</a:t>
+            </a:r>
+            <a:r>
+              <a:rPr lang="en-US" b="1" i="1" dirty="0"/>
+              <a:t>” </a:t>
+            </a:r>
+            <a:r>
+              <a:rPr lang="en-US" dirty="0"/>
+              <a:t>module so when it is instantiated:</a:t>
+            </a:r>
+          </a:p>
+          <a:p>
+            <a:pPr marL="800100" lvl="1" indent="-342900">
+              <a:buFont typeface="+mj-lt"/>
+              <a:buAutoNum type="alphaLcParenR"/>
+            </a:pPr>
+            <a:r>
+              <a:rPr lang="en-US" dirty="0"/>
+              <a:t> the </a:t>
+            </a:r>
+            <a:r>
+              <a:rPr lang="en-US" b="1" i="1" dirty="0"/>
+              <a:t>“transmit” </a:t>
+            </a:r>
+            <a:r>
+              <a:rPr lang="en-US" dirty="0"/>
+              <a:t>module is instantiated,</a:t>
+            </a:r>
+          </a:p>
+          <a:p>
+            <a:pPr marL="800100" lvl="1" indent="-342900">
+              <a:buFont typeface="+mj-lt"/>
+              <a:buAutoNum type="alphaLcParenR"/>
+            </a:pPr>
+            <a:r>
+              <a:rPr lang="en-US" dirty="0"/>
+              <a:t>the </a:t>
+            </a:r>
+            <a:r>
+              <a:rPr lang="en-US" b="1" i="1" dirty="0"/>
+              <a:t>“key” </a:t>
+            </a:r>
+            <a:r>
+              <a:rPr lang="en-US" dirty="0"/>
+              <a:t>value is copied,</a:t>
+            </a:r>
+          </a:p>
+          <a:p>
+            <a:pPr marL="800100" lvl="1" indent="-342900">
+              <a:buFont typeface="+mj-lt"/>
+              <a:buAutoNum type="alphaLcParenR"/>
+            </a:pPr>
+            <a:r>
+              <a:rPr lang="en-US" dirty="0"/>
+              <a:t>the </a:t>
+            </a:r>
+            <a:r>
+              <a:rPr lang="en-US" b="1" i="1" dirty="0"/>
+              <a:t>“key” </a:t>
+            </a:r>
+            <a:r>
+              <a:rPr lang="en-US" dirty="0"/>
+              <a:t>value is being transmitted by a pin.</a:t>
+            </a:r>
+          </a:p>
+          <a:p>
+            <a:pPr marL="800100" lvl="1" indent="-342900">
+              <a:buFont typeface="+mj-lt"/>
+              <a:buAutoNum type="alphaLcParenR"/>
+            </a:pPr>
+            <a:r>
+              <a:rPr lang="en-US" dirty="0"/>
+              <a:t>Because we haven’t got a pinout I used the </a:t>
+            </a:r>
+            <a:r>
+              <a:rPr lang="en-US" b="1" i="1" dirty="0"/>
+              <a:t>“Ant1”</a:t>
+            </a:r>
+            <a:r>
+              <a:rPr lang="en-US" dirty="0"/>
+              <a:t> internal wire for transmission of </a:t>
+            </a:r>
+            <a:r>
+              <a:rPr lang="en-US" dirty="0" err="1"/>
+              <a:t>P.o.C.</a:t>
+            </a:r>
+            <a:r>
+              <a:rPr lang="en-US" dirty="0"/>
+              <a:t> .</a:t>
+            </a:r>
+          </a:p>
+          <a:p>
+            <a:pPr marL="342900" indent="-342900">
+              <a:buFont typeface="+mj-lt"/>
+              <a:buAutoNum type="arabicPeriod"/>
+            </a:pPr>
+            <a:r>
+              <a:rPr lang="en-US" dirty="0"/>
+              <a:t>We use a register to store the key.</a:t>
+            </a:r>
+          </a:p>
+          <a:p>
+            <a:pPr marL="342900" indent="-342900">
+              <a:buFont typeface="+mj-lt"/>
+              <a:buAutoNum type="arabicPeriod"/>
+            </a:pPr>
+            <a:r>
+              <a:rPr lang="en-US" dirty="0"/>
+              <a:t>We use a covert way of leaking the key by:</a:t>
             </a:r>
           </a:p>
           <a:p>
@@ -7509,7 +7627,7 @@
             </a:pPr>
             <a:r>
               <a:rPr lang="en-US" dirty="0"/>
-              <a:t>modulating an (unused) pin on chip that generates an RF signal. </a:t>
+              <a:t>modulating an (unused) pin on chip that generates an RF signal, </a:t>
             </a:r>
           </a:p>
           <a:p>
@@ -7519,7 +7637,7 @@
             </a:pPr>
             <a:r>
               <a:rPr lang="en-US" dirty="0"/>
-              <a:t>This signal can be used to transmit the key bits. </a:t>
+              <a:t>this signal can be used to transmit the key bits,</a:t>
             </a:r>
           </a:p>
           <a:p>
@@ -7529,17 +7647,17 @@
             </a:pPr>
             <a:r>
               <a:rPr lang="en-US" dirty="0"/>
-              <a:t>Then it can be received with an ordinary AM radio. </a:t>
-            </a:r>
-          </a:p>
-          <a:p>
-            <a:pPr marL="342900" indent="-342900">
-              <a:buFont typeface="+mj-lt"/>
-              <a:buAutoNum type="arabicPeriod"/>
+              <a:t>then it can be received with an ordinary AM radio, </a:t>
+            </a:r>
+          </a:p>
+          <a:p>
+            <a:pPr marL="800100" lvl="1" indent="-342900">
+              <a:buFont typeface="Arial" panose="020B0604020202020204" pitchFamily="34" charset="0"/>
+              <a:buChar char="•"/>
             </a:pPr>
             <a:r>
               <a:rPr lang="en-US" dirty="0"/>
-              <a:t>The data carried by the AM signal can be easily interpreted by a human by using a beep scheme.</a:t>
+              <a:t>the data carried by the AM signal can be easily interpreted by a human by using a beep scheme.</a:t>
             </a:r>
             <a:endParaRPr lang="el-GR" dirty="0"/>
           </a:p>
@@ -7574,8 +7692,8 @@
         </p:blipFill>
         <p:spPr bwMode="auto">
           <a:xfrm>
-            <a:off x="8677669" y="360142"/>
-            <a:ext cx="2724347" cy="5421086"/>
+            <a:off x="9644704" y="814387"/>
+            <a:ext cx="2452987" cy="4881115"/>
           </a:xfrm>
           <a:prstGeom prst="rect">
             <a:avLst/>
@@ -7664,6 +7782,43 @@
           </a:prstGeom>
         </p:spPr>
       </p:pic>
+      <p:sp>
+        <p:nvSpPr>
+          <p:cNvPr id="5" name="TextBox 4">
+            <a:extLst>
+              <a:ext uri="{FF2B5EF4-FFF2-40B4-BE49-F238E27FC236}">
+                <a16:creationId xmlns:a16="http://schemas.microsoft.com/office/drawing/2014/main" id="{9ED900B1-5363-8445-513D-95A3D59BDE5A}"/>
+              </a:ext>
+            </a:extLst>
+          </p:cNvPr>
+          <p:cNvSpPr txBox="1"/>
+          <p:nvPr/>
+        </p:nvSpPr>
+        <p:spPr>
+          <a:xfrm>
+            <a:off x="2756744" y="889588"/>
+            <a:ext cx="6267246" cy="461665"/>
+          </a:xfrm>
+          <a:prstGeom prst="rect">
+            <a:avLst/>
+          </a:prstGeom>
+          <a:noFill/>
+        </p:spPr>
+        <p:txBody>
+          <a:bodyPr wrap="square" rtlCol="0">
+            <a:spAutoFit/>
+          </a:bodyPr>
+          <a:lstStyle/>
+          <a:p>
+            <a:r>
+              <a:rPr lang="en-US" sz="2400" dirty="0">
+                <a:latin typeface="Arial Black" panose="020B0A04020102020204" pitchFamily="34" charset="0"/>
+              </a:rPr>
+              <a:t>Code implementation methodology:</a:t>
+            </a:r>
+          </a:p>
+        </p:txBody>
+      </p:sp>
     </p:spTree>
     <p:extLst>
       <p:ext uri="{BB962C8B-B14F-4D97-AF65-F5344CB8AC3E}">
@@ -8104,7 +8259,7 @@
         </p:nvSpPr>
         <p:spPr>
           <a:xfrm>
-            <a:off x="7643637" y="2872924"/>
+            <a:off x="7475684" y="3850785"/>
             <a:ext cx="3665377" cy="923330"/>
           </a:xfrm>
           <a:prstGeom prst="rect">
@@ -8155,7 +8310,7 @@
         </p:nvSpPr>
         <p:spPr>
           <a:xfrm>
-            <a:off x="8464385" y="1957952"/>
+            <a:off x="8129744" y="2659413"/>
             <a:ext cx="2905276" cy="830997"/>
           </a:xfrm>
           <a:prstGeom prst="rect">
@@ -8183,10 +8338,10 @@
       </p:sp>
       <p:sp>
         <p:nvSpPr>
-          <p:cNvPr id="4" name="TextBox 3">
-            <a:extLst>
-              <a:ext uri="{FF2B5EF4-FFF2-40B4-BE49-F238E27FC236}">
-                <a16:creationId xmlns:a16="http://schemas.microsoft.com/office/drawing/2014/main" id="{BFDFE2F0-E799-5B63-B8B7-6178A35D2DD4}"/>
+          <p:cNvPr id="6" name="TextBox 5">
+            <a:extLst>
+              <a:ext uri="{FF2B5EF4-FFF2-40B4-BE49-F238E27FC236}">
+                <a16:creationId xmlns:a16="http://schemas.microsoft.com/office/drawing/2014/main" id="{4186C9DF-43D9-0C3B-5DFD-52EAF2C46AE2}"/>
               </a:ext>
             </a:extLst>
           </p:cNvPr>
@@ -8195,8 +8350,8 @@
         </p:nvSpPr>
         <p:spPr>
           <a:xfrm>
-            <a:off x="3143381" y="1145392"/>
-            <a:ext cx="4436705" cy="646331"/>
+            <a:off x="2380312" y="2616551"/>
+            <a:ext cx="4697964" cy="2308324"/>
           </a:xfrm>
           <a:prstGeom prst="rect">
             <a:avLst/>
@@ -8211,7 +8366,70 @@
           <a:p>
             <a:r>
               <a:rPr lang="en-US" dirty="0"/>
-              <a:t>Leaking the key by modulating an (unused) pin on chip that generates an RF signal. </a:t>
+              <a:t>Severity of the vulnerability:</a:t>
+            </a:r>
+          </a:p>
+          <a:p>
+            <a:endParaRPr lang="en-US" dirty="0"/>
+          </a:p>
+          <a:p>
+            <a:pPr marL="285750" indent="-285750">
+              <a:buFont typeface="Arial" panose="020B0604020202020204" pitchFamily="34" charset="0"/>
+              <a:buChar char="•"/>
+            </a:pPr>
+            <a:r>
+              <a:rPr lang="en-US" dirty="0"/>
+              <a:t>Insertion phase: Design</a:t>
+            </a:r>
+          </a:p>
+          <a:p>
+            <a:pPr marL="285750" indent="-285750">
+              <a:buFont typeface="Arial" panose="020B0604020202020204" pitchFamily="34" charset="0"/>
+              <a:buChar char="•"/>
+            </a:pPr>
+            <a:r>
+              <a:rPr lang="en-US" dirty="0"/>
+              <a:t>Abstraction level: Register Transfer level</a:t>
+            </a:r>
+          </a:p>
+          <a:p>
+            <a:pPr marL="285750" indent="-285750">
+              <a:buFont typeface="Arial" panose="020B0604020202020204" pitchFamily="34" charset="0"/>
+              <a:buChar char="•"/>
+            </a:pPr>
+            <a:r>
+              <a:rPr lang="en-US" dirty="0"/>
+              <a:t>Act. mechanism: Conditionally triggered</a:t>
+            </a:r>
+          </a:p>
+          <a:p>
+            <a:pPr marL="285750" indent="-285750">
+              <a:buFont typeface="Arial" panose="020B0604020202020204" pitchFamily="34" charset="0"/>
+              <a:buChar char="•"/>
+            </a:pPr>
+            <a:r>
+              <a:rPr lang="en-US" dirty="0"/>
+              <a:t>Effects: Leak Information</a:t>
+            </a:r>
+          </a:p>
+          <a:p>
+            <a:pPr marL="285750" indent="-285750">
+              <a:buFont typeface="Arial" panose="020B0604020202020204" pitchFamily="34" charset="0"/>
+              <a:buChar char="•"/>
+            </a:pPr>
+            <a:r>
+              <a:rPr lang="en-US" dirty="0"/>
+              <a:t>Location: Processor</a:t>
+            </a:r>
+          </a:p>
+          <a:p>
+            <a:pPr marL="285750" indent="-285750">
+              <a:buFont typeface="Arial" panose="020B0604020202020204" pitchFamily="34" charset="0"/>
+              <a:buChar char="•"/>
+            </a:pPr>
+            <a:r>
+              <a:rPr lang="en-US" dirty="0"/>
+              <a:t>Physical characteristics: Functional</a:t>
             </a:r>
             <a:endParaRPr lang="el-GR" dirty="0"/>
           </a:p>
@@ -8219,10 +8437,10 @@
       </p:sp>
       <p:sp>
         <p:nvSpPr>
-          <p:cNvPr id="6" name="TextBox 5">
-            <a:extLst>
-              <a:ext uri="{FF2B5EF4-FFF2-40B4-BE49-F238E27FC236}">
-                <a16:creationId xmlns:a16="http://schemas.microsoft.com/office/drawing/2014/main" id="{4186C9DF-43D9-0C3B-5DFD-52EAF2C46AE2}"/>
+          <p:cNvPr id="7" name="TextBox 6">
+            <a:extLst>
+              <a:ext uri="{FF2B5EF4-FFF2-40B4-BE49-F238E27FC236}">
+                <a16:creationId xmlns:a16="http://schemas.microsoft.com/office/drawing/2014/main" id="{CFCE63C9-6E10-8092-1738-B532DAE90688}"/>
               </a:ext>
             </a:extLst>
           </p:cNvPr>
@@ -8231,8 +8449,8 @@
         </p:nvSpPr>
         <p:spPr>
           <a:xfrm>
-            <a:off x="1904066" y="2532594"/>
-            <a:ext cx="4697964" cy="2308324"/>
+            <a:off x="3363157" y="1179521"/>
+            <a:ext cx="7573119" cy="830997"/>
           </a:xfrm>
           <a:prstGeom prst="rect">
             <a:avLst/>
@@ -8246,73 +8464,11 @@
           <a:lstStyle/>
           <a:p>
             <a:r>
-              <a:rPr lang="en-US" dirty="0"/>
-              <a:t>Severity of the vulnerability:</a:t>
-            </a:r>
-          </a:p>
-          <a:p>
-            <a:endParaRPr lang="en-US" dirty="0"/>
-          </a:p>
-          <a:p>
-            <a:pPr marL="285750" indent="-285750">
-              <a:buFont typeface="Arial" panose="020B0604020202020204" pitchFamily="34" charset="0"/>
-              <a:buChar char="•"/>
-            </a:pPr>
-            <a:r>
-              <a:rPr lang="en-US" dirty="0"/>
-              <a:t>Insertion phase: Design</a:t>
-            </a:r>
-          </a:p>
-          <a:p>
-            <a:pPr marL="285750" indent="-285750">
-              <a:buFont typeface="Arial" panose="020B0604020202020204" pitchFamily="34" charset="0"/>
-              <a:buChar char="•"/>
-            </a:pPr>
-            <a:r>
-              <a:rPr lang="en-US" dirty="0"/>
-              <a:t>Abstraction level: Register Transfer level</a:t>
-            </a:r>
-          </a:p>
-          <a:p>
-            <a:pPr marL="285750" indent="-285750">
-              <a:buFont typeface="Arial" panose="020B0604020202020204" pitchFamily="34" charset="0"/>
-              <a:buChar char="•"/>
-            </a:pPr>
-            <a:r>
-              <a:rPr lang="en-US" dirty="0"/>
-              <a:t>Act. mechanism: Conditionally triggered</a:t>
-            </a:r>
-          </a:p>
-          <a:p>
-            <a:pPr marL="285750" indent="-285750">
-              <a:buFont typeface="Arial" panose="020B0604020202020204" pitchFamily="34" charset="0"/>
-              <a:buChar char="•"/>
-            </a:pPr>
-            <a:r>
-              <a:rPr lang="en-US" dirty="0"/>
-              <a:t>Effects: Leak Information</a:t>
-            </a:r>
-          </a:p>
-          <a:p>
-            <a:pPr marL="285750" indent="-285750">
-              <a:buFont typeface="Arial" panose="020B0604020202020204" pitchFamily="34" charset="0"/>
-              <a:buChar char="•"/>
-            </a:pPr>
-            <a:r>
-              <a:rPr lang="en-US" dirty="0"/>
-              <a:t>Location: Processor</a:t>
-            </a:r>
-          </a:p>
-          <a:p>
-            <a:pPr marL="285750" indent="-285750">
-              <a:buFont typeface="Arial" panose="020B0604020202020204" pitchFamily="34" charset="0"/>
-              <a:buChar char="•"/>
-            </a:pPr>
-            <a:r>
-              <a:rPr lang="en-US" dirty="0"/>
-              <a:t>Physical characteristics: Functional</a:t>
-            </a:r>
-            <a:endParaRPr lang="el-GR" dirty="0"/>
+              <a:rPr lang="en-US" sz="2400" dirty="0">
+                <a:latin typeface="Arial Black" panose="020B0A04020102020204" pitchFamily="34" charset="0"/>
+              </a:rPr>
+              <a:t>Leaking the key by modulating an (unused) pin on chip that generates an RF signal. </a:t>
+            </a:r>
           </a:p>
         </p:txBody>
       </p:sp>
@@ -8368,7 +8524,7 @@
         </p:blipFill>
         <p:spPr>
           <a:xfrm>
-            <a:off x="227044" y="3495791"/>
+            <a:off x="194387" y="3836358"/>
             <a:ext cx="11803225" cy="1821823"/>
           </a:xfrm>
           <a:prstGeom prst="rect">
@@ -8391,7 +8547,7 @@
         <p:spPr>
           <a:xfrm>
             <a:off x="564502" y="105013"/>
-            <a:ext cx="10851502" cy="3323987"/>
+            <a:ext cx="10851502" cy="3539430"/>
           </a:xfrm>
           <a:prstGeom prst="rect">
             <a:avLst/>
@@ -8406,8 +8562,33 @@
           <a:p>
             <a:r>
               <a:rPr lang="en-US" sz="1400" dirty="0"/>
-              <a:t>The waveform diagram represents a form of serial communication from a signal capture of a digital system. </a:t>
-            </a:r>
+              <a:t>Both waveform diagrams(</a:t>
+            </a:r>
+            <a:r>
+              <a:rPr lang="en-US" sz="1400" dirty="0" err="1"/>
+              <a:t>a,b</a:t>
+            </a:r>
+            <a:r>
+              <a:rPr lang="en-US" sz="1400" dirty="0"/>
+              <a:t>) represent a form of communication from a signal capture of the AES IP block, a) diagram is a zoomed in version. b) diagram is the more zoomed out screenshot. (</a:t>
+            </a:r>
+            <a:r>
+              <a:rPr lang="en-US" sz="1400" i="1" dirty="0"/>
+              <a:t>Code and simulation can be found </a:t>
+            </a:r>
+            <a:r>
+              <a:rPr lang="en-US" sz="1400" i="1" dirty="0">
+                <a:hlinkClick r:id="rId3"/>
+              </a:rPr>
+              <a:t>here</a:t>
+            </a:r>
+            <a:r>
+              <a:rPr lang="en-US" sz="1400" dirty="0"/>
+              <a:t>.)</a:t>
+            </a:r>
+          </a:p>
+          <a:p>
+            <a:endParaRPr lang="en-US" sz="1400" dirty="0"/>
           </a:p>
           <a:p>
             <a:r>
@@ -8510,14 +8691,110 @@
           <a:p>
             <a:r>
               <a:rPr lang="en-US" sz="1400" dirty="0"/>
-              <a:t>When the chip is powered on the key is being transmitted thought the antenna at 1560KHz by implementing a beep scheme where a single beep followed by a pause represents a '0' and a double beep followed by a pause</a:t>
-            </a:r>
-          </a:p>
-          <a:p>
-            <a:r>
-              <a:rPr lang="en-US" sz="1400" dirty="0"/>
-              <a:t>stands for '1'. </a:t>
-            </a:r>
+              <a:t>When the chip is powered on the key is being transmitted thought the antenna at 1560KHz (assuming a 50mhz clock) by implementing a beep scheme where a single beep followed by a pause represents a '0' and a double beep followed by a pause stands for '1'. </a:t>
+            </a:r>
+          </a:p>
+        </p:txBody>
+      </p:sp>
+      <p:pic>
+        <p:nvPicPr>
+          <p:cNvPr id="5" name="Εικόνα 4">
+            <a:extLst>
+              <a:ext uri="{FF2B5EF4-FFF2-40B4-BE49-F238E27FC236}">
+                <a16:creationId xmlns:a16="http://schemas.microsoft.com/office/drawing/2014/main" id="{7F7A0DC9-8224-B7D7-67C1-3603B4F40708}"/>
+              </a:ext>
+            </a:extLst>
+          </p:cNvPr>
+          <p:cNvPicPr>
+            <a:picLocks noChangeAspect="1"/>
+          </p:cNvPicPr>
+          <p:nvPr/>
+        </p:nvPicPr>
+        <p:blipFill>
+          <a:blip r:embed="rId4"/>
+          <a:stretch>
+            <a:fillRect/>
+          </a:stretch>
+        </p:blipFill>
+        <p:spPr>
+          <a:xfrm>
+            <a:off x="-13995" y="5918375"/>
+            <a:ext cx="12192000" cy="834612"/>
+          </a:xfrm>
+          <a:prstGeom prst="rect">
+            <a:avLst/>
+          </a:prstGeom>
+        </p:spPr>
+      </p:pic>
+      <p:sp>
+        <p:nvSpPr>
+          <p:cNvPr id="6" name="TextBox 5">
+            <a:extLst>
+              <a:ext uri="{FF2B5EF4-FFF2-40B4-BE49-F238E27FC236}">
+                <a16:creationId xmlns:a16="http://schemas.microsoft.com/office/drawing/2014/main" id="{DB2850FD-D266-A4D6-0D91-8648E296A8F5}"/>
+              </a:ext>
+            </a:extLst>
+          </p:cNvPr>
+          <p:cNvSpPr txBox="1"/>
+          <p:nvPr/>
+        </p:nvSpPr>
+        <p:spPr>
+          <a:xfrm>
+            <a:off x="194386" y="3499332"/>
+            <a:ext cx="463421" cy="369332"/>
+          </a:xfrm>
+          <a:prstGeom prst="rect">
+            <a:avLst/>
+          </a:prstGeom>
+          <a:noFill/>
+        </p:spPr>
+        <p:txBody>
+          <a:bodyPr wrap="square" rtlCol="0">
+            <a:spAutoFit/>
+          </a:bodyPr>
+          <a:lstStyle/>
+          <a:p>
+            <a:r>
+              <a:rPr lang="en-US" dirty="0"/>
+              <a:t>a)</a:t>
+            </a:r>
+            <a:endParaRPr lang="el-GR" dirty="0"/>
+          </a:p>
+        </p:txBody>
+      </p:sp>
+      <p:sp>
+        <p:nvSpPr>
+          <p:cNvPr id="7" name="TextBox 6">
+            <a:extLst>
+              <a:ext uri="{FF2B5EF4-FFF2-40B4-BE49-F238E27FC236}">
+                <a16:creationId xmlns:a16="http://schemas.microsoft.com/office/drawing/2014/main" id="{3199503A-8EAB-6666-9952-02E260189531}"/>
+              </a:ext>
+            </a:extLst>
+          </p:cNvPr>
+          <p:cNvSpPr txBox="1"/>
+          <p:nvPr/>
+        </p:nvSpPr>
+        <p:spPr>
+          <a:xfrm>
+            <a:off x="194385" y="5603612"/>
+            <a:ext cx="463421" cy="369332"/>
+          </a:xfrm>
+          <a:prstGeom prst="rect">
+            <a:avLst/>
+          </a:prstGeom>
+          <a:noFill/>
+        </p:spPr>
+        <p:txBody>
+          <a:bodyPr wrap="square" rtlCol="0">
+            <a:spAutoFit/>
+          </a:bodyPr>
+          <a:lstStyle/>
+          <a:p>
+            <a:r>
+              <a:rPr lang="en-US" dirty="0"/>
+              <a:t>b)</a:t>
+            </a:r>
+            <a:endParaRPr lang="el-GR" dirty="0"/>
           </a:p>
         </p:txBody>
       </p:sp>
@@ -8621,7 +8898,7 @@
           <a:p>
             <a:r>
               <a:rPr lang="en-US" sz="2400" dirty="0"/>
-              <a:t>Use of the Chain Of Thought(</a:t>
+              <a:t>We used the Chain Of Thought(</a:t>
             </a:r>
             <a:r>
               <a:rPr lang="en-US" sz="2400" dirty="0" err="1"/>
@@ -10052,7 +10329,7 @@
           <a:p>
             <a:r>
               <a:rPr lang="en-US" dirty="0"/>
-              <a:t>During the course of our investigation, ChatGPT's content filtering procedure impeded attempts to write "malicious" code. We discovered a means to circumvent this security and "exploit" the system by utilizing ZULU as the primary prompting language. As a proof of concept, we present the dialogue below:</a:t>
+              <a:t>During the course of our investigation, ChatGPT's content filtering procedure impeded attempts to write "malicious" code. We discovered a means to circumvent this security and "exploit" the system by utilizing ZULU as the primary prompting language. As a proof of concept, we present the dialogues below:</a:t>
             </a:r>
             <a:endParaRPr lang="el-GR" dirty="0"/>
           </a:p>
@@ -10324,7 +10601,7 @@
         </p:nvSpPr>
         <p:spPr>
           <a:xfrm>
-            <a:off x="962658" y="3081597"/>
+            <a:off x="1291271" y="2794706"/>
             <a:ext cx="5697758" cy="2308324"/>
           </a:xfrm>
           <a:prstGeom prst="rect">
@@ -10439,7 +10716,7 @@
         </p:nvSpPr>
         <p:spPr>
           <a:xfrm>
-            <a:off x="6843524" y="2983170"/>
+            <a:off x="7172137" y="2696279"/>
             <a:ext cx="5147254" cy="2031325"/>
           </a:xfrm>
           <a:prstGeom prst="rect">

</xml_diff>